<commit_message>
Added univariate statistics on food_desert variables
</commit_message>
<xml_diff>
--- a/doc/2020_11_25_cfc_ds_technical_screen_haywood.pptx
+++ b/doc/2020_11_25_cfc_ds_technical_screen_haywood.pptx
@@ -6,6 +6,7 @@
   </p:sldMasterIdLst>
   <p:sldIdLst>
     <p:sldId id="256" r:id="rId2"/>
+    <p:sldId id="257" r:id="rId3"/>
   </p:sldIdLst>
   <p:sldSz cx="12192000" cy="6858000"/>
   <p:notesSz cx="6858000" cy="9144000"/>
@@ -104,6 +105,11 @@
       </a:defRPr>
     </a:lvl9pPr>
   </p:defaultTextStyle>
+  <p:extLst>
+    <p:ext uri="{EFAFB233-063F-42B5-8137-9DF3F51BA10A}">
+      <p15:sldGuideLst xmlns:p15="http://schemas.microsoft.com/office/powerpoint/2012/main"/>
+    </p:ext>
+  </p:extLst>
 </p:presentation>
 </file>
 
@@ -254,7 +260,7 @@
           <a:p>
             <a:fld id="{98C04B13-297B-4E2B-8843-A6B664CF41A7}" type="datetimeFigureOut">
               <a:rPr lang="en-US" smtClean="0"/>
-              <a:t>11/18/2020</a:t>
+              <a:t>11/20/2020</a:t>
             </a:fld>
             <a:endParaRPr lang="en-US"/>
           </a:p>
@@ -452,7 +458,7 @@
           <a:p>
             <a:fld id="{98C04B13-297B-4E2B-8843-A6B664CF41A7}" type="datetimeFigureOut">
               <a:rPr lang="en-US" smtClean="0"/>
-              <a:t>11/18/2020</a:t>
+              <a:t>11/20/2020</a:t>
             </a:fld>
             <a:endParaRPr lang="en-US"/>
           </a:p>
@@ -660,7 +666,7 @@
           <a:p>
             <a:fld id="{98C04B13-297B-4E2B-8843-A6B664CF41A7}" type="datetimeFigureOut">
               <a:rPr lang="en-US" smtClean="0"/>
-              <a:t>11/18/2020</a:t>
+              <a:t>11/20/2020</a:t>
             </a:fld>
             <a:endParaRPr lang="en-US"/>
           </a:p>
@@ -858,7 +864,7 @@
           <a:p>
             <a:fld id="{98C04B13-297B-4E2B-8843-A6B664CF41A7}" type="datetimeFigureOut">
               <a:rPr lang="en-US" smtClean="0"/>
-              <a:t>11/18/2020</a:t>
+              <a:t>11/20/2020</a:t>
             </a:fld>
             <a:endParaRPr lang="en-US"/>
           </a:p>
@@ -1133,7 +1139,7 @@
           <a:p>
             <a:fld id="{98C04B13-297B-4E2B-8843-A6B664CF41A7}" type="datetimeFigureOut">
               <a:rPr lang="en-US" smtClean="0"/>
-              <a:t>11/18/2020</a:t>
+              <a:t>11/20/2020</a:t>
             </a:fld>
             <a:endParaRPr lang="en-US"/>
           </a:p>
@@ -1398,7 +1404,7 @@
           <a:p>
             <a:fld id="{98C04B13-297B-4E2B-8843-A6B664CF41A7}" type="datetimeFigureOut">
               <a:rPr lang="en-US" smtClean="0"/>
-              <a:t>11/18/2020</a:t>
+              <a:t>11/20/2020</a:t>
             </a:fld>
             <a:endParaRPr lang="en-US"/>
           </a:p>
@@ -1810,7 +1816,7 @@
           <a:p>
             <a:fld id="{98C04B13-297B-4E2B-8843-A6B664CF41A7}" type="datetimeFigureOut">
               <a:rPr lang="en-US" smtClean="0"/>
-              <a:t>11/18/2020</a:t>
+              <a:t>11/20/2020</a:t>
             </a:fld>
             <a:endParaRPr lang="en-US"/>
           </a:p>
@@ -1951,7 +1957,7 @@
           <a:p>
             <a:fld id="{98C04B13-297B-4E2B-8843-A6B664CF41A7}" type="datetimeFigureOut">
               <a:rPr lang="en-US" smtClean="0"/>
-              <a:t>11/18/2020</a:t>
+              <a:t>11/20/2020</a:t>
             </a:fld>
             <a:endParaRPr lang="en-US"/>
           </a:p>
@@ -2064,7 +2070,7 @@
           <a:p>
             <a:fld id="{98C04B13-297B-4E2B-8843-A6B664CF41A7}" type="datetimeFigureOut">
               <a:rPr lang="en-US" smtClean="0"/>
-              <a:t>11/18/2020</a:t>
+              <a:t>11/20/2020</a:t>
             </a:fld>
             <a:endParaRPr lang="en-US"/>
           </a:p>
@@ -2375,7 +2381,7 @@
           <a:p>
             <a:fld id="{98C04B13-297B-4E2B-8843-A6B664CF41A7}" type="datetimeFigureOut">
               <a:rPr lang="en-US" smtClean="0"/>
-              <a:t>11/18/2020</a:t>
+              <a:t>11/20/2020</a:t>
             </a:fld>
             <a:endParaRPr lang="en-US"/>
           </a:p>
@@ -2663,7 +2669,7 @@
           <a:p>
             <a:fld id="{98C04B13-297B-4E2B-8843-A6B664CF41A7}" type="datetimeFigureOut">
               <a:rPr lang="en-US" smtClean="0"/>
-              <a:t>11/18/2020</a:t>
+              <a:t>11/20/2020</a:t>
             </a:fld>
             <a:endParaRPr lang="en-US"/>
           </a:p>
@@ -2904,7 +2910,7 @@
           <a:p>
             <a:fld id="{98C04B13-297B-4E2B-8843-A6B664CF41A7}" type="datetimeFigureOut">
               <a:rPr lang="en-US" smtClean="0"/>
-              <a:t>11/18/2020</a:t>
+              <a:t>11/20/2020</a:t>
             </a:fld>
             <a:endParaRPr lang="en-US"/>
           </a:p>
@@ -3397,6 +3403,103 @@
 </p:sld>
 </file>
 
+<file path=ppt/slides/slide2.xml><?xml version="1.0" encoding="utf-8"?>
+<p:sld xmlns:a="http://schemas.openxmlformats.org/drawingml/2006/main" xmlns:r="http://schemas.openxmlformats.org/officeDocument/2006/relationships" xmlns:p="http://schemas.openxmlformats.org/presentationml/2006/main">
+  <p:cSld>
+    <p:spTree>
+      <p:nvGrpSpPr>
+        <p:cNvPr id="1" name=""/>
+        <p:cNvGrpSpPr/>
+        <p:nvPr/>
+      </p:nvGrpSpPr>
+      <p:grpSpPr>
+        <a:xfrm>
+          <a:off x="0" y="0"/>
+          <a:ext cx="0" cy="0"/>
+          <a:chOff x="0" y="0"/>
+          <a:chExt cx="0" cy="0"/>
+        </a:xfrm>
+      </p:grpSpPr>
+      <p:sp>
+        <p:nvSpPr>
+          <p:cNvPr id="2" name="Title 1">
+            <a:extLst>
+              <a:ext uri="{FF2B5EF4-FFF2-40B4-BE49-F238E27FC236}">
+                <a16:creationId xmlns:a16="http://schemas.microsoft.com/office/drawing/2014/main" id="{894A6366-8746-4B25-95D5-47DB023E3C92}"/>
+              </a:ext>
+            </a:extLst>
+          </p:cNvPr>
+          <p:cNvSpPr>
+            <a:spLocks noGrp="1"/>
+          </p:cNvSpPr>
+          <p:nvPr>
+            <p:ph type="title"/>
+          </p:nvPr>
+        </p:nvSpPr>
+        <p:spPr/>
+        <p:txBody>
+          <a:bodyPr/>
+          <a:lstStyle/>
+          <a:p>
+            <a:r>
+              <a:rPr lang="en-US" dirty="0"/>
+              <a:t>Notes</a:t>
+            </a:r>
+          </a:p>
+        </p:txBody>
+      </p:sp>
+      <p:sp>
+        <p:nvSpPr>
+          <p:cNvPr id="3" name="Content Placeholder 2">
+            <a:extLst>
+              <a:ext uri="{FF2B5EF4-FFF2-40B4-BE49-F238E27FC236}">
+                <a16:creationId xmlns:a16="http://schemas.microsoft.com/office/drawing/2014/main" id="{E5EAFEFE-B8D7-4A12-92A9-7252611D1726}"/>
+              </a:ext>
+            </a:extLst>
+          </p:cNvPr>
+          <p:cNvSpPr>
+            <a:spLocks noGrp="1"/>
+          </p:cNvSpPr>
+          <p:nvPr>
+            <p:ph idx="1"/>
+          </p:nvPr>
+        </p:nvSpPr>
+        <p:spPr/>
+        <p:txBody>
+          <a:bodyPr/>
+          <a:lstStyle/>
+          <a:p>
+            <a:r>
+              <a:rPr lang="en-US" dirty="0"/>
+              <a:t>134 to 368 tracts listed as food deserts from 2010 to 2017 – why?</a:t>
+            </a:r>
+          </a:p>
+          <a:p>
+            <a:r>
+              <a:rPr lang="en-US" dirty="0"/>
+              <a:t>54/100 counties with </a:t>
+            </a:r>
+            <a:r>
+              <a:rPr lang="en-US"/>
+              <a:t>food deserts 2010; 83/100 2017</a:t>
+            </a:r>
+            <a:endParaRPr lang="en-US" dirty="0"/>
+          </a:p>
+        </p:txBody>
+      </p:sp>
+    </p:spTree>
+    <p:extLst>
+      <p:ext uri="{BB962C8B-B14F-4D97-AF65-F5344CB8AC3E}">
+        <p14:creationId xmlns:p14="http://schemas.microsoft.com/office/powerpoint/2010/main" val="2773082941"/>
+      </p:ext>
+    </p:extLst>
+  </p:cSld>
+  <p:clrMapOvr>
+    <a:masterClrMapping/>
+  </p:clrMapOvr>
+</p:sld>
+</file>
+
 <file path=ppt/theme/theme1.xml><?xml version="1.0" encoding="utf-8"?>
 <a:theme xmlns:a="http://schemas.openxmlformats.org/drawingml/2006/main" name="Office Theme">
   <a:themeElements>

</xml_diff>

<commit_message>
Added feature importance and roc graphs
</commit_message>
<xml_diff>
--- a/doc/2020_11_25_cfc_ds_technical_screen_haywood.pptx
+++ b/doc/2020_11_25_cfc_ds_technical_screen_haywood.pptx
@@ -5,32 +5,29 @@
     <p:sldMasterId id="2147483648" r:id="rId1"/>
   </p:sldMasterIdLst>
   <p:notesMasterIdLst>
-    <p:notesMasterId r:id="rId25"/>
+    <p:notesMasterId r:id="rId22"/>
   </p:notesMasterIdLst>
   <p:sldIdLst>
     <p:sldId id="256" r:id="rId2"/>
-    <p:sldId id="257" r:id="rId3"/>
-    <p:sldId id="258" r:id="rId4"/>
-    <p:sldId id="259" r:id="rId5"/>
-    <p:sldId id="260" r:id="rId6"/>
-    <p:sldId id="261" r:id="rId7"/>
-    <p:sldId id="262" r:id="rId8"/>
-    <p:sldId id="263" r:id="rId9"/>
-    <p:sldId id="264" r:id="rId10"/>
-    <p:sldId id="279" r:id="rId11"/>
-    <p:sldId id="266" r:id="rId12"/>
-    <p:sldId id="265" r:id="rId13"/>
-    <p:sldId id="280" r:id="rId14"/>
-    <p:sldId id="267" r:id="rId15"/>
+    <p:sldId id="258" r:id="rId3"/>
+    <p:sldId id="259" r:id="rId4"/>
+    <p:sldId id="260" r:id="rId5"/>
+    <p:sldId id="261" r:id="rId6"/>
+    <p:sldId id="262" r:id="rId7"/>
+    <p:sldId id="263" r:id="rId8"/>
+    <p:sldId id="264" r:id="rId9"/>
+    <p:sldId id="279" r:id="rId10"/>
+    <p:sldId id="266" r:id="rId11"/>
+    <p:sldId id="265" r:id="rId12"/>
+    <p:sldId id="280" r:id="rId13"/>
+    <p:sldId id="267" r:id="rId14"/>
+    <p:sldId id="281" r:id="rId15"/>
     <p:sldId id="268" r:id="rId16"/>
     <p:sldId id="269" r:id="rId17"/>
-    <p:sldId id="270" r:id="rId18"/>
-    <p:sldId id="271" r:id="rId19"/>
-    <p:sldId id="276" r:id="rId20"/>
-    <p:sldId id="277" r:id="rId21"/>
-    <p:sldId id="272" r:id="rId22"/>
-    <p:sldId id="273" r:id="rId23"/>
-    <p:sldId id="278" r:id="rId24"/>
+    <p:sldId id="277" r:id="rId18"/>
+    <p:sldId id="272" r:id="rId19"/>
+    <p:sldId id="273" r:id="rId20"/>
+    <p:sldId id="278" r:id="rId21"/>
   </p:sldIdLst>
   <p:sldSz cx="12192000" cy="6858000"/>
   <p:notesSz cx="6858000" cy="9144000"/>
@@ -678,7 +675,7 @@
           <a:p>
             <a:fld id="{98C04B13-297B-4E2B-8843-A6B664CF41A7}" type="datetimeFigureOut">
               <a:rPr lang="en-US" smtClean="0"/>
-              <a:t>11/23/2020</a:t>
+              <a:t>11/24/2020</a:t>
             </a:fld>
             <a:endParaRPr lang="en-US" dirty="0"/>
           </a:p>
@@ -1604,7 +1601,7 @@
           <a:p>
             <a:fld id="{98C04B13-297B-4E2B-8843-A6B664CF41A7}" type="datetimeFigureOut">
               <a:rPr lang="en-US" smtClean="0"/>
-              <a:t>11/23/2020</a:t>
+              <a:t>11/24/2020</a:t>
             </a:fld>
             <a:endParaRPr lang="en-US"/>
           </a:p>
@@ -3903,99 +3900,6 @@
 </file>
 
 <file path=ppt/slides/slide10.xml><?xml version="1.0" encoding="utf-8"?>
-<p:sld xmlns:a="http://schemas.openxmlformats.org/drawingml/2006/main" xmlns:r="http://schemas.openxmlformats.org/officeDocument/2006/relationships" xmlns:p="http://schemas.openxmlformats.org/presentationml/2006/main">
-  <p:cSld>
-    <p:spTree>
-      <p:nvGrpSpPr>
-        <p:cNvPr id="1" name=""/>
-        <p:cNvGrpSpPr/>
-        <p:nvPr/>
-      </p:nvGrpSpPr>
-      <p:grpSpPr>
-        <a:xfrm>
-          <a:off x="0" y="0"/>
-          <a:ext cx="0" cy="0"/>
-          <a:chOff x="0" y="0"/>
-          <a:chExt cx="0" cy="0"/>
-        </a:xfrm>
-      </p:grpSpPr>
-      <p:pic>
-        <p:nvPicPr>
-          <p:cNvPr id="13" name="Content Placeholder 12">
-            <a:extLst>
-              <a:ext uri="{FF2B5EF4-FFF2-40B4-BE49-F238E27FC236}">
-                <a16:creationId xmlns:a16="http://schemas.microsoft.com/office/drawing/2014/main" id="{58434196-68EF-4A07-8419-67993B8D07E3}"/>
-              </a:ext>
-            </a:extLst>
-          </p:cNvPr>
-          <p:cNvPicPr>
-            <a:picLocks noGrp="1" noChangeAspect="1"/>
-          </p:cNvPicPr>
-          <p:nvPr>
-            <p:ph idx="1"/>
-          </p:nvPr>
-        </p:nvPicPr>
-        <p:blipFill>
-          <a:blip r:embed="rId2">
-            <a:extLst>
-              <a:ext uri="{28A0092B-C50C-407E-A947-70E740481C1C}">
-                <a14:useLocalDpi xmlns:a14="http://schemas.microsoft.com/office/drawing/2010/main" val="0"/>
-              </a:ext>
-            </a:extLst>
-          </a:blip>
-          <a:stretch>
-            <a:fillRect/>
-          </a:stretch>
-        </p:blipFill>
-        <p:spPr>
-          <a:xfrm>
-            <a:off x="1242537" y="63207"/>
-            <a:ext cx="9706926" cy="6731586"/>
-          </a:xfrm>
-        </p:spPr>
-      </p:pic>
-      <p:sp>
-        <p:nvSpPr>
-          <p:cNvPr id="2" name="Title 1">
-            <a:extLst>
-              <a:ext uri="{FF2B5EF4-FFF2-40B4-BE49-F238E27FC236}">
-                <a16:creationId xmlns:a16="http://schemas.microsoft.com/office/drawing/2014/main" id="{5F5609AB-862D-47C8-9E44-2B5DBB986B57}"/>
-              </a:ext>
-            </a:extLst>
-          </p:cNvPr>
-          <p:cNvSpPr>
-            <a:spLocks noGrp="1"/>
-          </p:cNvSpPr>
-          <p:nvPr>
-            <p:ph type="title"/>
-          </p:nvPr>
-        </p:nvSpPr>
-        <p:spPr/>
-        <p:txBody>
-          <a:bodyPr/>
-          <a:lstStyle/>
-          <a:p>
-            <a:r>
-              <a:rPr lang="en-US" dirty="0"/>
-              <a:t>USDA Food Desert Designations 2017</a:t>
-            </a:r>
-          </a:p>
-        </p:txBody>
-      </p:sp>
-    </p:spTree>
-    <p:extLst>
-      <p:ext uri="{BB962C8B-B14F-4D97-AF65-F5344CB8AC3E}">
-        <p14:creationId xmlns:p14="http://schemas.microsoft.com/office/powerpoint/2010/main" val="3712077006"/>
-      </p:ext>
-    </p:extLst>
-  </p:cSld>
-  <p:clrMapOvr>
-    <a:masterClrMapping/>
-  </p:clrMapOvr>
-</p:sld>
-</file>
-
-<file path=ppt/slides/slide11.xml><?xml version="1.0" encoding="utf-8"?>
 <p:sld xmlns:a="http://schemas.openxmlformats.org/drawingml/2006/main" xmlns:r="http://schemas.openxmlformats.org/officeDocument/2006/relationships" xmlns:p="http://schemas.openxmlformats.org/presentationml/2006/main">
   <p:cSld>
     <p:spTree>
@@ -4969,7 +4873,7 @@
 </p:sld>
 </file>
 
-<file path=ppt/slides/slide12.xml><?xml version="1.0" encoding="utf-8"?>
+<file path=ppt/slides/slide11.xml><?xml version="1.0" encoding="utf-8"?>
 <p:sld xmlns:a="http://schemas.openxmlformats.org/drawingml/2006/main" xmlns:r="http://schemas.openxmlformats.org/officeDocument/2006/relationships" xmlns:p="http://schemas.openxmlformats.org/presentationml/2006/main">
   <p:cSld>
     <p:spTree>
@@ -5314,6 +5218,559 @@
 </p:sld>
 </file>
 
+<file path=ppt/slides/slide12.xml><?xml version="1.0" encoding="utf-8"?>
+<p:sld xmlns:a="http://schemas.openxmlformats.org/drawingml/2006/main" xmlns:r="http://schemas.openxmlformats.org/officeDocument/2006/relationships" xmlns:p="http://schemas.openxmlformats.org/presentationml/2006/main">
+  <p:cSld>
+    <p:spTree>
+      <p:nvGrpSpPr>
+        <p:cNvPr id="1" name=""/>
+        <p:cNvGrpSpPr/>
+        <p:nvPr/>
+      </p:nvGrpSpPr>
+      <p:grpSpPr>
+        <a:xfrm>
+          <a:off x="0" y="0"/>
+          <a:ext cx="0" cy="0"/>
+          <a:chOff x="0" y="0"/>
+          <a:chExt cx="0" cy="0"/>
+        </a:xfrm>
+      </p:grpSpPr>
+      <p:sp>
+        <p:nvSpPr>
+          <p:cNvPr id="2" name="Title 1">
+            <a:extLst>
+              <a:ext uri="{FF2B5EF4-FFF2-40B4-BE49-F238E27FC236}">
+                <a16:creationId xmlns:a16="http://schemas.microsoft.com/office/drawing/2014/main" id="{4F1ADB0D-0DC8-4F7F-975B-36EA3F9BA718}"/>
+              </a:ext>
+            </a:extLst>
+          </p:cNvPr>
+          <p:cNvSpPr>
+            <a:spLocks noGrp="1"/>
+          </p:cNvSpPr>
+          <p:nvPr>
+            <p:ph type="title"/>
+          </p:nvPr>
+        </p:nvSpPr>
+        <p:spPr/>
+        <p:txBody>
+          <a:bodyPr/>
+          <a:lstStyle/>
+          <a:p>
+            <a:r>
+              <a:rPr lang="en-US" dirty="0"/>
+              <a:t>Feature Selection</a:t>
+            </a:r>
+          </a:p>
+        </p:txBody>
+      </p:sp>
+      <p:sp>
+        <p:nvSpPr>
+          <p:cNvPr id="3" name="Content Placeholder 2">
+            <a:extLst>
+              <a:ext uri="{FF2B5EF4-FFF2-40B4-BE49-F238E27FC236}">
+                <a16:creationId xmlns:a16="http://schemas.microsoft.com/office/drawing/2014/main" id="{576B576E-655C-4419-A03F-657F12B25F39}"/>
+              </a:ext>
+            </a:extLst>
+          </p:cNvPr>
+          <p:cNvSpPr>
+            <a:spLocks noGrp="1"/>
+          </p:cNvSpPr>
+          <p:nvPr>
+            <p:ph idx="1"/>
+          </p:nvPr>
+        </p:nvSpPr>
+        <p:spPr>
+          <a:xfrm>
+            <a:off x="838200" y="1346886"/>
+            <a:ext cx="10515600" cy="782087"/>
+          </a:xfrm>
+        </p:spPr>
+        <p:txBody>
+          <a:bodyPr>
+            <a:normAutofit/>
+          </a:bodyPr>
+          <a:lstStyle/>
+          <a:p>
+            <a:r>
+              <a:rPr lang="en-US" sz="1600" dirty="0"/>
+              <a:t>Multiple feature selection processes were performed.</a:t>
+            </a:r>
+          </a:p>
+          <a:p>
+            <a:r>
+              <a:rPr lang="en-US" sz="1600" dirty="0"/>
+              <a:t>Ten variables selected for final model.</a:t>
+            </a:r>
+          </a:p>
+          <a:p>
+            <a:endParaRPr lang="en-US" sz="1200" dirty="0"/>
+          </a:p>
+        </p:txBody>
+      </p:sp>
+      <p:grpSp>
+        <p:nvGrpSpPr>
+          <p:cNvPr id="10" name="Group 9">
+            <a:extLst>
+              <a:ext uri="{FF2B5EF4-FFF2-40B4-BE49-F238E27FC236}">
+                <a16:creationId xmlns:a16="http://schemas.microsoft.com/office/drawing/2014/main" id="{9E4258D6-DC72-4DC0-93D2-E7386A05906C}"/>
+              </a:ext>
+            </a:extLst>
+          </p:cNvPr>
+          <p:cNvGrpSpPr/>
+          <p:nvPr/>
+        </p:nvGrpSpPr>
+        <p:grpSpPr>
+          <a:xfrm>
+            <a:off x="838200" y="2128973"/>
+            <a:ext cx="10515600" cy="1307920"/>
+            <a:chOff x="838200" y="1854653"/>
+            <a:chExt cx="10515600" cy="1307920"/>
+          </a:xfrm>
+        </p:grpSpPr>
+        <p:sp>
+          <p:nvSpPr>
+            <p:cNvPr id="4" name="Rectangle: Rounded Corners 3">
+              <a:extLst>
+                <a:ext uri="{FF2B5EF4-FFF2-40B4-BE49-F238E27FC236}">
+                  <a16:creationId xmlns:a16="http://schemas.microsoft.com/office/drawing/2014/main" id="{72AC708C-14B7-4344-8955-704F511DCE07}"/>
+                </a:ext>
+              </a:extLst>
+            </p:cNvPr>
+            <p:cNvSpPr/>
+            <p:nvPr/>
+          </p:nvSpPr>
+          <p:spPr>
+            <a:xfrm>
+              <a:off x="838200" y="1854653"/>
+              <a:ext cx="3235960" cy="447040"/>
+            </a:xfrm>
+            <a:prstGeom prst="roundRect">
+              <a:avLst/>
+            </a:prstGeom>
+            <a:solidFill>
+              <a:srgbClr val="65BBB5"/>
+            </a:solidFill>
+            <a:ln>
+              <a:noFill/>
+            </a:ln>
+          </p:spPr>
+          <p:style>
+            <a:lnRef idx="2">
+              <a:schemeClr val="accent1">
+                <a:shade val="50000"/>
+              </a:schemeClr>
+            </a:lnRef>
+            <a:fillRef idx="1">
+              <a:schemeClr val="accent1"/>
+            </a:fillRef>
+            <a:effectRef idx="0">
+              <a:schemeClr val="accent1"/>
+            </a:effectRef>
+            <a:fontRef idx="minor">
+              <a:schemeClr val="lt1"/>
+            </a:fontRef>
+          </p:style>
+          <p:txBody>
+            <a:bodyPr rtlCol="0" anchor="ctr"/>
+            <a:lstStyle/>
+            <a:p>
+              <a:pPr algn="ctr"/>
+              <a:r>
+                <a:rPr lang="en-US" dirty="0"/>
+                <a:t>Univariate Logistic Regression</a:t>
+              </a:r>
+            </a:p>
+          </p:txBody>
+        </p:sp>
+        <p:sp>
+          <p:nvSpPr>
+            <p:cNvPr id="7" name="TextBox 6">
+              <a:extLst>
+                <a:ext uri="{FF2B5EF4-FFF2-40B4-BE49-F238E27FC236}">
+                  <a16:creationId xmlns:a16="http://schemas.microsoft.com/office/drawing/2014/main" id="{DAFA7CBC-3041-4A66-80C2-30325073E156}"/>
+                </a:ext>
+              </a:extLst>
+            </p:cNvPr>
+            <p:cNvSpPr txBox="1"/>
+            <p:nvPr/>
+          </p:nvSpPr>
+          <p:spPr>
+            <a:xfrm>
+              <a:off x="838200" y="2300799"/>
+              <a:ext cx="10515600" cy="861774"/>
+            </a:xfrm>
+            <a:prstGeom prst="rect">
+              <a:avLst/>
+            </a:prstGeom>
+            <a:noFill/>
+          </p:spPr>
+          <p:txBody>
+            <a:bodyPr wrap="square" rtlCol="0">
+              <a:spAutoFit/>
+            </a:bodyPr>
+            <a:lstStyle/>
+            <a:p>
+              <a:pPr marL="342900" indent="-342900">
+                <a:buFont typeface="+mj-lt"/>
+                <a:buAutoNum type="arabicPeriod"/>
+              </a:pPr>
+              <a:r>
+                <a:rPr lang="en-US" sz="1600" dirty="0"/>
+                <a:t>Build a univariate logistic regression for each potential predictor i.e. P(</a:t>
+              </a:r>
+              <a:r>
+                <a:rPr lang="en-US" sz="1600" dirty="0" err="1"/>
+                <a:t>food_desert</a:t>
+              </a:r>
+              <a:r>
+                <a:rPr lang="en-US" sz="1600" dirty="0"/>
+                <a:t>) = logit(B</a:t>
+              </a:r>
+              <a:r>
+                <a:rPr lang="en-US" sz="1600" baseline="-25000" dirty="0"/>
+                <a:t>0</a:t>
+              </a:r>
+              <a:r>
+                <a:rPr lang="en-US" sz="1600" dirty="0"/>
+                <a:t> + B</a:t>
+              </a:r>
+              <a:r>
+                <a:rPr lang="en-US" sz="1600" baseline="-25000" dirty="0"/>
+                <a:t>1</a:t>
+              </a:r>
+              <a:r>
+                <a:rPr lang="en-US" sz="1600" dirty="0"/>
+                <a:t>x).</a:t>
+              </a:r>
+            </a:p>
+            <a:p>
+              <a:pPr marL="342900" indent="-342900">
+                <a:buFont typeface="+mj-lt"/>
+                <a:buAutoNum type="arabicPeriod"/>
+              </a:pPr>
+              <a:r>
+                <a:rPr lang="en-US" sz="1600" dirty="0"/>
+                <a:t>Gather the variables’ coefficients and significance level in univariate models.</a:t>
+              </a:r>
+            </a:p>
+            <a:p>
+              <a:pPr marL="342900" indent="-342900">
+                <a:buFont typeface="+mj-lt"/>
+                <a:buAutoNum type="arabicPeriod"/>
+              </a:pPr>
+              <a:r>
+                <a:rPr lang="en-US" sz="1600" dirty="0"/>
+                <a:t>Filter the selected variables on significance level.</a:t>
+              </a:r>
+            </a:p>
+          </p:txBody>
+        </p:sp>
+      </p:grpSp>
+      <p:grpSp>
+        <p:nvGrpSpPr>
+          <p:cNvPr id="11" name="Group 10">
+            <a:extLst>
+              <a:ext uri="{FF2B5EF4-FFF2-40B4-BE49-F238E27FC236}">
+                <a16:creationId xmlns:a16="http://schemas.microsoft.com/office/drawing/2014/main" id="{3C4005C3-6168-49E2-A763-7669081A3C79}"/>
+              </a:ext>
+            </a:extLst>
+          </p:cNvPr>
+          <p:cNvGrpSpPr/>
+          <p:nvPr/>
+        </p:nvGrpSpPr>
+        <p:grpSpPr>
+          <a:xfrm>
+            <a:off x="838200" y="3573482"/>
+            <a:ext cx="10515600" cy="1524258"/>
+            <a:chOff x="838200" y="3418840"/>
+            <a:chExt cx="10515600" cy="1524258"/>
+          </a:xfrm>
+        </p:grpSpPr>
+        <p:sp>
+          <p:nvSpPr>
+            <p:cNvPr id="5" name="Rectangle: Rounded Corners 4">
+              <a:extLst>
+                <a:ext uri="{FF2B5EF4-FFF2-40B4-BE49-F238E27FC236}">
+                  <a16:creationId xmlns:a16="http://schemas.microsoft.com/office/drawing/2014/main" id="{A717F7A1-389E-45ED-B93A-73DC1ACE1E2C}"/>
+                </a:ext>
+              </a:extLst>
+            </p:cNvPr>
+            <p:cNvSpPr/>
+            <p:nvPr/>
+          </p:nvSpPr>
+          <p:spPr>
+            <a:xfrm>
+              <a:off x="838200" y="3418840"/>
+              <a:ext cx="3235960" cy="447040"/>
+            </a:xfrm>
+            <a:prstGeom prst="roundRect">
+              <a:avLst/>
+            </a:prstGeom>
+            <a:solidFill>
+              <a:srgbClr val="65BBB5"/>
+            </a:solidFill>
+            <a:ln>
+              <a:noFill/>
+            </a:ln>
+          </p:spPr>
+          <p:style>
+            <a:lnRef idx="2">
+              <a:schemeClr val="accent1">
+                <a:shade val="50000"/>
+              </a:schemeClr>
+            </a:lnRef>
+            <a:fillRef idx="1">
+              <a:schemeClr val="accent1"/>
+            </a:fillRef>
+            <a:effectRef idx="0">
+              <a:schemeClr val="accent1"/>
+            </a:effectRef>
+            <a:fontRef idx="minor">
+              <a:schemeClr val="lt1"/>
+            </a:fontRef>
+          </p:style>
+          <p:txBody>
+            <a:bodyPr rtlCol="0" anchor="ctr"/>
+            <a:lstStyle/>
+            <a:p>
+              <a:pPr algn="ctr"/>
+              <a:r>
+                <a:rPr lang="en-US" dirty="0"/>
+                <a:t>Random Forest Gini Importance</a:t>
+              </a:r>
+            </a:p>
+          </p:txBody>
+        </p:sp>
+        <p:sp>
+          <p:nvSpPr>
+            <p:cNvPr id="8" name="TextBox 7">
+              <a:extLst>
+                <a:ext uri="{FF2B5EF4-FFF2-40B4-BE49-F238E27FC236}">
+                  <a16:creationId xmlns:a16="http://schemas.microsoft.com/office/drawing/2014/main" id="{EA1B4CEB-E5FC-42E3-8ACD-60EE4CDEC524}"/>
+                </a:ext>
+              </a:extLst>
+            </p:cNvPr>
+            <p:cNvSpPr txBox="1"/>
+            <p:nvPr/>
+          </p:nvSpPr>
+          <p:spPr>
+            <a:xfrm>
+              <a:off x="838200" y="3865880"/>
+              <a:ext cx="10515600" cy="1077218"/>
+            </a:xfrm>
+            <a:prstGeom prst="rect">
+              <a:avLst/>
+            </a:prstGeom>
+            <a:noFill/>
+          </p:spPr>
+          <p:txBody>
+            <a:bodyPr wrap="square" rtlCol="0">
+              <a:spAutoFit/>
+            </a:bodyPr>
+            <a:lstStyle/>
+            <a:p>
+              <a:pPr marL="342900" indent="-342900">
+                <a:buFont typeface="+mj-lt"/>
+                <a:buAutoNum type="arabicPeriod"/>
+              </a:pPr>
+              <a:r>
+                <a:rPr lang="en-US" sz="1600" dirty="0"/>
+                <a:t>Build bootstrapped decision trees, aggregate their predictions and the average decrease in Gini (G) impurity metric where G = sum(</a:t>
+              </a:r>
+              <a:r>
+                <a:rPr lang="en-US" sz="1600" dirty="0" err="1"/>
+                <a:t>i</a:t>
+              </a:r>
+              <a:r>
+                <a:rPr lang="en-US" sz="1600" dirty="0"/>
+                <a:t>=1:k, p</a:t>
+              </a:r>
+              <a:r>
+                <a:rPr lang="en-US" sz="1600" baseline="-25000" dirty="0"/>
+                <a:t>k</a:t>
+              </a:r>
+              <a:r>
+                <a:rPr lang="en-US" sz="1600" dirty="0"/>
+                <a:t> * (1 – p</a:t>
+              </a:r>
+              <a:r>
+                <a:rPr lang="en-US" sz="1600" baseline="-25000" dirty="0"/>
+                <a:t>k</a:t>
+              </a:r>
+              <a:r>
+                <a:rPr lang="en-US" sz="1600" dirty="0"/>
+                <a:t>)); p</a:t>
+              </a:r>
+              <a:r>
+                <a:rPr lang="en-US" sz="1600" baseline="-25000" dirty="0"/>
+                <a:t>k</a:t>
+              </a:r>
+              <a:r>
+                <a:rPr lang="en-US" sz="1600" dirty="0"/>
+                <a:t> = percent of correct predictions after split for class k</a:t>
+              </a:r>
+            </a:p>
+            <a:p>
+              <a:pPr marL="342900" indent="-342900">
+                <a:buFont typeface="+mj-lt"/>
+                <a:buAutoNum type="arabicPeriod"/>
+              </a:pPr>
+              <a:r>
+                <a:rPr lang="en-US" sz="1600" dirty="0"/>
+                <a:t>A larger mean decrease in the Gini metric for a variable indicates more importance to the prediction.</a:t>
+              </a:r>
+            </a:p>
+            <a:p>
+              <a:pPr marL="342900" indent="-342900">
+                <a:buFont typeface="+mj-lt"/>
+                <a:buAutoNum type="arabicPeriod"/>
+              </a:pPr>
+              <a:r>
+                <a:rPr lang="en-US" sz="1600" dirty="0"/>
+                <a:t>Filter the selected variables on importance.</a:t>
+              </a:r>
+            </a:p>
+          </p:txBody>
+        </p:sp>
+      </p:grpSp>
+      <p:grpSp>
+        <p:nvGrpSpPr>
+          <p:cNvPr id="12" name="Group 11">
+            <a:extLst>
+              <a:ext uri="{FF2B5EF4-FFF2-40B4-BE49-F238E27FC236}">
+                <a16:creationId xmlns:a16="http://schemas.microsoft.com/office/drawing/2014/main" id="{4E399A56-74C4-4AA6-820C-AA792791D198}"/>
+              </a:ext>
+            </a:extLst>
+          </p:cNvPr>
+          <p:cNvGrpSpPr/>
+          <p:nvPr/>
+        </p:nvGrpSpPr>
+        <p:grpSpPr>
+          <a:xfrm>
+            <a:off x="838200" y="5237480"/>
+            <a:ext cx="10515600" cy="1306195"/>
+            <a:chOff x="838200" y="5186680"/>
+            <a:chExt cx="10515600" cy="1306195"/>
+          </a:xfrm>
+        </p:grpSpPr>
+        <p:sp>
+          <p:nvSpPr>
+            <p:cNvPr id="6" name="Rectangle: Rounded Corners 5">
+              <a:extLst>
+                <a:ext uri="{FF2B5EF4-FFF2-40B4-BE49-F238E27FC236}">
+                  <a16:creationId xmlns:a16="http://schemas.microsoft.com/office/drawing/2014/main" id="{558BDE75-2A3D-4BC9-B2F5-067B1ED78C37}"/>
+                </a:ext>
+              </a:extLst>
+            </p:cNvPr>
+            <p:cNvSpPr/>
+            <p:nvPr/>
+          </p:nvSpPr>
+          <p:spPr>
+            <a:xfrm>
+              <a:off x="838200" y="5186680"/>
+              <a:ext cx="3235960" cy="447040"/>
+            </a:xfrm>
+            <a:prstGeom prst="roundRect">
+              <a:avLst/>
+            </a:prstGeom>
+            <a:solidFill>
+              <a:srgbClr val="65BBB5"/>
+            </a:solidFill>
+            <a:ln>
+              <a:noFill/>
+            </a:ln>
+          </p:spPr>
+          <p:style>
+            <a:lnRef idx="2">
+              <a:schemeClr val="accent1">
+                <a:shade val="50000"/>
+              </a:schemeClr>
+            </a:lnRef>
+            <a:fillRef idx="1">
+              <a:schemeClr val="accent1"/>
+            </a:fillRef>
+            <a:effectRef idx="0">
+              <a:schemeClr val="accent1"/>
+            </a:effectRef>
+            <a:fontRef idx="minor">
+              <a:schemeClr val="lt1"/>
+            </a:fontRef>
+          </p:style>
+          <p:txBody>
+            <a:bodyPr rtlCol="0" anchor="ctr"/>
+            <a:lstStyle/>
+            <a:p>
+              <a:pPr algn="ctr"/>
+              <a:r>
+                <a:rPr lang="en-US" dirty="0"/>
+                <a:t>Manual Selection</a:t>
+              </a:r>
+            </a:p>
+          </p:txBody>
+        </p:sp>
+        <p:sp>
+          <p:nvSpPr>
+            <p:cNvPr id="9" name="TextBox 8">
+              <a:extLst>
+                <a:ext uri="{FF2B5EF4-FFF2-40B4-BE49-F238E27FC236}">
+                  <a16:creationId xmlns:a16="http://schemas.microsoft.com/office/drawing/2014/main" id="{55AFCBBF-F97C-4D93-AC9F-7DAB5D941FDA}"/>
+                </a:ext>
+              </a:extLst>
+            </p:cNvPr>
+            <p:cNvSpPr txBox="1"/>
+            <p:nvPr/>
+          </p:nvSpPr>
+          <p:spPr>
+            <a:xfrm>
+              <a:off x="838200" y="5661878"/>
+              <a:ext cx="10515600" cy="830997"/>
+            </a:xfrm>
+            <a:prstGeom prst="rect">
+              <a:avLst/>
+            </a:prstGeom>
+            <a:noFill/>
+          </p:spPr>
+          <p:txBody>
+            <a:bodyPr wrap="square" rtlCol="0">
+              <a:spAutoFit/>
+            </a:bodyPr>
+            <a:lstStyle/>
+            <a:p>
+              <a:pPr marL="342900" indent="-342900">
+                <a:buFont typeface="+mj-lt"/>
+                <a:buAutoNum type="arabicPeriod"/>
+              </a:pPr>
+              <a:r>
+                <a:rPr lang="en-US" sz="1600" dirty="0"/>
+                <a:t>Remove variable combinations that are not compatible for interpretation.</a:t>
+              </a:r>
+            </a:p>
+            <a:p>
+              <a:pPr marL="800100" lvl="1" indent="-342900">
+                <a:buFont typeface="+mj-lt"/>
+                <a:buAutoNum type="alphaLcParenR"/>
+              </a:pPr>
+              <a:r>
+                <a:rPr lang="en-US" sz="1600" dirty="0"/>
+                <a:t>For example, Census tract area and county area. Tract area is more specific and relevant to making predictions at the tract level.</a:t>
+              </a:r>
+            </a:p>
+          </p:txBody>
+        </p:sp>
+      </p:grpSp>
+    </p:spTree>
+    <p:extLst>
+      <p:ext uri="{BB962C8B-B14F-4D97-AF65-F5344CB8AC3E}">
+        <p14:creationId xmlns:p14="http://schemas.microsoft.com/office/powerpoint/2010/main" val="1832110288"/>
+      </p:ext>
+    </p:extLst>
+  </p:cSld>
+  <p:clrMapOvr>
+    <a:masterClrMapping/>
+  </p:clrMapOvr>
+</p:sld>
+</file>
+
 <file path=ppt/slides/slide13.xml><?xml version="1.0" encoding="utf-8"?>
 <p:sld xmlns:a="http://schemas.openxmlformats.org/drawingml/2006/main" xmlns:r="http://schemas.openxmlformats.org/officeDocument/2006/relationships" xmlns:p="http://schemas.openxmlformats.org/presentationml/2006/main">
   <p:cSld>
@@ -5336,7 +5793,7 @@
           <p:cNvPr id="2" name="Title 1">
             <a:extLst>
               <a:ext uri="{FF2B5EF4-FFF2-40B4-BE49-F238E27FC236}">
-                <a16:creationId xmlns:a16="http://schemas.microsoft.com/office/drawing/2014/main" id="{4F1ADB0D-0DC8-4F7F-975B-36EA3F9BA718}"/>
+                <a16:creationId xmlns:a16="http://schemas.microsoft.com/office/drawing/2014/main" id="{9A580D3B-F3E1-4158-A7A2-969D06FA46DF}"/>
               </a:ext>
             </a:extLst>
           </p:cNvPr>
@@ -5354,220 +5811,52 @@
           <a:p>
             <a:r>
               <a:rPr lang="en-US" dirty="0"/>
-              <a:t>Feature Selection</a:t>
+              <a:t>Model Comparison: ROC</a:t>
             </a:r>
           </a:p>
         </p:txBody>
       </p:sp>
-      <p:sp>
-        <p:nvSpPr>
-          <p:cNvPr id="3" name="Content Placeholder 2">
-            <a:extLst>
-              <a:ext uri="{FF2B5EF4-FFF2-40B4-BE49-F238E27FC236}">
-                <a16:creationId xmlns:a16="http://schemas.microsoft.com/office/drawing/2014/main" id="{576B576E-655C-4419-A03F-657F12B25F39}"/>
-              </a:ext>
-            </a:extLst>
-          </p:cNvPr>
-          <p:cNvSpPr>
-            <a:spLocks noGrp="1"/>
-          </p:cNvSpPr>
+      <p:pic>
+        <p:nvPicPr>
+          <p:cNvPr id="5" name="Content Placeholder 4">
+            <a:extLst>
+              <a:ext uri="{FF2B5EF4-FFF2-40B4-BE49-F238E27FC236}">
+                <a16:creationId xmlns:a16="http://schemas.microsoft.com/office/drawing/2014/main" id="{AFC5B38A-C4DC-4BFD-9D84-3AE6E2DB38E4}"/>
+              </a:ext>
+            </a:extLst>
+          </p:cNvPr>
+          <p:cNvPicPr>
+            <a:picLocks noGrp="1" noChangeAspect="1"/>
+          </p:cNvPicPr>
           <p:nvPr>
             <p:ph idx="1"/>
           </p:nvPr>
-        </p:nvSpPr>
+        </p:nvPicPr>
+        <p:blipFill>
+          <a:blip r:embed="rId2">
+            <a:extLst>
+              <a:ext uri="{28A0092B-C50C-407E-A947-70E740481C1C}">
+                <a14:useLocalDpi xmlns:a14="http://schemas.microsoft.com/office/drawing/2010/main" val="0"/>
+              </a:ext>
+            </a:extLst>
+          </a:blip>
+          <a:stretch>
+            <a:fillRect/>
+          </a:stretch>
+        </p:blipFill>
         <p:spPr>
           <a:xfrm>
-            <a:off x="838200" y="1346887"/>
-            <a:ext cx="10515600" cy="471754"/>
+            <a:off x="5244920" y="1427480"/>
+            <a:ext cx="6108880" cy="4236403"/>
           </a:xfrm>
         </p:spPr>
-        <p:txBody>
-          <a:bodyPr>
-            <a:normAutofit lnSpcReduction="10000"/>
-          </a:bodyPr>
-          <a:lstStyle/>
-          <a:p>
-            <a:r>
-              <a:rPr lang="en-US" dirty="0"/>
-              <a:t>Multiple feature selection processes were performed.</a:t>
-            </a:r>
-          </a:p>
-          <a:p>
-            <a:endParaRPr lang="en-US" dirty="0"/>
-          </a:p>
-        </p:txBody>
-      </p:sp>
+      </p:pic>
       <p:sp>
         <p:nvSpPr>
-          <p:cNvPr id="4" name="Rectangle: Rounded Corners 3">
-            <a:extLst>
-              <a:ext uri="{FF2B5EF4-FFF2-40B4-BE49-F238E27FC236}">
-                <a16:creationId xmlns:a16="http://schemas.microsoft.com/office/drawing/2014/main" id="{72AC708C-14B7-4344-8955-704F511DCE07}"/>
-              </a:ext>
-            </a:extLst>
-          </p:cNvPr>
-          <p:cNvSpPr/>
-          <p:nvPr/>
-        </p:nvSpPr>
-        <p:spPr>
-          <a:xfrm>
-            <a:off x="838200" y="2037533"/>
-            <a:ext cx="3235960" cy="447040"/>
-          </a:xfrm>
-          <a:prstGeom prst="roundRect">
-            <a:avLst/>
-          </a:prstGeom>
-          <a:solidFill>
-            <a:srgbClr val="65BBB5"/>
-          </a:solidFill>
-          <a:ln>
-            <a:noFill/>
-          </a:ln>
-        </p:spPr>
-        <p:style>
-          <a:lnRef idx="2">
-            <a:schemeClr val="accent1">
-              <a:shade val="50000"/>
-            </a:schemeClr>
-          </a:lnRef>
-          <a:fillRef idx="1">
-            <a:schemeClr val="accent1"/>
-          </a:fillRef>
-          <a:effectRef idx="0">
-            <a:schemeClr val="accent1"/>
-          </a:effectRef>
-          <a:fontRef idx="minor">
-            <a:schemeClr val="lt1"/>
-          </a:fontRef>
-        </p:style>
-        <p:txBody>
-          <a:bodyPr rtlCol="0" anchor="ctr"/>
-          <a:lstStyle/>
-          <a:p>
-            <a:pPr algn="ctr"/>
-            <a:r>
-              <a:rPr lang="en-US" dirty="0"/>
-              <a:t>Univariate Logistic Regression</a:t>
-            </a:r>
-          </a:p>
-        </p:txBody>
-      </p:sp>
-      <p:sp>
-        <p:nvSpPr>
-          <p:cNvPr id="5" name="Rectangle: Rounded Corners 4">
-            <a:extLst>
-              <a:ext uri="{FF2B5EF4-FFF2-40B4-BE49-F238E27FC236}">
-                <a16:creationId xmlns:a16="http://schemas.microsoft.com/office/drawing/2014/main" id="{A717F7A1-389E-45ED-B93A-73DC1ACE1E2C}"/>
-              </a:ext>
-            </a:extLst>
-          </p:cNvPr>
-          <p:cNvSpPr/>
-          <p:nvPr/>
-        </p:nvSpPr>
-        <p:spPr>
-          <a:xfrm>
-            <a:off x="838200" y="3601720"/>
-            <a:ext cx="3235960" cy="447040"/>
-          </a:xfrm>
-          <a:prstGeom prst="roundRect">
-            <a:avLst/>
-          </a:prstGeom>
-          <a:solidFill>
-            <a:srgbClr val="65BBB5"/>
-          </a:solidFill>
-          <a:ln>
-            <a:noFill/>
-          </a:ln>
-        </p:spPr>
-        <p:style>
-          <a:lnRef idx="2">
-            <a:schemeClr val="accent1">
-              <a:shade val="50000"/>
-            </a:schemeClr>
-          </a:lnRef>
-          <a:fillRef idx="1">
-            <a:schemeClr val="accent1"/>
-          </a:fillRef>
-          <a:effectRef idx="0">
-            <a:schemeClr val="accent1"/>
-          </a:effectRef>
-          <a:fontRef idx="minor">
-            <a:schemeClr val="lt1"/>
-          </a:fontRef>
-        </p:style>
-        <p:txBody>
-          <a:bodyPr rtlCol="0" anchor="ctr"/>
-          <a:lstStyle/>
-          <a:p>
-            <a:pPr algn="ctr"/>
-            <a:r>
-              <a:rPr lang="en-US" dirty="0"/>
-              <a:t>Random Forest Gini Importance</a:t>
-            </a:r>
-          </a:p>
-        </p:txBody>
-      </p:sp>
-      <p:sp>
-        <p:nvSpPr>
-          <p:cNvPr id="6" name="Rectangle: Rounded Corners 5">
-            <a:extLst>
-              <a:ext uri="{FF2B5EF4-FFF2-40B4-BE49-F238E27FC236}">
-                <a16:creationId xmlns:a16="http://schemas.microsoft.com/office/drawing/2014/main" id="{558BDE75-2A3D-4BC9-B2F5-067B1ED78C37}"/>
-              </a:ext>
-            </a:extLst>
-          </p:cNvPr>
-          <p:cNvSpPr/>
-          <p:nvPr/>
-        </p:nvSpPr>
-        <p:spPr>
-          <a:xfrm>
-            <a:off x="838200" y="5247640"/>
-            <a:ext cx="3235960" cy="447040"/>
-          </a:xfrm>
-          <a:prstGeom prst="roundRect">
-            <a:avLst/>
-          </a:prstGeom>
-          <a:solidFill>
-            <a:srgbClr val="65BBB5"/>
-          </a:solidFill>
-          <a:ln>
-            <a:noFill/>
-          </a:ln>
-        </p:spPr>
-        <p:style>
-          <a:lnRef idx="2">
-            <a:schemeClr val="accent1">
-              <a:shade val="50000"/>
-            </a:schemeClr>
-          </a:lnRef>
-          <a:fillRef idx="1">
-            <a:schemeClr val="accent1"/>
-          </a:fillRef>
-          <a:effectRef idx="0">
-            <a:schemeClr val="accent1"/>
-          </a:effectRef>
-          <a:fontRef idx="minor">
-            <a:schemeClr val="lt1"/>
-          </a:fontRef>
-        </p:style>
-        <p:txBody>
-          <a:bodyPr rtlCol="0" anchor="ctr"/>
-          <a:lstStyle/>
-          <a:p>
-            <a:pPr algn="ctr"/>
-            <a:r>
-              <a:rPr lang="en-US" dirty="0"/>
-              <a:t>Manual Selection</a:t>
-            </a:r>
-          </a:p>
-        </p:txBody>
-      </p:sp>
-      <p:sp>
-        <p:nvSpPr>
-          <p:cNvPr id="7" name="TextBox 6">
-            <a:extLst>
-              <a:ext uri="{FF2B5EF4-FFF2-40B4-BE49-F238E27FC236}">
-                <a16:creationId xmlns:a16="http://schemas.microsoft.com/office/drawing/2014/main" id="{DAFA7CBC-3041-4A66-80C2-30325073E156}"/>
+          <p:cNvPr id="6" name="TextBox 5">
+            <a:extLst>
+              <a:ext uri="{FF2B5EF4-FFF2-40B4-BE49-F238E27FC236}">
+                <a16:creationId xmlns:a16="http://schemas.microsoft.com/office/drawing/2014/main" id="{F0CE7A3D-1AB9-44AE-8647-B44BF2F09D0E}"/>
               </a:ext>
             </a:extLst>
           </p:cNvPr>
@@ -5576,8 +5865,8 @@
         </p:nvSpPr>
         <p:spPr>
           <a:xfrm>
-            <a:off x="838200" y="2560321"/>
-            <a:ext cx="10515600" cy="923330"/>
+            <a:off x="838200" y="1427480"/>
+            <a:ext cx="3723640" cy="4524315"/>
           </a:xfrm>
           <a:prstGeom prst="rect">
             <a:avLst/>
@@ -5590,129 +5879,197 @@
           </a:bodyPr>
           <a:lstStyle/>
           <a:p>
-            <a:pPr marL="342900" indent="-342900">
-              <a:buFont typeface="+mj-lt"/>
-              <a:buAutoNum type="arabicPeriod"/>
-            </a:pPr>
-            <a:r>
-              <a:rPr lang="en-US" dirty="0"/>
-              <a:t>Build a univariate logistic regression for each potential predictor i.e. P(</a:t>
-            </a:r>
-            <a:r>
-              <a:rPr lang="en-US" dirty="0" err="1"/>
-              <a:t>food_desert</a:t>
-            </a:r>
-            <a:r>
-              <a:rPr lang="en-US" dirty="0"/>
-              <a:t>) = logit(B</a:t>
-            </a:r>
-            <a:r>
-              <a:rPr lang="en-US" baseline="-25000" dirty="0"/>
-              <a:t>0</a:t>
-            </a:r>
-            <a:r>
-              <a:rPr lang="en-US" dirty="0"/>
-              <a:t> + B</a:t>
-            </a:r>
-            <a:r>
-              <a:rPr lang="en-US" baseline="-25000" dirty="0"/>
-              <a:t>1</a:t>
-            </a:r>
-            <a:r>
-              <a:rPr lang="en-US" dirty="0"/>
-              <a:t>x).</a:t>
-            </a:r>
-          </a:p>
-          <a:p>
-            <a:pPr marL="342900" indent="-342900">
-              <a:buFont typeface="+mj-lt"/>
-              <a:buAutoNum type="arabicPeriod"/>
-            </a:pPr>
-            <a:r>
-              <a:rPr lang="en-US" dirty="0"/>
-              <a:t>Gather the variables’ coefficients and significance level in univariate models.</a:t>
-            </a:r>
-          </a:p>
-          <a:p>
-            <a:pPr marL="342900" indent="-342900">
-              <a:buFont typeface="+mj-lt"/>
-              <a:buAutoNum type="arabicPeriod"/>
-            </a:pPr>
-            <a:r>
-              <a:rPr lang="en-US" dirty="0"/>
-              <a:t>Filter the selected variables on significance level.</a:t>
+            <a:r>
+              <a:rPr lang="en-US" sz="1600" dirty="0"/>
+              <a:t>ROC Curves are the primary method for evaluating binary prediction variables.</a:t>
+            </a:r>
+          </a:p>
+          <a:p>
+            <a:endParaRPr lang="en-US" sz="1600" dirty="0"/>
+          </a:p>
+          <a:p>
+            <a:r>
+              <a:rPr lang="en-US" sz="1600" b="1" dirty="0"/>
+              <a:t>X-axis: False Positive Rate: </a:t>
+            </a:r>
+            <a:r>
+              <a:rPr lang="en-US" sz="1600" dirty="0"/>
+              <a:t>The percent of tracts incorrectly predicted as a food desert (“false alarm”).</a:t>
+            </a:r>
+          </a:p>
+          <a:p>
+            <a:endParaRPr lang="en-US" sz="1600" dirty="0"/>
+          </a:p>
+          <a:p>
+            <a:r>
+              <a:rPr lang="en-US" sz="1600" b="1" dirty="0"/>
+              <a:t>Y-axis: True Positive Rate: </a:t>
+            </a:r>
+            <a:r>
+              <a:rPr lang="en-US" sz="1600" dirty="0"/>
+              <a:t>The percent of tracts correctly predicted as a food desert.</a:t>
+            </a:r>
+          </a:p>
+          <a:p>
+            <a:endParaRPr lang="en-US" sz="1600" dirty="0"/>
+          </a:p>
+          <a:p>
+            <a:r>
+              <a:rPr lang="en-US" sz="1600" dirty="0"/>
+              <a:t>The area under the curve (AUC) for the Random Forest (k = 50) is 0.91, signaling strong performance on the test set.</a:t>
+            </a:r>
+          </a:p>
+          <a:p>
+            <a:endParaRPr lang="en-US" sz="1600" dirty="0"/>
+          </a:p>
+          <a:p>
+            <a:r>
+              <a:rPr lang="en-US" sz="1600" dirty="0"/>
+              <a:t>Random Forest (k = 50) recalls &gt;50% of the food deserts within the first 10% of the data. This indicates it is doing very well at giving food deserts high scores.</a:t>
             </a:r>
           </a:p>
         </p:txBody>
       </p:sp>
-      <p:sp>
-        <p:nvSpPr>
-          <p:cNvPr id="8" name="TextBox 7">
-            <a:extLst>
-              <a:ext uri="{FF2B5EF4-FFF2-40B4-BE49-F238E27FC236}">
-                <a16:creationId xmlns:a16="http://schemas.microsoft.com/office/drawing/2014/main" id="{EA1B4CEB-E5FC-42E3-8ACD-60EE4CDEC524}"/>
-              </a:ext>
-            </a:extLst>
-          </p:cNvPr>
-          <p:cNvSpPr txBox="1"/>
+      <p:grpSp>
+        <p:nvGrpSpPr>
+          <p:cNvPr id="7" name="Group 6">
+            <a:extLst>
+              <a:ext uri="{FF2B5EF4-FFF2-40B4-BE49-F238E27FC236}">
+                <a16:creationId xmlns:a16="http://schemas.microsoft.com/office/drawing/2014/main" id="{68CA8FE3-0373-4AE8-9674-AB411144385C}"/>
+              </a:ext>
+            </a:extLst>
+          </p:cNvPr>
+          <p:cNvGrpSpPr/>
           <p:nvPr/>
-        </p:nvSpPr>
-        <p:spPr>
+        </p:nvGrpSpPr>
+        <p:grpSpPr>
           <a:xfrm>
-            <a:off x="838200" y="4130655"/>
-            <a:ext cx="10515600" cy="923330"/>
+            <a:off x="7630160" y="5746832"/>
+            <a:ext cx="3723640" cy="809599"/>
+            <a:chOff x="833120" y="3719051"/>
+            <a:chExt cx="10515600" cy="293280"/>
           </a:xfrm>
-          <a:prstGeom prst="rect">
-            <a:avLst/>
-          </a:prstGeom>
-          <a:noFill/>
-        </p:spPr>
-        <p:txBody>
-          <a:bodyPr wrap="square" rtlCol="0">
-            <a:spAutoFit/>
-          </a:bodyPr>
-          <a:lstStyle/>
-          <a:p>
-            <a:pPr marL="342900" indent="-342900">
-              <a:buFont typeface="+mj-lt"/>
-              <a:buAutoNum type="arabicPeriod"/>
-            </a:pPr>
-            <a:r>
-              <a:rPr lang="en-US" dirty="0"/>
-              <a:t>Build bootstrapped decision trees, aggregate their predictions and </a:t>
-            </a:r>
-            <a:r>
-              <a:rPr lang="en-US"/>
-              <a:t>model variable.</a:t>
-            </a:r>
-            <a:endParaRPr lang="en-US" dirty="0"/>
-          </a:p>
-          <a:p>
-            <a:pPr marL="342900" indent="-342900">
-              <a:buFont typeface="+mj-lt"/>
-              <a:buAutoNum type="arabicPeriod"/>
-            </a:pPr>
-            <a:r>
-              <a:rPr lang="en-US" dirty="0"/>
-              <a:t>Gather the variables’ coefficients and significance level in univariate models.</a:t>
-            </a:r>
-          </a:p>
-          <a:p>
-            <a:pPr marL="342900" indent="-342900">
-              <a:buFont typeface="+mj-lt"/>
-              <a:buAutoNum type="arabicPeriod"/>
-            </a:pPr>
-            <a:r>
-              <a:rPr lang="en-US" dirty="0"/>
-              <a:t>Filter the selected variables on significance level.</a:t>
-            </a:r>
-          </a:p>
-        </p:txBody>
-      </p:sp>
+        </p:grpSpPr>
+        <p:sp>
+          <p:nvSpPr>
+            <p:cNvPr id="8" name="Rectangle: Rounded Corners 7">
+              <a:extLst>
+                <a:ext uri="{FF2B5EF4-FFF2-40B4-BE49-F238E27FC236}">
+                  <a16:creationId xmlns:a16="http://schemas.microsoft.com/office/drawing/2014/main" id="{F17C258A-4099-4136-AFF4-2F14A4F4E9FF}"/>
+                </a:ext>
+              </a:extLst>
+            </p:cNvPr>
+            <p:cNvSpPr/>
+            <p:nvPr/>
+          </p:nvSpPr>
+          <p:spPr>
+            <a:xfrm>
+              <a:off x="833120" y="3719051"/>
+              <a:ext cx="10515600" cy="257525"/>
+            </a:xfrm>
+            <a:prstGeom prst="roundRect">
+              <a:avLst/>
+            </a:prstGeom>
+            <a:solidFill>
+              <a:srgbClr val="FFFFFF"/>
+            </a:solidFill>
+            <a:ln w="19050">
+              <a:solidFill>
+                <a:srgbClr val="65BBB5"/>
+              </a:solidFill>
+            </a:ln>
+          </p:spPr>
+          <p:style>
+            <a:lnRef idx="2">
+              <a:schemeClr val="accent1">
+                <a:shade val="50000"/>
+              </a:schemeClr>
+            </a:lnRef>
+            <a:fillRef idx="1">
+              <a:schemeClr val="accent1"/>
+            </a:fillRef>
+            <a:effectRef idx="0">
+              <a:schemeClr val="accent1"/>
+            </a:effectRef>
+            <a:fontRef idx="minor">
+              <a:schemeClr val="lt1"/>
+            </a:fontRef>
+          </p:style>
+          <p:txBody>
+            <a:bodyPr rtlCol="0" anchor="ctr"/>
+            <a:lstStyle/>
+            <a:p>
+              <a:r>
+                <a:rPr lang="en-US" sz="1800" dirty="0">
+                  <a:solidFill>
+                    <a:schemeClr val="tx1"/>
+                  </a:solidFill>
+                </a:rPr>
+                <a:t>Real-world performance is not guaranteed.</a:t>
+              </a:r>
+            </a:p>
+          </p:txBody>
+        </p:sp>
+        <p:sp>
+          <p:nvSpPr>
+            <p:cNvPr id="9" name="Rectangle: Rounded Corners 8">
+              <a:extLst>
+                <a:ext uri="{FF2B5EF4-FFF2-40B4-BE49-F238E27FC236}">
+                  <a16:creationId xmlns:a16="http://schemas.microsoft.com/office/drawing/2014/main" id="{4C5673FD-B372-467E-B7B0-CA0879774B37}"/>
+                </a:ext>
+              </a:extLst>
+            </p:cNvPr>
+            <p:cNvSpPr/>
+            <p:nvPr/>
+          </p:nvSpPr>
+          <p:spPr>
+            <a:xfrm>
+              <a:off x="5311315" y="3940820"/>
+              <a:ext cx="5395770" cy="71511"/>
+            </a:xfrm>
+            <a:prstGeom prst="roundRect">
+              <a:avLst/>
+            </a:prstGeom>
+            <a:solidFill>
+              <a:srgbClr val="65BBB5"/>
+            </a:solidFill>
+            <a:ln>
+              <a:noFill/>
+            </a:ln>
+          </p:spPr>
+          <p:style>
+            <a:lnRef idx="2">
+              <a:schemeClr val="accent1">
+                <a:shade val="50000"/>
+              </a:schemeClr>
+            </a:lnRef>
+            <a:fillRef idx="1">
+              <a:schemeClr val="accent1"/>
+            </a:fillRef>
+            <a:effectRef idx="0">
+              <a:schemeClr val="accent1"/>
+            </a:effectRef>
+            <a:fontRef idx="minor">
+              <a:schemeClr val="lt1"/>
+            </a:fontRef>
+          </p:style>
+          <p:txBody>
+            <a:bodyPr rtlCol="0" anchor="ctr"/>
+            <a:lstStyle/>
+            <a:p>
+              <a:pPr algn="ctr"/>
+              <a:r>
+                <a:rPr lang="en-US" b="1" dirty="0"/>
+                <a:t>Note</a:t>
+              </a:r>
+            </a:p>
+          </p:txBody>
+        </p:sp>
+      </p:grpSp>
     </p:spTree>
     <p:extLst>
       <p:ext uri="{BB962C8B-B14F-4D97-AF65-F5344CB8AC3E}">
-        <p14:creationId xmlns:p14="http://schemas.microsoft.com/office/powerpoint/2010/main" val="1832110288"/>
+        <p14:creationId xmlns:p14="http://schemas.microsoft.com/office/powerpoint/2010/main" val="2603264690"/>
       </p:ext>
     </p:extLst>
   </p:cSld>
@@ -5762,40 +6119,558 @@
           <a:p>
             <a:r>
               <a:rPr lang="en-US" dirty="0"/>
-              <a:t>Model Comparison</a:t>
+              <a:t>Model Comparison: Tradeoffs</a:t>
             </a:r>
           </a:p>
         </p:txBody>
       </p:sp>
-      <p:sp>
-        <p:nvSpPr>
-          <p:cNvPr id="3" name="Content Placeholder 2">
-            <a:extLst>
-              <a:ext uri="{FF2B5EF4-FFF2-40B4-BE49-F238E27FC236}">
-                <a16:creationId xmlns:a16="http://schemas.microsoft.com/office/drawing/2014/main" id="{9EF37130-3D6C-46A7-AD85-F2B5109C3CB4}"/>
-              </a:ext>
-            </a:extLst>
-          </p:cNvPr>
-          <p:cNvSpPr>
-            <a:spLocks noGrp="1"/>
-          </p:cNvSpPr>
+      <p:graphicFrame>
+        <p:nvGraphicFramePr>
+          <p:cNvPr id="10" name="Table 4">
+            <a:extLst>
+              <a:ext uri="{FF2B5EF4-FFF2-40B4-BE49-F238E27FC236}">
+                <a16:creationId xmlns:a16="http://schemas.microsoft.com/office/drawing/2014/main" id="{0F6379F0-D27D-493C-99F5-6C63972FE981}"/>
+              </a:ext>
+            </a:extLst>
+          </p:cNvPr>
+          <p:cNvGraphicFramePr>
+            <a:graphicFrameLocks noGrp="1"/>
+          </p:cNvGraphicFramePr>
           <p:nvPr>
-            <p:ph idx="1"/>
+            <p:extLst>
+              <p:ext uri="{D42A27DB-BD31-4B8C-83A1-F6EECF244321}">
+                <p14:modId xmlns:p14="http://schemas.microsoft.com/office/powerpoint/2010/main" val="913244010"/>
+              </p:ext>
+            </p:extLst>
           </p:nvPr>
-        </p:nvSpPr>
-        <p:spPr/>
-        <p:txBody>
-          <a:bodyPr/>
-          <a:lstStyle/>
-          <a:p>
-            <a:endParaRPr lang="en-US"/>
-          </a:p>
-        </p:txBody>
-      </p:sp>
+        </p:nvGraphicFramePr>
+        <p:xfrm>
+          <a:off x="3342640" y="1729740"/>
+          <a:ext cx="5506720" cy="4307840"/>
+        </p:xfrm>
+        <a:graphic>
+          <a:graphicData uri="http://schemas.openxmlformats.org/drawingml/2006/table">
+            <a:tbl>
+              <a:tblPr firstRow="1" bandRow="1">
+                <a:tableStyleId>{5C22544A-7EE6-4342-B048-85BDC9FD1C3A}</a:tableStyleId>
+              </a:tblPr>
+              <a:tblGrid>
+                <a:gridCol w="2753360">
+                  <a:extLst>
+                    <a:ext uri="{9D8B030D-6E8A-4147-A177-3AD203B41FA5}">
+                      <a16:colId xmlns:a16="http://schemas.microsoft.com/office/drawing/2014/main" val="776674775"/>
+                    </a:ext>
+                  </a:extLst>
+                </a:gridCol>
+                <a:gridCol w="2753360">
+                  <a:extLst>
+                    <a:ext uri="{9D8B030D-6E8A-4147-A177-3AD203B41FA5}">
+                      <a16:colId xmlns:a16="http://schemas.microsoft.com/office/drawing/2014/main" val="174275217"/>
+                    </a:ext>
+                  </a:extLst>
+                </a:gridCol>
+              </a:tblGrid>
+              <a:tr h="370840">
+                <a:tc gridSpan="2">
+                  <a:txBody>
+                    <a:bodyPr/>
+                    <a:lstStyle/>
+                    <a:p>
+                      <a:pPr algn="ctr"/>
+                      <a:r>
+                        <a:rPr lang="en-US" dirty="0">
+                          <a:solidFill>
+                            <a:srgbClr val="4B4B4B"/>
+                          </a:solidFill>
+                        </a:rPr>
+                        <a:t>Model Comparison</a:t>
+                      </a:r>
+                    </a:p>
+                  </a:txBody>
+                  <a:tcPr>
+                    <a:lnL w="12700" cap="flat" cmpd="sng" algn="ctr">
+                      <a:noFill/>
+                      <a:prstDash val="solid"/>
+                      <a:round/>
+                      <a:headEnd type="none" w="med" len="med"/>
+                      <a:tailEnd type="none" w="med" len="med"/>
+                    </a:lnL>
+                    <a:lnR w="12700" cap="flat" cmpd="sng" algn="ctr">
+                      <a:noFill/>
+                      <a:prstDash val="solid"/>
+                      <a:round/>
+                      <a:headEnd type="none" w="med" len="med"/>
+                      <a:tailEnd type="none" w="med" len="med"/>
+                    </a:lnR>
+                    <a:lnT w="12700" cap="flat" cmpd="sng" algn="ctr">
+                      <a:noFill/>
+                      <a:prstDash val="solid"/>
+                      <a:round/>
+                      <a:headEnd type="none" w="med" len="med"/>
+                      <a:tailEnd type="none" w="med" len="med"/>
+                    </a:lnT>
+                    <a:lnB w="12700" cap="flat" cmpd="sng" algn="ctr">
+                      <a:solidFill>
+                        <a:srgbClr val="65BBB5"/>
+                      </a:solidFill>
+                      <a:prstDash val="solid"/>
+                      <a:round/>
+                      <a:headEnd type="none" w="med" len="med"/>
+                      <a:tailEnd type="none" w="med" len="med"/>
+                    </a:lnB>
+                    <a:solidFill>
+                      <a:srgbClr val="F4F4F4"/>
+                    </a:solidFill>
+                  </a:tcPr>
+                </a:tc>
+                <a:tc hMerge="1">
+                  <a:txBody>
+                    <a:bodyPr/>
+                    <a:lstStyle/>
+                    <a:p>
+                      <a:pPr algn="ctr"/>
+                      <a:endParaRPr lang="en-US" dirty="0"/>
+                    </a:p>
+                  </a:txBody>
+                  <a:tcPr>
+                    <a:lnL w="12700" cap="flat" cmpd="sng" algn="ctr">
+                      <a:solidFill>
+                        <a:srgbClr val="65BBB5"/>
+                      </a:solidFill>
+                      <a:prstDash val="solid"/>
+                      <a:round/>
+                      <a:headEnd type="none" w="med" len="med"/>
+                      <a:tailEnd type="none" w="med" len="med"/>
+                    </a:lnL>
+                    <a:solidFill>
+                      <a:srgbClr val="65BBB5"/>
+                    </a:solidFill>
+                  </a:tcPr>
+                </a:tc>
+                <a:extLst>
+                  <a:ext uri="{0D108BD9-81ED-4DB2-BD59-A6C34878D82A}">
+                    <a16:rowId xmlns:a16="http://schemas.microsoft.com/office/drawing/2014/main" val="3212175000"/>
+                  </a:ext>
+                </a:extLst>
+              </a:tr>
+              <a:tr h="370840">
+                <a:tc>
+                  <a:txBody>
+                    <a:bodyPr/>
+                    <a:lstStyle/>
+                    <a:p>
+                      <a:pPr algn="ctr"/>
+                      <a:r>
+                        <a:rPr lang="en-US" dirty="0">
+                          <a:solidFill>
+                            <a:schemeClr val="bg1"/>
+                          </a:solidFill>
+                        </a:rPr>
+                        <a:t>Logistic Regression</a:t>
+                      </a:r>
+                    </a:p>
+                  </a:txBody>
+                  <a:tcPr>
+                    <a:lnL w="12700" cap="flat" cmpd="sng" algn="ctr">
+                      <a:noFill/>
+                      <a:prstDash val="solid"/>
+                      <a:round/>
+                      <a:headEnd type="none" w="med" len="med"/>
+                      <a:tailEnd type="none" w="med" len="med"/>
+                    </a:lnL>
+                    <a:lnR w="12700" cap="flat" cmpd="sng" algn="ctr">
+                      <a:solidFill>
+                        <a:srgbClr val="65BBB5"/>
+                      </a:solidFill>
+                      <a:prstDash val="solid"/>
+                      <a:round/>
+                      <a:headEnd type="none" w="med" len="med"/>
+                      <a:tailEnd type="none" w="med" len="med"/>
+                    </a:lnR>
+                    <a:lnT w="12700" cap="flat" cmpd="sng" algn="ctr">
+                      <a:solidFill>
+                        <a:srgbClr val="65BBB5"/>
+                      </a:solidFill>
+                      <a:prstDash val="solid"/>
+                      <a:round/>
+                      <a:headEnd type="none" w="med" len="med"/>
+                      <a:tailEnd type="none" w="med" len="med"/>
+                    </a:lnT>
+                    <a:solidFill>
+                      <a:srgbClr val="65BBB5"/>
+                    </a:solidFill>
+                  </a:tcPr>
+                </a:tc>
+                <a:tc>
+                  <a:txBody>
+                    <a:bodyPr/>
+                    <a:lstStyle/>
+                    <a:p>
+                      <a:pPr algn="ctr"/>
+                      <a:r>
+                        <a:rPr lang="en-US" dirty="0">
+                          <a:solidFill>
+                            <a:schemeClr val="bg1"/>
+                          </a:solidFill>
+                        </a:rPr>
+                        <a:t>Random Forest</a:t>
+                      </a:r>
+                    </a:p>
+                  </a:txBody>
+                  <a:tcPr>
+                    <a:lnL w="12700" cap="flat" cmpd="sng" algn="ctr">
+                      <a:solidFill>
+                        <a:srgbClr val="65BBB5"/>
+                      </a:solidFill>
+                      <a:prstDash val="solid"/>
+                      <a:round/>
+                      <a:headEnd type="none" w="med" len="med"/>
+                      <a:tailEnd type="none" w="med" len="med"/>
+                    </a:lnL>
+                    <a:lnR w="12700" cap="flat" cmpd="sng" algn="ctr">
+                      <a:noFill/>
+                      <a:prstDash val="solid"/>
+                      <a:round/>
+                      <a:headEnd type="none" w="med" len="med"/>
+                      <a:tailEnd type="none" w="med" len="med"/>
+                    </a:lnR>
+                    <a:lnT w="12700" cap="flat" cmpd="sng" algn="ctr">
+                      <a:solidFill>
+                        <a:srgbClr val="65BBB5"/>
+                      </a:solidFill>
+                      <a:prstDash val="solid"/>
+                      <a:round/>
+                      <a:headEnd type="none" w="med" len="med"/>
+                      <a:tailEnd type="none" w="med" len="med"/>
+                    </a:lnT>
+                    <a:solidFill>
+                      <a:srgbClr val="65BBB5"/>
+                    </a:solidFill>
+                  </a:tcPr>
+                </a:tc>
+                <a:extLst>
+                  <a:ext uri="{0D108BD9-81ED-4DB2-BD59-A6C34878D82A}">
+                    <a16:rowId xmlns:a16="http://schemas.microsoft.com/office/drawing/2014/main" val="1895596632"/>
+                  </a:ext>
+                </a:extLst>
+              </a:tr>
+              <a:tr h="370840">
+                <a:tc>
+                  <a:txBody>
+                    <a:bodyPr/>
+                    <a:lstStyle/>
+                    <a:p>
+                      <a:r>
+                        <a:rPr lang="en-US" sz="1800" dirty="0"/>
+                        <a:t>Variable effects on food desert designation are interpretable. Coefficients give the direction and magnitude.</a:t>
+                      </a:r>
+                    </a:p>
+                  </a:txBody>
+                  <a:tcPr>
+                    <a:lnL w="12700" cap="flat" cmpd="sng" algn="ctr">
+                      <a:noFill/>
+                      <a:prstDash val="solid"/>
+                      <a:round/>
+                      <a:headEnd type="none" w="med" len="med"/>
+                      <a:tailEnd type="none" w="med" len="med"/>
+                    </a:lnL>
+                    <a:lnR w="12700" cap="flat" cmpd="sng" algn="ctr">
+                      <a:solidFill>
+                        <a:srgbClr val="65BBB5"/>
+                      </a:solidFill>
+                      <a:prstDash val="solid"/>
+                      <a:round/>
+                      <a:headEnd type="none" w="med" len="med"/>
+                      <a:tailEnd type="none" w="med" len="med"/>
+                    </a:lnR>
+                    <a:lnB w="12700" cap="flat" cmpd="sng" algn="ctr">
+                      <a:solidFill>
+                        <a:srgbClr val="65BBB5"/>
+                      </a:solidFill>
+                      <a:prstDash val="solid"/>
+                      <a:round/>
+                      <a:headEnd type="none" w="med" len="med"/>
+                      <a:tailEnd type="none" w="med" len="med"/>
+                    </a:lnB>
+                    <a:solidFill>
+                      <a:schemeClr val="bg1"/>
+                    </a:solidFill>
+                  </a:tcPr>
+                </a:tc>
+                <a:tc>
+                  <a:txBody>
+                    <a:bodyPr/>
+                    <a:lstStyle/>
+                    <a:p>
+                      <a:r>
+                        <a:rPr lang="en-US" sz="1800" b="0" dirty="0"/>
+                        <a:t>Somewhat interpretable. A single decision tree is interpretable. </a:t>
+                      </a:r>
+                    </a:p>
+                  </a:txBody>
+                  <a:tcPr>
+                    <a:lnL w="12700" cap="flat" cmpd="sng" algn="ctr">
+                      <a:solidFill>
+                        <a:srgbClr val="65BBB5"/>
+                      </a:solidFill>
+                      <a:prstDash val="solid"/>
+                      <a:round/>
+                      <a:headEnd type="none" w="med" len="med"/>
+                      <a:tailEnd type="none" w="med" len="med"/>
+                    </a:lnL>
+                    <a:lnR w="12700" cap="flat" cmpd="sng" algn="ctr">
+                      <a:noFill/>
+                      <a:prstDash val="solid"/>
+                      <a:round/>
+                      <a:headEnd type="none" w="med" len="med"/>
+                      <a:tailEnd type="none" w="med" len="med"/>
+                    </a:lnR>
+                    <a:lnB w="12700" cap="flat" cmpd="sng" algn="ctr">
+                      <a:solidFill>
+                        <a:srgbClr val="65BBB5"/>
+                      </a:solidFill>
+                      <a:prstDash val="solid"/>
+                      <a:round/>
+                      <a:headEnd type="none" w="med" len="med"/>
+                      <a:tailEnd type="none" w="med" len="med"/>
+                    </a:lnB>
+                    <a:solidFill>
+                      <a:schemeClr val="bg1"/>
+                    </a:solidFill>
+                  </a:tcPr>
+                </a:tc>
+                <a:extLst>
+                  <a:ext uri="{0D108BD9-81ED-4DB2-BD59-A6C34878D82A}">
+                    <a16:rowId xmlns:a16="http://schemas.microsoft.com/office/drawing/2014/main" val="2175959547"/>
+                  </a:ext>
+                </a:extLst>
+              </a:tr>
+              <a:tr h="370840">
+                <a:tc>
+                  <a:txBody>
+                    <a:bodyPr/>
+                    <a:lstStyle/>
+                    <a:p>
+                      <a:r>
+                        <a:rPr lang="en-US" sz="1800" dirty="0"/>
+                        <a:t>Only finds linear relationships, so non-linear information will not be used without more tweaking.</a:t>
+                      </a:r>
+                    </a:p>
+                  </a:txBody>
+                  <a:tcPr>
+                    <a:lnL w="12700" cap="flat" cmpd="sng" algn="ctr">
+                      <a:noFill/>
+                      <a:prstDash val="solid"/>
+                      <a:round/>
+                      <a:headEnd type="none" w="med" len="med"/>
+                      <a:tailEnd type="none" w="med" len="med"/>
+                    </a:lnL>
+                    <a:lnR w="12700" cap="flat" cmpd="sng" algn="ctr">
+                      <a:solidFill>
+                        <a:srgbClr val="65BBB5"/>
+                      </a:solidFill>
+                      <a:prstDash val="solid"/>
+                      <a:round/>
+                      <a:headEnd type="none" w="med" len="med"/>
+                      <a:tailEnd type="none" w="med" len="med"/>
+                    </a:lnR>
+                    <a:lnT w="12700" cap="flat" cmpd="sng" algn="ctr">
+                      <a:solidFill>
+                        <a:srgbClr val="65BBB5"/>
+                      </a:solidFill>
+                      <a:prstDash val="solid"/>
+                      <a:round/>
+                      <a:headEnd type="none" w="med" len="med"/>
+                      <a:tailEnd type="none" w="med" len="med"/>
+                    </a:lnT>
+                    <a:lnB w="12700" cap="flat" cmpd="sng" algn="ctr">
+                      <a:solidFill>
+                        <a:srgbClr val="65BBB5"/>
+                      </a:solidFill>
+                      <a:prstDash val="solid"/>
+                      <a:round/>
+                      <a:headEnd type="none" w="med" len="med"/>
+                      <a:tailEnd type="none" w="med" len="med"/>
+                    </a:lnB>
+                    <a:solidFill>
+                      <a:schemeClr val="bg1"/>
+                    </a:solidFill>
+                  </a:tcPr>
+                </a:tc>
+                <a:tc>
+                  <a:txBody>
+                    <a:bodyPr/>
+                    <a:lstStyle/>
+                    <a:p>
+                      <a:r>
+                        <a:rPr lang="en-US" sz="1800" dirty="0"/>
+                        <a:t>USDA food desert designations are rule based and a decision tree will find those rules.</a:t>
+                      </a:r>
+                    </a:p>
+                  </a:txBody>
+                  <a:tcPr>
+                    <a:lnL w="12700" cap="flat" cmpd="sng" algn="ctr">
+                      <a:solidFill>
+                        <a:srgbClr val="65BBB5"/>
+                      </a:solidFill>
+                      <a:prstDash val="solid"/>
+                      <a:round/>
+                      <a:headEnd type="none" w="med" len="med"/>
+                      <a:tailEnd type="none" w="med" len="med"/>
+                    </a:lnL>
+                    <a:lnR w="12700" cap="flat" cmpd="sng" algn="ctr">
+                      <a:noFill/>
+                      <a:prstDash val="solid"/>
+                      <a:round/>
+                      <a:headEnd type="none" w="med" len="med"/>
+                      <a:tailEnd type="none" w="med" len="med"/>
+                    </a:lnR>
+                    <a:lnT w="12700" cap="flat" cmpd="sng" algn="ctr">
+                      <a:solidFill>
+                        <a:srgbClr val="65BBB5"/>
+                      </a:solidFill>
+                      <a:prstDash val="solid"/>
+                      <a:round/>
+                      <a:headEnd type="none" w="med" len="med"/>
+                      <a:tailEnd type="none" w="med" len="med"/>
+                    </a:lnT>
+                    <a:lnB w="12700" cap="flat" cmpd="sng" algn="ctr">
+                      <a:solidFill>
+                        <a:srgbClr val="65BBB5"/>
+                      </a:solidFill>
+                      <a:prstDash val="solid"/>
+                      <a:round/>
+                      <a:headEnd type="none" w="med" len="med"/>
+                      <a:tailEnd type="none" w="med" len="med"/>
+                    </a:lnB>
+                    <a:solidFill>
+                      <a:schemeClr val="bg1"/>
+                    </a:solidFill>
+                  </a:tcPr>
+                </a:tc>
+                <a:extLst>
+                  <a:ext uri="{0D108BD9-81ED-4DB2-BD59-A6C34878D82A}">
+                    <a16:rowId xmlns:a16="http://schemas.microsoft.com/office/drawing/2014/main" val="2685413737"/>
+                  </a:ext>
+                </a:extLst>
+              </a:tr>
+              <a:tr h="370840">
+                <a:tc>
+                  <a:txBody>
+                    <a:bodyPr/>
+                    <a:lstStyle/>
+                    <a:p>
+                      <a:r>
+                        <a:rPr lang="en-US" sz="1800" dirty="0"/>
+                        <a:t>Performance could improve.</a:t>
+                      </a:r>
+                    </a:p>
+                  </a:txBody>
+                  <a:tcPr>
+                    <a:lnL w="12700" cap="flat" cmpd="sng" algn="ctr">
+                      <a:noFill/>
+                      <a:prstDash val="solid"/>
+                      <a:round/>
+                      <a:headEnd type="none" w="med" len="med"/>
+                      <a:tailEnd type="none" w="med" len="med"/>
+                    </a:lnL>
+                    <a:lnR w="12700" cap="flat" cmpd="sng" algn="ctr">
+                      <a:solidFill>
+                        <a:srgbClr val="65BBB5"/>
+                      </a:solidFill>
+                      <a:prstDash val="solid"/>
+                      <a:round/>
+                      <a:headEnd type="none" w="med" len="med"/>
+                      <a:tailEnd type="none" w="med" len="med"/>
+                    </a:lnR>
+                    <a:lnT w="12700" cap="flat" cmpd="sng" algn="ctr">
+                      <a:solidFill>
+                        <a:srgbClr val="65BBB5"/>
+                      </a:solidFill>
+                      <a:prstDash val="solid"/>
+                      <a:round/>
+                      <a:headEnd type="none" w="med" len="med"/>
+                      <a:tailEnd type="none" w="med" len="med"/>
+                    </a:lnT>
+                    <a:lnB w="12700" cap="flat" cmpd="sng" algn="ctr">
+                      <a:solidFill>
+                        <a:srgbClr val="65BBB5"/>
+                      </a:solidFill>
+                      <a:prstDash val="solid"/>
+                      <a:round/>
+                      <a:headEnd type="none" w="med" len="med"/>
+                      <a:tailEnd type="none" w="med" len="med"/>
+                    </a:lnB>
+                    <a:solidFill>
+                      <a:schemeClr val="bg1"/>
+                    </a:solidFill>
+                  </a:tcPr>
+                </a:tc>
+                <a:tc>
+                  <a:txBody>
+                    <a:bodyPr/>
+                    <a:lstStyle/>
+                    <a:p>
+                      <a:r>
+                        <a:rPr lang="en-US" sz="1800" dirty="0"/>
+                        <a:t>Performance is already excellent.</a:t>
+                      </a:r>
+                    </a:p>
+                  </a:txBody>
+                  <a:tcPr>
+                    <a:lnL w="12700" cap="flat" cmpd="sng" algn="ctr">
+                      <a:solidFill>
+                        <a:srgbClr val="65BBB5"/>
+                      </a:solidFill>
+                      <a:prstDash val="solid"/>
+                      <a:round/>
+                      <a:headEnd type="none" w="med" len="med"/>
+                      <a:tailEnd type="none" w="med" len="med"/>
+                    </a:lnL>
+                    <a:lnR w="12700" cap="flat" cmpd="sng" algn="ctr">
+                      <a:noFill/>
+                      <a:prstDash val="solid"/>
+                      <a:round/>
+                      <a:headEnd type="none" w="med" len="med"/>
+                      <a:tailEnd type="none" w="med" len="med"/>
+                    </a:lnR>
+                    <a:lnT w="12700" cap="flat" cmpd="sng" algn="ctr">
+                      <a:solidFill>
+                        <a:srgbClr val="65BBB5"/>
+                      </a:solidFill>
+                      <a:prstDash val="solid"/>
+                      <a:round/>
+                      <a:headEnd type="none" w="med" len="med"/>
+                      <a:tailEnd type="none" w="med" len="med"/>
+                    </a:lnT>
+                    <a:lnB w="12700" cap="flat" cmpd="sng" algn="ctr">
+                      <a:solidFill>
+                        <a:srgbClr val="65BBB5"/>
+                      </a:solidFill>
+                      <a:prstDash val="solid"/>
+                      <a:round/>
+                      <a:headEnd type="none" w="med" len="med"/>
+                      <a:tailEnd type="none" w="med" len="med"/>
+                    </a:lnB>
+                    <a:solidFill>
+                      <a:schemeClr val="bg1"/>
+                    </a:solidFill>
+                  </a:tcPr>
+                </a:tc>
+                <a:extLst>
+                  <a:ext uri="{0D108BD9-81ED-4DB2-BD59-A6C34878D82A}">
+                    <a16:rowId xmlns:a16="http://schemas.microsoft.com/office/drawing/2014/main" val="151596283"/>
+                  </a:ext>
+                </a:extLst>
+              </a:tr>
+            </a:tbl>
+          </a:graphicData>
+        </a:graphic>
+      </p:graphicFrame>
     </p:spTree>
     <p:extLst>
       <p:ext uri="{BB962C8B-B14F-4D97-AF65-F5344CB8AC3E}">
-        <p14:creationId xmlns:p14="http://schemas.microsoft.com/office/powerpoint/2010/main" val="2603264690"/>
+        <p14:creationId xmlns:p14="http://schemas.microsoft.com/office/powerpoint/2010/main" val="2534969262"/>
       </p:ext>
     </p:extLst>
   </p:cSld>
@@ -5850,28 +6725,117 @@
           </a:p>
         </p:txBody>
       </p:sp>
-      <p:sp>
-        <p:nvSpPr>
-          <p:cNvPr id="3" name="Content Placeholder 2">
-            <a:extLst>
-              <a:ext uri="{FF2B5EF4-FFF2-40B4-BE49-F238E27FC236}">
-                <a16:creationId xmlns:a16="http://schemas.microsoft.com/office/drawing/2014/main" id="{D9036868-F762-4065-874B-66A48FB77D89}"/>
-              </a:ext>
-            </a:extLst>
-          </p:cNvPr>
-          <p:cNvSpPr>
-            <a:spLocks noGrp="1"/>
-          </p:cNvSpPr>
+      <p:pic>
+        <p:nvPicPr>
+          <p:cNvPr id="5" name="Content Placeholder 4">
+            <a:extLst>
+              <a:ext uri="{FF2B5EF4-FFF2-40B4-BE49-F238E27FC236}">
+                <a16:creationId xmlns:a16="http://schemas.microsoft.com/office/drawing/2014/main" id="{9F684F12-7454-4BF8-8786-17A5D9C4C216}"/>
+              </a:ext>
+            </a:extLst>
+          </p:cNvPr>
+          <p:cNvPicPr>
+            <a:picLocks noGrp="1" noChangeAspect="1"/>
+          </p:cNvPicPr>
           <p:nvPr>
             <p:ph idx="1"/>
           </p:nvPr>
+        </p:nvPicPr>
+        <p:blipFill>
+          <a:blip r:embed="rId2">
+            <a:extLst>
+              <a:ext uri="{28A0092B-C50C-407E-A947-70E740481C1C}">
+                <a14:useLocalDpi xmlns:a14="http://schemas.microsoft.com/office/drawing/2010/main" val="0"/>
+              </a:ext>
+            </a:extLst>
+          </a:blip>
+          <a:stretch>
+            <a:fillRect/>
+          </a:stretch>
+        </p:blipFill>
+        <p:spPr>
+          <a:xfrm>
+            <a:off x="4387855" y="1427480"/>
+            <a:ext cx="6965945" cy="4830763"/>
+          </a:xfrm>
+        </p:spPr>
+      </p:pic>
+      <p:sp>
+        <p:nvSpPr>
+          <p:cNvPr id="6" name="TextBox 5">
+            <a:extLst>
+              <a:ext uri="{FF2B5EF4-FFF2-40B4-BE49-F238E27FC236}">
+                <a16:creationId xmlns:a16="http://schemas.microsoft.com/office/drawing/2014/main" id="{8A947EC4-7F05-453E-952E-FDC3AE77D506}"/>
+              </a:ext>
+            </a:extLst>
+          </p:cNvPr>
+          <p:cNvSpPr txBox="1"/>
+          <p:nvPr/>
         </p:nvSpPr>
-        <p:spPr/>
+        <p:spPr>
+          <a:xfrm>
+            <a:off x="838200" y="1427480"/>
+            <a:ext cx="3622040" cy="5016758"/>
+          </a:xfrm>
+          <a:prstGeom prst="rect">
+            <a:avLst/>
+          </a:prstGeom>
+          <a:noFill/>
+        </p:spPr>
         <p:txBody>
-          <a:bodyPr/>
+          <a:bodyPr wrap="square" rtlCol="0">
+            <a:spAutoFit/>
+          </a:bodyPr>
           <a:lstStyle/>
           <a:p>
-            <a:endParaRPr lang="en-US"/>
+            <a:r>
+              <a:rPr lang="en-US" sz="1600" dirty="0"/>
+              <a:t>The same four variables visualized in boxplots during multivariate analysis are selected with high importance.</a:t>
+            </a:r>
+          </a:p>
+          <a:p>
+            <a:endParaRPr lang="en-US" sz="1600" dirty="0"/>
+          </a:p>
+          <a:p>
+            <a:r>
+              <a:rPr lang="en-US" sz="1600" dirty="0"/>
+              <a:t>Vehicle access is listed in the USDA documentation as being a factor.</a:t>
+            </a:r>
+          </a:p>
+          <a:p>
+            <a:endParaRPr lang="en-US" sz="1600" dirty="0"/>
+          </a:p>
+          <a:p>
+            <a:r>
+              <a:rPr lang="en-US" sz="1600" dirty="0"/>
+              <a:t>Log population per square mile (log_pop_per_sqmi_est_2018) is a generated variable for population density.</a:t>
+            </a:r>
+          </a:p>
+          <a:p>
+            <a:endParaRPr lang="en-US" sz="1600" dirty="0"/>
+          </a:p>
+          <a:p>
+            <a:r>
+              <a:rPr lang="en-US" sz="1600" dirty="0"/>
+              <a:t>Mean change in population (</a:t>
+            </a:r>
+            <a:r>
+              <a:rPr lang="en-US" sz="1600" dirty="0" err="1"/>
+              <a:t>mean_change_pop</a:t>
+            </a:r>
+            <a:r>
+              <a:rPr lang="en-US" sz="1600" dirty="0"/>
+              <a:t>) is a generated variable. It is the average change in population for the census tract between 2010 and 2016.</a:t>
+            </a:r>
+          </a:p>
+          <a:p>
+            <a:endParaRPr lang="en-US" sz="1600" dirty="0"/>
+          </a:p>
+          <a:p>
+            <a:r>
+              <a:rPr lang="en-US" sz="1600" dirty="0"/>
+              <a:t>Grocery stores per 1,000 people (groc14_per_1k_capita) is generated. </a:t>
+            </a:r>
           </a:p>
         </p:txBody>
       </p:sp>
@@ -5928,39 +6892,301 @@
           <a:p>
             <a:r>
               <a:rPr lang="en-US" dirty="0"/>
-              <a:t>Limitations &amp; Assumptions</a:t>
+              <a:t>Limitations &amp; Next Steps</a:t>
             </a:r>
           </a:p>
         </p:txBody>
       </p:sp>
-      <p:sp>
-        <p:nvSpPr>
-          <p:cNvPr id="3" name="Content Placeholder 2">
-            <a:extLst>
-              <a:ext uri="{FF2B5EF4-FFF2-40B4-BE49-F238E27FC236}">
-                <a16:creationId xmlns:a16="http://schemas.microsoft.com/office/drawing/2014/main" id="{C61F45BF-DA8C-4E02-A9A4-80F6C1F4162F}"/>
-              </a:ext>
-            </a:extLst>
-          </p:cNvPr>
-          <p:cNvSpPr>
-            <a:spLocks noGrp="1"/>
-          </p:cNvSpPr>
-          <p:nvPr>
-            <p:ph idx="1"/>
-          </p:nvPr>
-        </p:nvSpPr>
-        <p:spPr/>
-        <p:txBody>
-          <a:bodyPr/>
-          <a:lstStyle/>
-          <a:p>
-            <a:r>
-              <a:rPr lang="en-US" dirty="0"/>
-              <a:t>Stores is at county level rather than tract</a:t>
-            </a:r>
-          </a:p>
-        </p:txBody>
-      </p:sp>
+      <p:grpSp>
+        <p:nvGrpSpPr>
+          <p:cNvPr id="4" name="Group 3">
+            <a:extLst>
+              <a:ext uri="{FF2B5EF4-FFF2-40B4-BE49-F238E27FC236}">
+                <a16:creationId xmlns:a16="http://schemas.microsoft.com/office/drawing/2014/main" id="{2BBBDCB1-10F7-445D-AF39-33ADE9567937}"/>
+              </a:ext>
+            </a:extLst>
+          </p:cNvPr>
+          <p:cNvGrpSpPr/>
+          <p:nvPr/>
+        </p:nvGrpSpPr>
+        <p:grpSpPr>
+          <a:xfrm>
+            <a:off x="838200" y="1609205"/>
+            <a:ext cx="10515600" cy="2435349"/>
+            <a:chOff x="838200" y="1854653"/>
+            <a:chExt cx="10515600" cy="1749373"/>
+          </a:xfrm>
+        </p:grpSpPr>
+        <p:sp>
+          <p:nvSpPr>
+            <p:cNvPr id="5" name="Rectangle: Rounded Corners 4">
+              <a:extLst>
+                <a:ext uri="{FF2B5EF4-FFF2-40B4-BE49-F238E27FC236}">
+                  <a16:creationId xmlns:a16="http://schemas.microsoft.com/office/drawing/2014/main" id="{A6B22251-30E1-4B65-8DAB-E8B397FB256B}"/>
+                </a:ext>
+              </a:extLst>
+            </p:cNvPr>
+            <p:cNvSpPr/>
+            <p:nvPr/>
+          </p:nvSpPr>
+          <p:spPr>
+            <a:xfrm>
+              <a:off x="838200" y="1854653"/>
+              <a:ext cx="3235960" cy="321850"/>
+            </a:xfrm>
+            <a:prstGeom prst="roundRect">
+              <a:avLst/>
+            </a:prstGeom>
+            <a:solidFill>
+              <a:srgbClr val="65BBB5"/>
+            </a:solidFill>
+            <a:ln>
+              <a:noFill/>
+            </a:ln>
+          </p:spPr>
+          <p:style>
+            <a:lnRef idx="2">
+              <a:schemeClr val="accent1">
+                <a:shade val="50000"/>
+              </a:schemeClr>
+            </a:lnRef>
+            <a:fillRef idx="1">
+              <a:schemeClr val="accent1"/>
+            </a:fillRef>
+            <a:effectRef idx="0">
+              <a:schemeClr val="accent1"/>
+            </a:effectRef>
+            <a:fontRef idx="minor">
+              <a:schemeClr val="lt1"/>
+            </a:fontRef>
+          </p:style>
+          <p:txBody>
+            <a:bodyPr rtlCol="0" anchor="ctr"/>
+            <a:lstStyle/>
+            <a:p>
+              <a:pPr algn="ctr"/>
+              <a:r>
+                <a:rPr lang="en-US" dirty="0"/>
+                <a:t>Limitations</a:t>
+              </a:r>
+            </a:p>
+          </p:txBody>
+        </p:sp>
+        <p:sp>
+          <p:nvSpPr>
+            <p:cNvPr id="6" name="TextBox 5">
+              <a:extLst>
+                <a:ext uri="{FF2B5EF4-FFF2-40B4-BE49-F238E27FC236}">
+                  <a16:creationId xmlns:a16="http://schemas.microsoft.com/office/drawing/2014/main" id="{A8076805-613A-4DA0-93DD-26248F92D398}"/>
+                </a:ext>
+              </a:extLst>
+            </p:cNvPr>
+            <p:cNvSpPr txBox="1"/>
+            <p:nvPr/>
+          </p:nvSpPr>
+          <p:spPr>
+            <a:xfrm>
+              <a:off x="838200" y="2211199"/>
+              <a:ext cx="10515600" cy="1392827"/>
+            </a:xfrm>
+            <a:prstGeom prst="rect">
+              <a:avLst/>
+            </a:prstGeom>
+            <a:noFill/>
+          </p:spPr>
+          <p:txBody>
+            <a:bodyPr wrap="square" rtlCol="0">
+              <a:spAutoFit/>
+            </a:bodyPr>
+            <a:lstStyle/>
+            <a:p>
+              <a:pPr marL="342900" indent="-342900">
+                <a:buFont typeface="Arial" panose="020B0604020202020204" pitchFamily="34" charset="0"/>
+                <a:buChar char="•"/>
+              </a:pPr>
+              <a:r>
+                <a:rPr lang="en-US" sz="2000" dirty="0"/>
+                <a:t>Geographic level of data is not even. Tract-level data would be best for interpretation.</a:t>
+              </a:r>
+            </a:p>
+            <a:p>
+              <a:pPr marL="342900" indent="-342900">
+                <a:buFont typeface="Arial" panose="020B0604020202020204" pitchFamily="34" charset="0"/>
+                <a:buChar char="•"/>
+              </a:pPr>
+              <a:r>
+                <a:rPr lang="en-US" sz="2000" dirty="0"/>
+                <a:t>Some data are not up to date. Census data is old.</a:t>
+              </a:r>
+            </a:p>
+            <a:p>
+              <a:pPr marL="342900" indent="-342900">
+                <a:buFont typeface="Arial" panose="020B0604020202020204" pitchFamily="34" charset="0"/>
+                <a:buChar char="•"/>
+              </a:pPr>
+              <a:r>
+                <a:rPr lang="en-US" sz="2000" dirty="0"/>
+                <a:t>Evaluating variables from different years can have confounding effects.</a:t>
+              </a:r>
+            </a:p>
+            <a:p>
+              <a:pPr marL="342900" indent="-342900">
+                <a:buFont typeface="Arial" panose="020B0604020202020204" pitchFamily="34" charset="0"/>
+                <a:buChar char="•"/>
+              </a:pPr>
+              <a:r>
+                <a:rPr lang="en-US" sz="2000" dirty="0"/>
+                <a:t>Having the number of grocery/supercenter/convenience/specialty stores at the tract level may help prediction.</a:t>
+              </a:r>
+            </a:p>
+            <a:p>
+              <a:pPr marL="342900" indent="-342900">
+                <a:buFont typeface="Arial" panose="020B0604020202020204" pitchFamily="34" charset="0"/>
+                <a:buChar char="•"/>
+              </a:pPr>
+              <a:r>
+                <a:rPr lang="en-US" sz="2000" dirty="0"/>
+                <a:t>One week turnaround.</a:t>
+              </a:r>
+            </a:p>
+          </p:txBody>
+        </p:sp>
+      </p:grpSp>
+      <p:grpSp>
+        <p:nvGrpSpPr>
+          <p:cNvPr id="10" name="Group 9">
+            <a:extLst>
+              <a:ext uri="{FF2B5EF4-FFF2-40B4-BE49-F238E27FC236}">
+                <a16:creationId xmlns:a16="http://schemas.microsoft.com/office/drawing/2014/main" id="{8E00E68E-0A49-44E1-ADC5-C37AE7434031}"/>
+              </a:ext>
+            </a:extLst>
+          </p:cNvPr>
+          <p:cNvGrpSpPr/>
+          <p:nvPr/>
+        </p:nvGrpSpPr>
+        <p:grpSpPr>
+          <a:xfrm>
+            <a:off x="838200" y="4397203"/>
+            <a:ext cx="10515600" cy="1463720"/>
+            <a:chOff x="838200" y="1857921"/>
+            <a:chExt cx="10515600" cy="1051427"/>
+          </a:xfrm>
+        </p:grpSpPr>
+        <p:sp>
+          <p:nvSpPr>
+            <p:cNvPr id="11" name="Rectangle: Rounded Corners 10">
+              <a:extLst>
+                <a:ext uri="{FF2B5EF4-FFF2-40B4-BE49-F238E27FC236}">
+                  <a16:creationId xmlns:a16="http://schemas.microsoft.com/office/drawing/2014/main" id="{90C92A95-1532-4587-B0A8-A003F462F407}"/>
+                </a:ext>
+              </a:extLst>
+            </p:cNvPr>
+            <p:cNvSpPr/>
+            <p:nvPr/>
+          </p:nvSpPr>
+          <p:spPr>
+            <a:xfrm>
+              <a:off x="838200" y="1857921"/>
+              <a:ext cx="3235960" cy="321850"/>
+            </a:xfrm>
+            <a:prstGeom prst="roundRect">
+              <a:avLst/>
+            </a:prstGeom>
+            <a:solidFill>
+              <a:srgbClr val="65BBB5"/>
+            </a:solidFill>
+            <a:ln>
+              <a:noFill/>
+            </a:ln>
+          </p:spPr>
+          <p:style>
+            <a:lnRef idx="2">
+              <a:schemeClr val="accent1">
+                <a:shade val="50000"/>
+              </a:schemeClr>
+            </a:lnRef>
+            <a:fillRef idx="1">
+              <a:schemeClr val="accent1"/>
+            </a:fillRef>
+            <a:effectRef idx="0">
+              <a:schemeClr val="accent1"/>
+            </a:effectRef>
+            <a:fontRef idx="minor">
+              <a:schemeClr val="lt1"/>
+            </a:fontRef>
+          </p:style>
+          <p:txBody>
+            <a:bodyPr rtlCol="0" anchor="ctr"/>
+            <a:lstStyle/>
+            <a:p>
+              <a:pPr algn="ctr"/>
+              <a:r>
+                <a:rPr lang="en-US" dirty="0"/>
+                <a:t>Next Steps</a:t>
+              </a:r>
+            </a:p>
+          </p:txBody>
+        </p:sp>
+        <p:sp>
+          <p:nvSpPr>
+            <p:cNvPr id="12" name="TextBox 11">
+              <a:extLst>
+                <a:ext uri="{FF2B5EF4-FFF2-40B4-BE49-F238E27FC236}">
+                  <a16:creationId xmlns:a16="http://schemas.microsoft.com/office/drawing/2014/main" id="{4B8FE601-00C0-4CE0-AA22-B88A318979FC}"/>
+                </a:ext>
+              </a:extLst>
+            </p:cNvPr>
+            <p:cNvSpPr txBox="1"/>
+            <p:nvPr/>
+          </p:nvSpPr>
+          <p:spPr>
+            <a:xfrm>
+              <a:off x="838200" y="2179771"/>
+              <a:ext cx="10515600" cy="729577"/>
+            </a:xfrm>
+            <a:prstGeom prst="rect">
+              <a:avLst/>
+            </a:prstGeom>
+            <a:noFill/>
+          </p:spPr>
+          <p:txBody>
+            <a:bodyPr wrap="square" rtlCol="0">
+              <a:spAutoFit/>
+            </a:bodyPr>
+            <a:lstStyle/>
+            <a:p>
+              <a:pPr marL="342900" indent="-342900">
+                <a:buFont typeface="Arial" panose="020B0604020202020204" pitchFamily="34" charset="0"/>
+                <a:buChar char="•"/>
+              </a:pPr>
+              <a:r>
+                <a:rPr lang="en-US" sz="2000" dirty="0"/>
+                <a:t>Validate code.</a:t>
+              </a:r>
+            </a:p>
+            <a:p>
+              <a:pPr marL="342900" indent="-342900">
+                <a:buFont typeface="Arial" panose="020B0604020202020204" pitchFamily="34" charset="0"/>
+                <a:buChar char="•"/>
+              </a:pPr>
+              <a:r>
+                <a:rPr lang="en-US" sz="2000" dirty="0"/>
+                <a:t>Tweak model parameters.</a:t>
+              </a:r>
+            </a:p>
+            <a:p>
+              <a:pPr marL="342900" indent="-342900">
+                <a:buFont typeface="Arial" panose="020B0604020202020204" pitchFamily="34" charset="0"/>
+                <a:buChar char="•"/>
+              </a:pPr>
+              <a:r>
+                <a:rPr lang="en-US" sz="2000" dirty="0"/>
+                <a:t>Add more predictive model types.</a:t>
+              </a:r>
+            </a:p>
+          </p:txBody>
+        </p:sp>
+      </p:grpSp>
     </p:spTree>
     <p:extLst>
       <p:ext uri="{BB962C8B-B14F-4D97-AF65-F5344CB8AC3E}">
@@ -5996,7 +7222,7 @@
           <p:cNvPr id="2" name="Title 1">
             <a:extLst>
               <a:ext uri="{FF2B5EF4-FFF2-40B4-BE49-F238E27FC236}">
-                <a16:creationId xmlns:a16="http://schemas.microsoft.com/office/drawing/2014/main" id="{50BFE055-270C-42C5-B8C7-041B00222751}"/>
+                <a16:creationId xmlns:a16="http://schemas.microsoft.com/office/drawing/2014/main" id="{52E1E3FB-656F-41DB-98B4-EDB0C947E8EB}"/>
               </a:ext>
             </a:extLst>
           </p:cNvPr>
@@ -6014,17 +7240,17 @@
           <a:p>
             <a:r>
               <a:rPr lang="en-US" dirty="0"/>
-              <a:t>Model Uses</a:t>
+              <a:t>Appendices</a:t>
             </a:r>
           </a:p>
         </p:txBody>
       </p:sp>
       <p:sp>
         <p:nvSpPr>
-          <p:cNvPr id="3" name="Content Placeholder 2">
-            <a:extLst>
-              <a:ext uri="{FF2B5EF4-FFF2-40B4-BE49-F238E27FC236}">
-                <a16:creationId xmlns:a16="http://schemas.microsoft.com/office/drawing/2014/main" id="{A6BC3794-B168-4CD7-A656-B2C164836D8D}"/>
+          <p:cNvPr id="3" name="Text Placeholder 2">
+            <a:extLst>
+              <a:ext uri="{FF2B5EF4-FFF2-40B4-BE49-F238E27FC236}">
+                <a16:creationId xmlns:a16="http://schemas.microsoft.com/office/drawing/2014/main" id="{2A37731C-7163-4485-A679-E4E395D05FF6}"/>
               </a:ext>
             </a:extLst>
           </p:cNvPr>
@@ -6032,7 +7258,7 @@
             <a:spLocks noGrp="1"/>
           </p:cNvSpPr>
           <p:nvPr>
-            <p:ph idx="1"/>
+            <p:ph type="body" idx="1"/>
           </p:nvPr>
         </p:nvSpPr>
         <p:spPr/>
@@ -6047,7 +7273,7 @@
     </p:spTree>
     <p:extLst>
       <p:ext uri="{BB962C8B-B14F-4D97-AF65-F5344CB8AC3E}">
-        <p14:creationId xmlns:p14="http://schemas.microsoft.com/office/powerpoint/2010/main" val="2885338965"/>
+        <p14:creationId xmlns:p14="http://schemas.microsoft.com/office/powerpoint/2010/main" val="2436024495"/>
       </p:ext>
     </p:extLst>
   </p:cSld>
@@ -6079,7 +7305,7 @@
           <p:cNvPr id="2" name="Title 1">
             <a:extLst>
               <a:ext uri="{FF2B5EF4-FFF2-40B4-BE49-F238E27FC236}">
-                <a16:creationId xmlns:a16="http://schemas.microsoft.com/office/drawing/2014/main" id="{47771F08-6C40-41C8-9BD1-DE163129B71B}"/>
+                <a16:creationId xmlns:a16="http://schemas.microsoft.com/office/drawing/2014/main" id="{A4F3F722-A381-4651-A27C-63404A096F51}"/>
               </a:ext>
             </a:extLst>
           </p:cNvPr>
@@ -6097,7 +7323,7 @@
           <a:p>
             <a:r>
               <a:rPr lang="en-US" dirty="0"/>
-              <a:t>Next Steps</a:t>
+              <a:t>Appendix 1: Model Specifications</a:t>
             </a:r>
           </a:p>
         </p:txBody>
@@ -6107,7 +7333,7 @@
           <p:cNvPr id="3" name="Content Placeholder 2">
             <a:extLst>
               <a:ext uri="{FF2B5EF4-FFF2-40B4-BE49-F238E27FC236}">
-                <a16:creationId xmlns:a16="http://schemas.microsoft.com/office/drawing/2014/main" id="{E2DAA6BB-E372-4DFF-896B-59DF4C880166}"/>
+                <a16:creationId xmlns:a16="http://schemas.microsoft.com/office/drawing/2014/main" id="{3D51825C-1508-47A7-B46B-1051867231CE}"/>
               </a:ext>
             </a:extLst>
           </p:cNvPr>
@@ -6130,7 +7356,7 @@
     </p:spTree>
     <p:extLst>
       <p:ext uri="{BB962C8B-B14F-4D97-AF65-F5344CB8AC3E}">
-        <p14:creationId xmlns:p14="http://schemas.microsoft.com/office/powerpoint/2010/main" val="3548303257"/>
+        <p14:creationId xmlns:p14="http://schemas.microsoft.com/office/powerpoint/2010/main" val="312243836"/>
       </p:ext>
     </p:extLst>
   </p:cSld>
@@ -6162,349 +7388,6 @@
           <p:cNvPr id="2" name="Title 1">
             <a:extLst>
               <a:ext uri="{FF2B5EF4-FFF2-40B4-BE49-F238E27FC236}">
-                <a16:creationId xmlns:a16="http://schemas.microsoft.com/office/drawing/2014/main" id="{C66FCE46-84BF-4666-8620-30D0BD8F75AF}"/>
-              </a:ext>
-            </a:extLst>
-          </p:cNvPr>
-          <p:cNvSpPr>
-            <a:spLocks noGrp="1"/>
-          </p:cNvSpPr>
-          <p:nvPr>
-            <p:ph type="title"/>
-          </p:nvPr>
-        </p:nvSpPr>
-        <p:spPr/>
-        <p:txBody>
-          <a:bodyPr/>
-          <a:lstStyle/>
-          <a:p>
-            <a:endParaRPr lang="en-US"/>
-          </a:p>
-        </p:txBody>
-      </p:sp>
-      <p:sp>
-        <p:nvSpPr>
-          <p:cNvPr id="3" name="Content Placeholder 2">
-            <a:extLst>
-              <a:ext uri="{FF2B5EF4-FFF2-40B4-BE49-F238E27FC236}">
-                <a16:creationId xmlns:a16="http://schemas.microsoft.com/office/drawing/2014/main" id="{989B8D29-9EFE-4B5C-A079-625982F7D3A7}"/>
-              </a:ext>
-            </a:extLst>
-          </p:cNvPr>
-          <p:cNvSpPr>
-            <a:spLocks noGrp="1"/>
-          </p:cNvSpPr>
-          <p:nvPr>
-            <p:ph idx="1"/>
-          </p:nvPr>
-        </p:nvSpPr>
-        <p:spPr/>
-        <p:txBody>
-          <a:bodyPr/>
-          <a:lstStyle/>
-          <a:p>
-            <a:endParaRPr lang="en-US"/>
-          </a:p>
-        </p:txBody>
-      </p:sp>
-    </p:spTree>
-    <p:extLst>
-      <p:ext uri="{BB962C8B-B14F-4D97-AF65-F5344CB8AC3E}">
-        <p14:creationId xmlns:p14="http://schemas.microsoft.com/office/powerpoint/2010/main" val="1140103774"/>
-      </p:ext>
-    </p:extLst>
-  </p:cSld>
-  <p:clrMapOvr>
-    <a:masterClrMapping/>
-  </p:clrMapOvr>
-</p:sld>
-</file>
-
-<file path=ppt/slides/slide2.xml><?xml version="1.0" encoding="utf-8"?>
-<p:sld xmlns:a="http://schemas.openxmlformats.org/drawingml/2006/main" xmlns:r="http://schemas.openxmlformats.org/officeDocument/2006/relationships" xmlns:p="http://schemas.openxmlformats.org/presentationml/2006/main">
-  <p:cSld>
-    <p:spTree>
-      <p:nvGrpSpPr>
-        <p:cNvPr id="1" name=""/>
-        <p:cNvGrpSpPr/>
-        <p:nvPr/>
-      </p:nvGrpSpPr>
-      <p:grpSpPr>
-        <a:xfrm>
-          <a:off x="0" y="0"/>
-          <a:ext cx="0" cy="0"/>
-          <a:chOff x="0" y="0"/>
-          <a:chExt cx="0" cy="0"/>
-        </a:xfrm>
-      </p:grpSpPr>
-      <p:sp>
-        <p:nvSpPr>
-          <p:cNvPr id="2" name="Title 1">
-            <a:extLst>
-              <a:ext uri="{FF2B5EF4-FFF2-40B4-BE49-F238E27FC236}">
-                <a16:creationId xmlns:a16="http://schemas.microsoft.com/office/drawing/2014/main" id="{894A6366-8746-4B25-95D5-47DB023E3C92}"/>
-              </a:ext>
-            </a:extLst>
-          </p:cNvPr>
-          <p:cNvSpPr>
-            <a:spLocks noGrp="1"/>
-          </p:cNvSpPr>
-          <p:nvPr>
-            <p:ph type="title"/>
-          </p:nvPr>
-        </p:nvSpPr>
-        <p:spPr/>
-        <p:txBody>
-          <a:bodyPr/>
-          <a:lstStyle/>
-          <a:p>
-            <a:r>
-              <a:rPr lang="en-US" dirty="0"/>
-              <a:t>Notes</a:t>
-            </a:r>
-          </a:p>
-        </p:txBody>
-      </p:sp>
-      <p:sp>
-        <p:nvSpPr>
-          <p:cNvPr id="3" name="Content Placeholder 2">
-            <a:extLst>
-              <a:ext uri="{FF2B5EF4-FFF2-40B4-BE49-F238E27FC236}">
-                <a16:creationId xmlns:a16="http://schemas.microsoft.com/office/drawing/2014/main" id="{E5EAFEFE-B8D7-4A12-92A9-7252611D1726}"/>
-              </a:ext>
-            </a:extLst>
-          </p:cNvPr>
-          <p:cNvSpPr>
-            <a:spLocks noGrp="1"/>
-          </p:cNvSpPr>
-          <p:nvPr>
-            <p:ph idx="1"/>
-          </p:nvPr>
-        </p:nvSpPr>
-        <p:spPr/>
-        <p:txBody>
-          <a:bodyPr/>
-          <a:lstStyle/>
-          <a:p>
-            <a:r>
-              <a:rPr lang="en-US" dirty="0"/>
-              <a:t>134 to 368 tracts listed as food deserts from 2010 to 2017 – why?</a:t>
-            </a:r>
-          </a:p>
-          <a:p>
-            <a:r>
-              <a:rPr lang="en-US" dirty="0"/>
-              <a:t>54/100 counties with </a:t>
-            </a:r>
-            <a:r>
-              <a:rPr lang="en-US"/>
-              <a:t>food deserts 2010; 83/100 2017</a:t>
-            </a:r>
-            <a:endParaRPr lang="en-US" dirty="0"/>
-          </a:p>
-        </p:txBody>
-      </p:sp>
-    </p:spTree>
-    <p:extLst>
-      <p:ext uri="{BB962C8B-B14F-4D97-AF65-F5344CB8AC3E}">
-        <p14:creationId xmlns:p14="http://schemas.microsoft.com/office/powerpoint/2010/main" val="2773082941"/>
-      </p:ext>
-    </p:extLst>
-  </p:cSld>
-  <p:clrMapOvr>
-    <a:masterClrMapping/>
-  </p:clrMapOvr>
-</p:sld>
-</file>
-
-<file path=ppt/slides/slide20.xml><?xml version="1.0" encoding="utf-8"?>
-<p:sld xmlns:a="http://schemas.openxmlformats.org/drawingml/2006/main" xmlns:r="http://schemas.openxmlformats.org/officeDocument/2006/relationships" xmlns:p="http://schemas.openxmlformats.org/presentationml/2006/main">
-  <p:cSld>
-    <p:spTree>
-      <p:nvGrpSpPr>
-        <p:cNvPr id="1" name=""/>
-        <p:cNvGrpSpPr/>
-        <p:nvPr/>
-      </p:nvGrpSpPr>
-      <p:grpSpPr>
-        <a:xfrm>
-          <a:off x="0" y="0"/>
-          <a:ext cx="0" cy="0"/>
-          <a:chOff x="0" y="0"/>
-          <a:chExt cx="0" cy="0"/>
-        </a:xfrm>
-      </p:grpSpPr>
-      <p:sp>
-        <p:nvSpPr>
-          <p:cNvPr id="2" name="Title 1">
-            <a:extLst>
-              <a:ext uri="{FF2B5EF4-FFF2-40B4-BE49-F238E27FC236}">
-                <a16:creationId xmlns:a16="http://schemas.microsoft.com/office/drawing/2014/main" id="{52E1E3FB-656F-41DB-98B4-EDB0C947E8EB}"/>
-              </a:ext>
-            </a:extLst>
-          </p:cNvPr>
-          <p:cNvSpPr>
-            <a:spLocks noGrp="1"/>
-          </p:cNvSpPr>
-          <p:nvPr>
-            <p:ph type="title"/>
-          </p:nvPr>
-        </p:nvSpPr>
-        <p:spPr/>
-        <p:txBody>
-          <a:bodyPr/>
-          <a:lstStyle/>
-          <a:p>
-            <a:r>
-              <a:rPr lang="en-US" dirty="0"/>
-              <a:t>Appendices</a:t>
-            </a:r>
-          </a:p>
-        </p:txBody>
-      </p:sp>
-      <p:sp>
-        <p:nvSpPr>
-          <p:cNvPr id="3" name="Text Placeholder 2">
-            <a:extLst>
-              <a:ext uri="{FF2B5EF4-FFF2-40B4-BE49-F238E27FC236}">
-                <a16:creationId xmlns:a16="http://schemas.microsoft.com/office/drawing/2014/main" id="{2A37731C-7163-4485-A679-E4E395D05FF6}"/>
-              </a:ext>
-            </a:extLst>
-          </p:cNvPr>
-          <p:cNvSpPr>
-            <a:spLocks noGrp="1"/>
-          </p:cNvSpPr>
-          <p:nvPr>
-            <p:ph type="body" idx="1"/>
-          </p:nvPr>
-        </p:nvSpPr>
-        <p:spPr/>
-        <p:txBody>
-          <a:bodyPr/>
-          <a:lstStyle/>
-          <a:p>
-            <a:endParaRPr lang="en-US"/>
-          </a:p>
-        </p:txBody>
-      </p:sp>
-    </p:spTree>
-    <p:extLst>
-      <p:ext uri="{BB962C8B-B14F-4D97-AF65-F5344CB8AC3E}">
-        <p14:creationId xmlns:p14="http://schemas.microsoft.com/office/powerpoint/2010/main" val="2436024495"/>
-      </p:ext>
-    </p:extLst>
-  </p:cSld>
-  <p:clrMapOvr>
-    <a:masterClrMapping/>
-  </p:clrMapOvr>
-</p:sld>
-</file>
-
-<file path=ppt/slides/slide21.xml><?xml version="1.0" encoding="utf-8"?>
-<p:sld xmlns:a="http://schemas.openxmlformats.org/drawingml/2006/main" xmlns:r="http://schemas.openxmlformats.org/officeDocument/2006/relationships" xmlns:p="http://schemas.openxmlformats.org/presentationml/2006/main">
-  <p:cSld>
-    <p:spTree>
-      <p:nvGrpSpPr>
-        <p:cNvPr id="1" name=""/>
-        <p:cNvGrpSpPr/>
-        <p:nvPr/>
-      </p:nvGrpSpPr>
-      <p:grpSpPr>
-        <a:xfrm>
-          <a:off x="0" y="0"/>
-          <a:ext cx="0" cy="0"/>
-          <a:chOff x="0" y="0"/>
-          <a:chExt cx="0" cy="0"/>
-        </a:xfrm>
-      </p:grpSpPr>
-      <p:sp>
-        <p:nvSpPr>
-          <p:cNvPr id="2" name="Title 1">
-            <a:extLst>
-              <a:ext uri="{FF2B5EF4-FFF2-40B4-BE49-F238E27FC236}">
-                <a16:creationId xmlns:a16="http://schemas.microsoft.com/office/drawing/2014/main" id="{A4F3F722-A381-4651-A27C-63404A096F51}"/>
-              </a:ext>
-            </a:extLst>
-          </p:cNvPr>
-          <p:cNvSpPr>
-            <a:spLocks noGrp="1"/>
-          </p:cNvSpPr>
-          <p:nvPr>
-            <p:ph type="title"/>
-          </p:nvPr>
-        </p:nvSpPr>
-        <p:spPr/>
-        <p:txBody>
-          <a:bodyPr/>
-          <a:lstStyle/>
-          <a:p>
-            <a:r>
-              <a:rPr lang="en-US" dirty="0"/>
-              <a:t>Appendix 1: Model Specifications</a:t>
-            </a:r>
-          </a:p>
-        </p:txBody>
-      </p:sp>
-      <p:sp>
-        <p:nvSpPr>
-          <p:cNvPr id="3" name="Content Placeholder 2">
-            <a:extLst>
-              <a:ext uri="{FF2B5EF4-FFF2-40B4-BE49-F238E27FC236}">
-                <a16:creationId xmlns:a16="http://schemas.microsoft.com/office/drawing/2014/main" id="{3D51825C-1508-47A7-B46B-1051867231CE}"/>
-              </a:ext>
-            </a:extLst>
-          </p:cNvPr>
-          <p:cNvSpPr>
-            <a:spLocks noGrp="1"/>
-          </p:cNvSpPr>
-          <p:nvPr>
-            <p:ph idx="1"/>
-          </p:nvPr>
-        </p:nvSpPr>
-        <p:spPr/>
-        <p:txBody>
-          <a:bodyPr/>
-          <a:lstStyle/>
-          <a:p>
-            <a:endParaRPr lang="en-US"/>
-          </a:p>
-        </p:txBody>
-      </p:sp>
-    </p:spTree>
-    <p:extLst>
-      <p:ext uri="{BB962C8B-B14F-4D97-AF65-F5344CB8AC3E}">
-        <p14:creationId xmlns:p14="http://schemas.microsoft.com/office/powerpoint/2010/main" val="312243836"/>
-      </p:ext>
-    </p:extLst>
-  </p:cSld>
-  <p:clrMapOvr>
-    <a:masterClrMapping/>
-  </p:clrMapOvr>
-</p:sld>
-</file>
-
-<file path=ppt/slides/slide22.xml><?xml version="1.0" encoding="utf-8"?>
-<p:sld xmlns:a="http://schemas.openxmlformats.org/drawingml/2006/main" xmlns:r="http://schemas.openxmlformats.org/officeDocument/2006/relationships" xmlns:p="http://schemas.openxmlformats.org/presentationml/2006/main">
-  <p:cSld>
-    <p:spTree>
-      <p:nvGrpSpPr>
-        <p:cNvPr id="1" name=""/>
-        <p:cNvGrpSpPr/>
-        <p:nvPr/>
-      </p:nvGrpSpPr>
-      <p:grpSpPr>
-        <a:xfrm>
-          <a:off x="0" y="0"/>
-          <a:ext cx="0" cy="0"/>
-          <a:chOff x="0" y="0"/>
-          <a:chExt cx="0" cy="0"/>
-        </a:xfrm>
-      </p:grpSpPr>
-      <p:sp>
-        <p:nvSpPr>
-          <p:cNvPr id="2" name="Title 1">
-            <a:extLst>
-              <a:ext uri="{FF2B5EF4-FFF2-40B4-BE49-F238E27FC236}">
                 <a16:creationId xmlns:a16="http://schemas.microsoft.com/office/drawing/2014/main" id="{325021B5-315E-4087-8978-C8D80CEC1D92}"/>
               </a:ext>
             </a:extLst>
@@ -6566,200 +7449,7 @@
 </p:sld>
 </file>
 
-<file path=ppt/slides/slide23.xml><?xml version="1.0" encoding="utf-8"?>
-<p:sld xmlns:a="http://schemas.openxmlformats.org/drawingml/2006/main" xmlns:r="http://schemas.openxmlformats.org/officeDocument/2006/relationships" xmlns:p="http://schemas.openxmlformats.org/presentationml/2006/main">
-  <p:cSld>
-    <p:spTree>
-      <p:nvGrpSpPr>
-        <p:cNvPr id="1" name=""/>
-        <p:cNvGrpSpPr/>
-        <p:nvPr/>
-      </p:nvGrpSpPr>
-      <p:grpSpPr>
-        <a:xfrm>
-          <a:off x="0" y="0"/>
-          <a:ext cx="0" cy="0"/>
-          <a:chOff x="0" y="0"/>
-          <a:chExt cx="0" cy="0"/>
-        </a:xfrm>
-      </p:grpSpPr>
-      <p:sp>
-        <p:nvSpPr>
-          <p:cNvPr id="2" name="Title 1">
-            <a:extLst>
-              <a:ext uri="{FF2B5EF4-FFF2-40B4-BE49-F238E27FC236}">
-                <a16:creationId xmlns:a16="http://schemas.microsoft.com/office/drawing/2014/main" id="{ADF81679-D144-4A2B-A7C8-E4D81B71F286}"/>
-              </a:ext>
-            </a:extLst>
-          </p:cNvPr>
-          <p:cNvSpPr>
-            <a:spLocks noGrp="1"/>
-          </p:cNvSpPr>
-          <p:nvPr>
-            <p:ph type="title"/>
-          </p:nvPr>
-        </p:nvSpPr>
-        <p:spPr/>
-        <p:txBody>
-          <a:bodyPr/>
-          <a:lstStyle/>
-          <a:p>
-            <a:r>
-              <a:rPr lang="en-US" dirty="0"/>
-              <a:t>Appendix 3: RUCA Code Definitions</a:t>
-            </a:r>
-          </a:p>
-        </p:txBody>
-      </p:sp>
-      <p:sp>
-        <p:nvSpPr>
-          <p:cNvPr id="3" name="Content Placeholder 2">
-            <a:extLst>
-              <a:ext uri="{FF2B5EF4-FFF2-40B4-BE49-F238E27FC236}">
-                <a16:creationId xmlns:a16="http://schemas.microsoft.com/office/drawing/2014/main" id="{98662D36-29DE-44EF-AC9F-139EA974CB30}"/>
-              </a:ext>
-            </a:extLst>
-          </p:cNvPr>
-          <p:cNvSpPr>
-            <a:spLocks noGrp="1"/>
-          </p:cNvSpPr>
-          <p:nvPr>
-            <p:ph idx="1"/>
-          </p:nvPr>
-        </p:nvSpPr>
-        <p:spPr/>
-        <p:txBody>
-          <a:bodyPr>
-            <a:normAutofit/>
-          </a:bodyPr>
-          <a:lstStyle/>
-          <a:p>
-            <a:pPr marL="0" indent="0">
-              <a:buNone/>
-            </a:pPr>
-            <a:r>
-              <a:rPr lang="en-US" sz="2000" dirty="0"/>
-              <a:t>Primary RUCA Codes, 2010</a:t>
-            </a:r>
-          </a:p>
-          <a:p>
-            <a:pPr marL="0" indent="0">
-              <a:buNone/>
-            </a:pPr>
-            <a:r>
-              <a:rPr lang="en-US" sz="2000" dirty="0"/>
-              <a:t>1    Metropolitan area core: primary flow within an urbanized area (UA)</a:t>
-            </a:r>
-          </a:p>
-          <a:p>
-            <a:pPr marL="0" indent="0">
-              <a:buNone/>
-            </a:pPr>
-            <a:r>
-              <a:rPr lang="en-US" sz="2000" dirty="0"/>
-              <a:t>2    Metropolitan area high commuting: primary flow 30% or more to a UA</a:t>
-            </a:r>
-          </a:p>
-          <a:p>
-            <a:pPr marL="0" indent="0">
-              <a:buNone/>
-            </a:pPr>
-            <a:r>
-              <a:rPr lang="en-US" sz="2000" dirty="0"/>
-              <a:t>3    Metropolitan area low commuting: primary flow 10% to 30% to a UA</a:t>
-            </a:r>
-          </a:p>
-          <a:p>
-            <a:pPr marL="0" indent="0">
-              <a:buNone/>
-            </a:pPr>
-            <a:r>
-              <a:rPr lang="en-US" sz="2000" dirty="0"/>
-              <a:t>4    Micropolitan area core: primary flow within an Urban Cluster of 10,000 to 49,999 (large UC)</a:t>
-            </a:r>
-          </a:p>
-          <a:p>
-            <a:pPr marL="0" indent="0">
-              <a:buNone/>
-            </a:pPr>
-            <a:r>
-              <a:rPr lang="en-US" sz="2000" dirty="0"/>
-              <a:t>5    Micropolitan high commuting: primary flow 30% or more to a large UC</a:t>
-            </a:r>
-          </a:p>
-          <a:p>
-            <a:pPr marL="0" indent="0">
-              <a:buNone/>
-            </a:pPr>
-            <a:r>
-              <a:rPr lang="en-US" sz="2000" dirty="0"/>
-              <a:t>6    Micropolitan low commuting: primary flow 10% to 30% to a large UC</a:t>
-            </a:r>
-          </a:p>
-          <a:p>
-            <a:pPr marL="0" indent="0">
-              <a:buNone/>
-            </a:pPr>
-            <a:r>
-              <a:rPr lang="en-US" sz="2000" dirty="0"/>
-              <a:t>7    Small town core: primary flow within an Urban Cluster of 2,500 to 9,999 (small UC)</a:t>
-            </a:r>
-          </a:p>
-          <a:p>
-            <a:pPr marL="0" indent="0">
-              <a:buNone/>
-            </a:pPr>
-            <a:r>
-              <a:rPr lang="en-US" sz="2000" dirty="0"/>
-              <a:t>8    Small town high commuting: primary flow 30% or more to a small UC</a:t>
-            </a:r>
-          </a:p>
-          <a:p>
-            <a:pPr marL="0" indent="0">
-              <a:buNone/>
-            </a:pPr>
-            <a:r>
-              <a:rPr lang="en-US" sz="2000" dirty="0"/>
-              <a:t>9    Small town low commuting: primary flow 10% to 30% to a small UC</a:t>
-            </a:r>
-          </a:p>
-          <a:p>
-            <a:pPr marL="0" indent="0">
-              <a:buNone/>
-            </a:pPr>
-            <a:r>
-              <a:rPr lang="en-US" sz="2000" dirty="0"/>
-              <a:t>10  Rural areas: primary flow to a tract outside a UA or UC</a:t>
-            </a:r>
-          </a:p>
-          <a:p>
-            <a:pPr marL="0" indent="0">
-              <a:buNone/>
-            </a:pPr>
-            <a:r>
-              <a:rPr lang="en-US" sz="2000" dirty="0"/>
-              <a:t>99  Not coded: Census tract has zero population and no rural-urban identifier information</a:t>
-            </a:r>
-          </a:p>
-          <a:p>
-            <a:endParaRPr lang="en-US" sz="2000" dirty="0"/>
-          </a:p>
-        </p:txBody>
-      </p:sp>
-    </p:spTree>
-    <p:extLst>
-      <p:ext uri="{BB962C8B-B14F-4D97-AF65-F5344CB8AC3E}">
-        <p14:creationId xmlns:p14="http://schemas.microsoft.com/office/powerpoint/2010/main" val="2484455442"/>
-      </p:ext>
-    </p:extLst>
-  </p:cSld>
-  <p:clrMapOvr>
-    <a:masterClrMapping/>
-  </p:clrMapOvr>
-</p:sld>
-</file>
-
-<file path=ppt/slides/slide3.xml><?xml version="1.0" encoding="utf-8"?>
+<file path=ppt/slides/slide2.xml><?xml version="1.0" encoding="utf-8"?>
 <p:sld xmlns:a="http://schemas.openxmlformats.org/drawingml/2006/main" xmlns:r="http://schemas.openxmlformats.org/officeDocument/2006/relationships" xmlns:p="http://schemas.openxmlformats.org/presentationml/2006/main">
   <p:cSld>
     <p:spTree>
@@ -6961,6 +7651,347 @@
 </p:sld>
 </file>
 
+<file path=ppt/slides/slide20.xml><?xml version="1.0" encoding="utf-8"?>
+<p:sld xmlns:a="http://schemas.openxmlformats.org/drawingml/2006/main" xmlns:r="http://schemas.openxmlformats.org/officeDocument/2006/relationships" xmlns:p="http://schemas.openxmlformats.org/presentationml/2006/main">
+  <p:cSld>
+    <p:spTree>
+      <p:nvGrpSpPr>
+        <p:cNvPr id="1" name=""/>
+        <p:cNvGrpSpPr/>
+        <p:nvPr/>
+      </p:nvGrpSpPr>
+      <p:grpSpPr>
+        <a:xfrm>
+          <a:off x="0" y="0"/>
+          <a:ext cx="0" cy="0"/>
+          <a:chOff x="0" y="0"/>
+          <a:chExt cx="0" cy="0"/>
+        </a:xfrm>
+      </p:grpSpPr>
+      <p:sp>
+        <p:nvSpPr>
+          <p:cNvPr id="2" name="Title 1">
+            <a:extLst>
+              <a:ext uri="{FF2B5EF4-FFF2-40B4-BE49-F238E27FC236}">
+                <a16:creationId xmlns:a16="http://schemas.microsoft.com/office/drawing/2014/main" id="{ADF81679-D144-4A2B-A7C8-E4D81B71F286}"/>
+              </a:ext>
+            </a:extLst>
+          </p:cNvPr>
+          <p:cNvSpPr>
+            <a:spLocks noGrp="1"/>
+          </p:cNvSpPr>
+          <p:nvPr>
+            <p:ph type="title"/>
+          </p:nvPr>
+        </p:nvSpPr>
+        <p:spPr/>
+        <p:txBody>
+          <a:bodyPr/>
+          <a:lstStyle/>
+          <a:p>
+            <a:r>
+              <a:rPr lang="en-US" dirty="0"/>
+              <a:t>Appendix 3: RUCA Code Definitions</a:t>
+            </a:r>
+          </a:p>
+        </p:txBody>
+      </p:sp>
+      <p:sp>
+        <p:nvSpPr>
+          <p:cNvPr id="3" name="Content Placeholder 2">
+            <a:extLst>
+              <a:ext uri="{FF2B5EF4-FFF2-40B4-BE49-F238E27FC236}">
+                <a16:creationId xmlns:a16="http://schemas.microsoft.com/office/drawing/2014/main" id="{98662D36-29DE-44EF-AC9F-139EA974CB30}"/>
+              </a:ext>
+            </a:extLst>
+          </p:cNvPr>
+          <p:cNvSpPr>
+            <a:spLocks noGrp="1"/>
+          </p:cNvSpPr>
+          <p:nvPr>
+            <p:ph idx="1"/>
+          </p:nvPr>
+        </p:nvSpPr>
+        <p:spPr/>
+        <p:txBody>
+          <a:bodyPr>
+            <a:normAutofit/>
+          </a:bodyPr>
+          <a:lstStyle/>
+          <a:p>
+            <a:pPr marL="0" indent="0">
+              <a:buNone/>
+            </a:pPr>
+            <a:r>
+              <a:rPr lang="en-US" sz="2000" dirty="0"/>
+              <a:t>Primary RUCA Codes, 2010</a:t>
+            </a:r>
+          </a:p>
+          <a:p>
+            <a:pPr marL="0" indent="0">
+              <a:buNone/>
+            </a:pPr>
+            <a:r>
+              <a:rPr lang="en-US" sz="2000" dirty="0"/>
+              <a:t>1    Metropolitan area core: primary flow within an urbanized area (UA)</a:t>
+            </a:r>
+          </a:p>
+          <a:p>
+            <a:pPr marL="0" indent="0">
+              <a:buNone/>
+            </a:pPr>
+            <a:r>
+              <a:rPr lang="en-US" sz="2000" dirty="0"/>
+              <a:t>2    Metropolitan area high commuting: primary flow 30% or more to a UA</a:t>
+            </a:r>
+          </a:p>
+          <a:p>
+            <a:pPr marL="0" indent="0">
+              <a:buNone/>
+            </a:pPr>
+            <a:r>
+              <a:rPr lang="en-US" sz="2000" dirty="0"/>
+              <a:t>3    Metropolitan area low commuting: primary flow 10% to 30% to a UA</a:t>
+            </a:r>
+          </a:p>
+          <a:p>
+            <a:pPr marL="0" indent="0">
+              <a:buNone/>
+            </a:pPr>
+            <a:r>
+              <a:rPr lang="en-US" sz="2000" dirty="0"/>
+              <a:t>4    Micropolitan area core: primary flow within an Urban Cluster of 10,000 to 49,999 (large UC)</a:t>
+            </a:r>
+          </a:p>
+          <a:p>
+            <a:pPr marL="0" indent="0">
+              <a:buNone/>
+            </a:pPr>
+            <a:r>
+              <a:rPr lang="en-US" sz="2000" dirty="0"/>
+              <a:t>5    Micropolitan high commuting: primary flow 30% or more to a large UC</a:t>
+            </a:r>
+          </a:p>
+          <a:p>
+            <a:pPr marL="0" indent="0">
+              <a:buNone/>
+            </a:pPr>
+            <a:r>
+              <a:rPr lang="en-US" sz="2000" dirty="0"/>
+              <a:t>6    Micropolitan low commuting: primary flow 10% to 30% to a large UC</a:t>
+            </a:r>
+          </a:p>
+          <a:p>
+            <a:pPr marL="0" indent="0">
+              <a:buNone/>
+            </a:pPr>
+            <a:r>
+              <a:rPr lang="en-US" sz="2000" dirty="0"/>
+              <a:t>7    Small town core: primary flow within an Urban Cluster of 2,500 to 9,999 (small UC)</a:t>
+            </a:r>
+          </a:p>
+          <a:p>
+            <a:pPr marL="0" indent="0">
+              <a:buNone/>
+            </a:pPr>
+            <a:r>
+              <a:rPr lang="en-US" sz="2000" dirty="0"/>
+              <a:t>8    Small town high commuting: primary flow 30% or more to a small UC</a:t>
+            </a:r>
+          </a:p>
+          <a:p>
+            <a:pPr marL="0" indent="0">
+              <a:buNone/>
+            </a:pPr>
+            <a:r>
+              <a:rPr lang="en-US" sz="2000" dirty="0"/>
+              <a:t>9    Small town low commuting: primary flow 10% to 30% to a small UC</a:t>
+            </a:r>
+          </a:p>
+          <a:p>
+            <a:pPr marL="0" indent="0">
+              <a:buNone/>
+            </a:pPr>
+            <a:r>
+              <a:rPr lang="en-US" sz="2000" dirty="0"/>
+              <a:t>10  Rural areas: primary flow to a tract outside a UA or UC</a:t>
+            </a:r>
+          </a:p>
+          <a:p>
+            <a:pPr marL="0" indent="0">
+              <a:buNone/>
+            </a:pPr>
+            <a:r>
+              <a:rPr lang="en-US" sz="2000" dirty="0"/>
+              <a:t>99  Not coded: Census tract has zero population and no rural-urban identifier information</a:t>
+            </a:r>
+          </a:p>
+          <a:p>
+            <a:endParaRPr lang="en-US" sz="2000" dirty="0"/>
+          </a:p>
+        </p:txBody>
+      </p:sp>
+    </p:spTree>
+    <p:extLst>
+      <p:ext uri="{BB962C8B-B14F-4D97-AF65-F5344CB8AC3E}">
+        <p14:creationId xmlns:p14="http://schemas.microsoft.com/office/powerpoint/2010/main" val="2484455442"/>
+      </p:ext>
+    </p:extLst>
+  </p:cSld>
+  <p:clrMapOvr>
+    <a:masterClrMapping/>
+  </p:clrMapOvr>
+</p:sld>
+</file>
+
+<file path=ppt/slides/slide3.xml><?xml version="1.0" encoding="utf-8"?>
+<p:sld xmlns:a="http://schemas.openxmlformats.org/drawingml/2006/main" xmlns:r="http://schemas.openxmlformats.org/officeDocument/2006/relationships" xmlns:p="http://schemas.openxmlformats.org/presentationml/2006/main">
+  <p:cSld>
+    <p:spTree>
+      <p:nvGrpSpPr>
+        <p:cNvPr id="1" name=""/>
+        <p:cNvGrpSpPr/>
+        <p:nvPr/>
+      </p:nvGrpSpPr>
+      <p:grpSpPr>
+        <a:xfrm>
+          <a:off x="0" y="0"/>
+          <a:ext cx="0" cy="0"/>
+          <a:chOff x="0" y="0"/>
+          <a:chExt cx="0" cy="0"/>
+        </a:xfrm>
+      </p:grpSpPr>
+      <p:sp>
+        <p:nvSpPr>
+          <p:cNvPr id="2" name="Title 1">
+            <a:extLst>
+              <a:ext uri="{FF2B5EF4-FFF2-40B4-BE49-F238E27FC236}">
+                <a16:creationId xmlns:a16="http://schemas.microsoft.com/office/drawing/2014/main" id="{308E6C52-0D1E-4554-B62C-F4677C1565E3}"/>
+              </a:ext>
+            </a:extLst>
+          </p:cNvPr>
+          <p:cNvSpPr>
+            <a:spLocks noGrp="1"/>
+          </p:cNvSpPr>
+          <p:nvPr>
+            <p:ph type="title"/>
+          </p:nvPr>
+        </p:nvSpPr>
+        <p:spPr/>
+        <p:txBody>
+          <a:bodyPr/>
+          <a:lstStyle/>
+          <a:p>
+            <a:r>
+              <a:rPr lang="en-US" dirty="0"/>
+              <a:t>Outline</a:t>
+            </a:r>
+          </a:p>
+        </p:txBody>
+      </p:sp>
+      <p:sp>
+        <p:nvSpPr>
+          <p:cNvPr id="3" name="Content Placeholder 2">
+            <a:extLst>
+              <a:ext uri="{FF2B5EF4-FFF2-40B4-BE49-F238E27FC236}">
+                <a16:creationId xmlns:a16="http://schemas.microsoft.com/office/drawing/2014/main" id="{E50DC301-2ADF-465C-92E0-0B3979D943E5}"/>
+              </a:ext>
+            </a:extLst>
+          </p:cNvPr>
+          <p:cNvSpPr>
+            <a:spLocks noGrp="1"/>
+          </p:cNvSpPr>
+          <p:nvPr>
+            <p:ph idx="1"/>
+          </p:nvPr>
+        </p:nvSpPr>
+        <p:spPr/>
+        <p:txBody>
+          <a:bodyPr>
+            <a:normAutofit lnSpcReduction="10000"/>
+          </a:bodyPr>
+          <a:lstStyle/>
+          <a:p>
+            <a:r>
+              <a:rPr lang="en-US" dirty="0"/>
+              <a:t>Assignment Overview</a:t>
+            </a:r>
+          </a:p>
+          <a:p>
+            <a:r>
+              <a:rPr lang="en-US" dirty="0"/>
+              <a:t>What is a Food Desert?</a:t>
+            </a:r>
+          </a:p>
+          <a:p>
+            <a:r>
+              <a:rPr lang="en-US" dirty="0"/>
+              <a:t>Food Desert Implications</a:t>
+            </a:r>
+          </a:p>
+          <a:p>
+            <a:r>
+              <a:rPr lang="en-US" dirty="0"/>
+              <a:t>Data</a:t>
+            </a:r>
+          </a:p>
+          <a:p>
+            <a:r>
+              <a:rPr lang="en-US" dirty="0"/>
+              <a:t>Data Exploration &amp; Statistics</a:t>
+            </a:r>
+          </a:p>
+          <a:p>
+            <a:r>
+              <a:rPr lang="en-US" dirty="0"/>
+              <a:t>Multivariate Analysis</a:t>
+            </a:r>
+          </a:p>
+          <a:p>
+            <a:r>
+              <a:rPr lang="en-US" dirty="0"/>
+              <a:t>Modelling Approach</a:t>
+            </a:r>
+          </a:p>
+          <a:p>
+            <a:r>
+              <a:rPr lang="en-US" dirty="0"/>
+              <a:t>Model Comparison</a:t>
+            </a:r>
+          </a:p>
+          <a:p>
+            <a:r>
+              <a:rPr lang="en-US" dirty="0"/>
+              <a:t>Variable Importance</a:t>
+            </a:r>
+          </a:p>
+          <a:p>
+            <a:r>
+              <a:rPr lang="en-US" dirty="0"/>
+              <a:t>Limitations &amp; Next Steps</a:t>
+            </a:r>
+          </a:p>
+          <a:p>
+            <a:endParaRPr lang="en-US" dirty="0"/>
+          </a:p>
+          <a:p>
+            <a:endParaRPr lang="en-US" dirty="0"/>
+          </a:p>
+        </p:txBody>
+      </p:sp>
+    </p:spTree>
+    <p:extLst>
+      <p:ext uri="{BB962C8B-B14F-4D97-AF65-F5344CB8AC3E}">
+        <p14:creationId xmlns:p14="http://schemas.microsoft.com/office/powerpoint/2010/main" val="2931730217"/>
+      </p:ext>
+    </p:extLst>
+  </p:cSld>
+  <p:clrMapOvr>
+    <a:masterClrMapping/>
+  </p:clrMapOvr>
+</p:sld>
+</file>
+
 <file path=ppt/slides/slide4.xml><?xml version="1.0" encoding="utf-8"?>
 <p:sld xmlns:a="http://schemas.openxmlformats.org/drawingml/2006/main" xmlns:r="http://schemas.openxmlformats.org/officeDocument/2006/relationships" xmlns:p="http://schemas.openxmlformats.org/presentationml/2006/main">
   <p:cSld>
@@ -6983,166 +8014,6 @@
           <p:cNvPr id="2" name="Title 1">
             <a:extLst>
               <a:ext uri="{FF2B5EF4-FFF2-40B4-BE49-F238E27FC236}">
-                <a16:creationId xmlns:a16="http://schemas.microsoft.com/office/drawing/2014/main" id="{308E6C52-0D1E-4554-B62C-F4677C1565E3}"/>
-              </a:ext>
-            </a:extLst>
-          </p:cNvPr>
-          <p:cNvSpPr>
-            <a:spLocks noGrp="1"/>
-          </p:cNvSpPr>
-          <p:nvPr>
-            <p:ph type="title"/>
-          </p:nvPr>
-        </p:nvSpPr>
-        <p:spPr/>
-        <p:txBody>
-          <a:bodyPr/>
-          <a:lstStyle/>
-          <a:p>
-            <a:r>
-              <a:rPr lang="en-US" dirty="0"/>
-              <a:t>Outline</a:t>
-            </a:r>
-          </a:p>
-        </p:txBody>
-      </p:sp>
-      <p:sp>
-        <p:nvSpPr>
-          <p:cNvPr id="3" name="Content Placeholder 2">
-            <a:extLst>
-              <a:ext uri="{FF2B5EF4-FFF2-40B4-BE49-F238E27FC236}">
-                <a16:creationId xmlns:a16="http://schemas.microsoft.com/office/drawing/2014/main" id="{E50DC301-2ADF-465C-92E0-0B3979D943E5}"/>
-              </a:ext>
-            </a:extLst>
-          </p:cNvPr>
-          <p:cNvSpPr>
-            <a:spLocks noGrp="1"/>
-          </p:cNvSpPr>
-          <p:nvPr>
-            <p:ph idx="1"/>
-          </p:nvPr>
-        </p:nvSpPr>
-        <p:spPr/>
-        <p:txBody>
-          <a:bodyPr>
-            <a:normAutofit fontScale="92500" lnSpcReduction="20000"/>
-          </a:bodyPr>
-          <a:lstStyle/>
-          <a:p>
-            <a:r>
-              <a:rPr lang="en-US" dirty="0"/>
-              <a:t>Assignment Overview</a:t>
-            </a:r>
-          </a:p>
-          <a:p>
-            <a:r>
-              <a:rPr lang="en-US" dirty="0"/>
-              <a:t>What is a Food Desert?</a:t>
-            </a:r>
-          </a:p>
-          <a:p>
-            <a:r>
-              <a:rPr lang="en-US" dirty="0"/>
-              <a:t>Food Desert Implications</a:t>
-            </a:r>
-          </a:p>
-          <a:p>
-            <a:r>
-              <a:rPr lang="en-US" dirty="0"/>
-              <a:t>Data</a:t>
-            </a:r>
-          </a:p>
-          <a:p>
-            <a:r>
-              <a:rPr lang="en-US" dirty="0"/>
-              <a:t>Data Exploration &amp; Statistics</a:t>
-            </a:r>
-          </a:p>
-          <a:p>
-            <a:r>
-              <a:rPr lang="en-US" dirty="0"/>
-              <a:t>Multivariate Analysis</a:t>
-            </a:r>
-          </a:p>
-          <a:p>
-            <a:r>
-              <a:rPr lang="en-US" dirty="0"/>
-              <a:t>Modelling Approach</a:t>
-            </a:r>
-          </a:p>
-          <a:p>
-            <a:r>
-              <a:rPr lang="en-US" dirty="0"/>
-              <a:t>Model Comparison</a:t>
-            </a:r>
-          </a:p>
-          <a:p>
-            <a:r>
-              <a:rPr lang="en-US" dirty="0"/>
-              <a:t>Variable Importance</a:t>
-            </a:r>
-          </a:p>
-          <a:p>
-            <a:r>
-              <a:rPr lang="en-US" dirty="0"/>
-              <a:t>Limitations &amp; Assumptions</a:t>
-            </a:r>
-          </a:p>
-          <a:p>
-            <a:r>
-              <a:rPr lang="en-US" dirty="0"/>
-              <a:t>Model Uses</a:t>
-            </a:r>
-          </a:p>
-          <a:p>
-            <a:r>
-              <a:rPr lang="en-US" dirty="0"/>
-              <a:t>Next Steps</a:t>
-            </a:r>
-          </a:p>
-          <a:p>
-            <a:endParaRPr lang="en-US" dirty="0"/>
-          </a:p>
-          <a:p>
-            <a:endParaRPr lang="en-US" dirty="0"/>
-          </a:p>
-        </p:txBody>
-      </p:sp>
-    </p:spTree>
-    <p:extLst>
-      <p:ext uri="{BB962C8B-B14F-4D97-AF65-F5344CB8AC3E}">
-        <p14:creationId xmlns:p14="http://schemas.microsoft.com/office/powerpoint/2010/main" val="2931730217"/>
-      </p:ext>
-    </p:extLst>
-  </p:cSld>
-  <p:clrMapOvr>
-    <a:masterClrMapping/>
-  </p:clrMapOvr>
-</p:sld>
-</file>
-
-<file path=ppt/slides/slide5.xml><?xml version="1.0" encoding="utf-8"?>
-<p:sld xmlns:a="http://schemas.openxmlformats.org/drawingml/2006/main" xmlns:r="http://schemas.openxmlformats.org/officeDocument/2006/relationships" xmlns:p="http://schemas.openxmlformats.org/presentationml/2006/main">
-  <p:cSld>
-    <p:spTree>
-      <p:nvGrpSpPr>
-        <p:cNvPr id="1" name=""/>
-        <p:cNvGrpSpPr/>
-        <p:nvPr/>
-      </p:nvGrpSpPr>
-      <p:grpSpPr>
-        <a:xfrm>
-          <a:off x="0" y="0"/>
-          <a:ext cx="0" cy="0"/>
-          <a:chOff x="0" y="0"/>
-          <a:chExt cx="0" cy="0"/>
-        </a:xfrm>
-      </p:grpSpPr>
-      <p:sp>
-        <p:nvSpPr>
-          <p:cNvPr id="2" name="Title 1">
-            <a:extLst>
-              <a:ext uri="{FF2B5EF4-FFF2-40B4-BE49-F238E27FC236}">
                 <a16:creationId xmlns:a16="http://schemas.microsoft.com/office/drawing/2014/main" id="{021C3118-93B6-429D-93EA-232A13D7524E}"/>
               </a:ext>
             </a:extLst>
@@ -7258,7 +8129,7 @@
 </p:sld>
 </file>
 
-<file path=ppt/slides/slide6.xml><?xml version="1.0" encoding="utf-8"?>
+<file path=ppt/slides/slide5.xml><?xml version="1.0" encoding="utf-8"?>
 <p:sld xmlns:a="http://schemas.openxmlformats.org/drawingml/2006/main" xmlns:r="http://schemas.openxmlformats.org/officeDocument/2006/relationships" xmlns:p="http://schemas.openxmlformats.org/presentationml/2006/main">
   <p:cSld>
     <p:spTree>
@@ -7607,7 +8478,7 @@
 </p:sld>
 </file>
 
-<file path=ppt/slides/slide7.xml><?xml version="1.0" encoding="utf-8"?>
+<file path=ppt/slides/slide6.xml><?xml version="1.0" encoding="utf-8"?>
 <p:sld xmlns:a="http://schemas.openxmlformats.org/drawingml/2006/main" xmlns:r="http://schemas.openxmlformats.org/officeDocument/2006/relationships" xmlns:p="http://schemas.openxmlformats.org/presentationml/2006/main">
   <p:cSld>
     <p:spTree>
@@ -7682,7 +8553,7 @@
           <a:p>
             <a:r>
               <a:rPr lang="en-US" dirty="0"/>
-              <a:t>Myriads of problems are associated with food deserts including obesity, malnutrition, poor nutritional behavior, child development.</a:t>
+              <a:t>Myriads of problems are associated with food deserts including obesity, malnutrition, poor nutritional choices, hindered child development.</a:t>
             </a:r>
           </a:p>
           <a:p>
@@ -7949,7 +8820,7 @@
 </p:sld>
 </file>
 
-<file path=ppt/slides/slide8.xml><?xml version="1.0" encoding="utf-8"?>
+<file path=ppt/slides/slide7.xml><?xml version="1.0" encoding="utf-8"?>
 <p:sld xmlns:a="http://schemas.openxmlformats.org/drawingml/2006/main" xmlns:r="http://schemas.openxmlformats.org/officeDocument/2006/relationships" xmlns:p="http://schemas.openxmlformats.org/presentationml/2006/main">
   <p:cSld>
     <p:spTree>
@@ -8808,7 +9679,7 @@
 </p:sld>
 </file>
 
-<file path=ppt/slides/slide9.xml><?xml version="1.0" encoding="utf-8"?>
+<file path=ppt/slides/slide8.xml><?xml version="1.0" encoding="utf-8"?>
 <p:sld xmlns:a="http://schemas.openxmlformats.org/drawingml/2006/main" xmlns:r="http://schemas.openxmlformats.org/officeDocument/2006/relationships" xmlns:p="http://schemas.openxmlformats.org/presentationml/2006/main">
   <p:cSld>
     <p:spTree>
@@ -9508,6 +10379,99 @@
 </p:sld>
 </file>
 
+<file path=ppt/slides/slide9.xml><?xml version="1.0" encoding="utf-8"?>
+<p:sld xmlns:a="http://schemas.openxmlformats.org/drawingml/2006/main" xmlns:r="http://schemas.openxmlformats.org/officeDocument/2006/relationships" xmlns:p="http://schemas.openxmlformats.org/presentationml/2006/main">
+  <p:cSld>
+    <p:spTree>
+      <p:nvGrpSpPr>
+        <p:cNvPr id="1" name=""/>
+        <p:cNvGrpSpPr/>
+        <p:nvPr/>
+      </p:nvGrpSpPr>
+      <p:grpSpPr>
+        <a:xfrm>
+          <a:off x="0" y="0"/>
+          <a:ext cx="0" cy="0"/>
+          <a:chOff x="0" y="0"/>
+          <a:chExt cx="0" cy="0"/>
+        </a:xfrm>
+      </p:grpSpPr>
+      <p:pic>
+        <p:nvPicPr>
+          <p:cNvPr id="13" name="Content Placeholder 12">
+            <a:extLst>
+              <a:ext uri="{FF2B5EF4-FFF2-40B4-BE49-F238E27FC236}">
+                <a16:creationId xmlns:a16="http://schemas.microsoft.com/office/drawing/2014/main" id="{58434196-68EF-4A07-8419-67993B8D07E3}"/>
+              </a:ext>
+            </a:extLst>
+          </p:cNvPr>
+          <p:cNvPicPr>
+            <a:picLocks noGrp="1" noChangeAspect="1"/>
+          </p:cNvPicPr>
+          <p:nvPr>
+            <p:ph idx="1"/>
+          </p:nvPr>
+        </p:nvPicPr>
+        <p:blipFill>
+          <a:blip r:embed="rId2">
+            <a:extLst>
+              <a:ext uri="{28A0092B-C50C-407E-A947-70E740481C1C}">
+                <a14:useLocalDpi xmlns:a14="http://schemas.microsoft.com/office/drawing/2010/main" val="0"/>
+              </a:ext>
+            </a:extLst>
+          </a:blip>
+          <a:stretch>
+            <a:fillRect/>
+          </a:stretch>
+        </p:blipFill>
+        <p:spPr>
+          <a:xfrm>
+            <a:off x="1242537" y="63207"/>
+            <a:ext cx="9706926" cy="6731586"/>
+          </a:xfrm>
+        </p:spPr>
+      </p:pic>
+      <p:sp>
+        <p:nvSpPr>
+          <p:cNvPr id="2" name="Title 1">
+            <a:extLst>
+              <a:ext uri="{FF2B5EF4-FFF2-40B4-BE49-F238E27FC236}">
+                <a16:creationId xmlns:a16="http://schemas.microsoft.com/office/drawing/2014/main" id="{5F5609AB-862D-47C8-9E44-2B5DBB986B57}"/>
+              </a:ext>
+            </a:extLst>
+          </p:cNvPr>
+          <p:cNvSpPr>
+            <a:spLocks noGrp="1"/>
+          </p:cNvSpPr>
+          <p:nvPr>
+            <p:ph type="title"/>
+          </p:nvPr>
+        </p:nvSpPr>
+        <p:spPr/>
+        <p:txBody>
+          <a:bodyPr/>
+          <a:lstStyle/>
+          <a:p>
+            <a:r>
+              <a:rPr lang="en-US" dirty="0"/>
+              <a:t>USDA Food Desert Designations 2017</a:t>
+            </a:r>
+          </a:p>
+        </p:txBody>
+      </p:sp>
+    </p:spTree>
+    <p:extLst>
+      <p:ext uri="{BB962C8B-B14F-4D97-AF65-F5344CB8AC3E}">
+        <p14:creationId xmlns:p14="http://schemas.microsoft.com/office/powerpoint/2010/main" val="3712077006"/>
+      </p:ext>
+    </p:extLst>
+  </p:cSld>
+  <p:clrMapOvr>
+    <a:masterClrMapping/>
+  </p:clrMapOvr>
+</p:sld>
+</file>
+
 <file path=ppt/theme/theme1.xml><?xml version="1.0" encoding="utf-8"?>
 <a:theme xmlns:a="http://schemas.openxmlformats.org/drawingml/2006/main" name="Office Theme">
   <a:themeElements>

</xml_diff>

<commit_message>
Added assumptions and logistical model specs.
</commit_message>
<xml_diff>
--- a/doc/2020_11_25_cfc_ds_technical_screen_haywood.pptx
+++ b/doc/2020_11_25_cfc_ds_technical_screen_haywood.pptx
@@ -5909,7 +5909,7 @@
           <p:nvPr>
             <p:extLst>
               <p:ext uri="{D42A27DB-BD31-4B8C-83A1-F6EECF244321}">
-                <p14:modId xmlns:p14="http://schemas.microsoft.com/office/powerpoint/2010/main" val="2594435123"/>
+                <p14:modId xmlns:p14="http://schemas.microsoft.com/office/powerpoint/2010/main" val="3955233382"/>
               </p:ext>
             </p:extLst>
           </p:nvPr>
@@ -7810,7 +7810,7 @@
           <a:p>
             <a:r>
               <a:rPr lang="en-US" dirty="0"/>
-              <a:t>Limitations &amp; Next Steps</a:t>
+              <a:t>Assumptions, Limitations, &amp; Next Steps</a:t>
             </a:r>
           </a:p>
         </p:txBody>
@@ -7829,10 +7829,10 @@
         </p:nvGrpSpPr>
         <p:grpSpPr>
           <a:xfrm>
-            <a:off x="838200" y="1609205"/>
-            <a:ext cx="10515600" cy="2435349"/>
+            <a:off x="838200" y="2725082"/>
+            <a:ext cx="10515600" cy="1850575"/>
             <a:chOff x="838200" y="1854653"/>
-            <a:chExt cx="10515600" cy="1749373"/>
+            <a:chExt cx="10515600" cy="1329315"/>
           </a:xfrm>
         </p:grpSpPr>
         <p:sp>
@@ -7905,7 +7905,7 @@
           <p:spPr>
             <a:xfrm>
               <a:off x="838200" y="2211199"/>
-              <a:ext cx="10515600" cy="1392827"/>
+              <a:ext cx="10515600" cy="972769"/>
             </a:xfrm>
             <a:prstGeom prst="rect">
               <a:avLst/>
@@ -7923,7 +7923,7 @@
                 <a:buChar char="•"/>
               </a:pPr>
               <a:r>
-                <a:rPr lang="en-US" sz="2000" dirty="0"/>
+                <a:rPr lang="en-US" sz="1600" dirty="0"/>
                 <a:t>Geographic level of data is not even. Tract-level data would be best for interpretation.</a:t>
               </a:r>
             </a:p>
@@ -7933,7 +7933,7 @@
                 <a:buChar char="•"/>
               </a:pPr>
               <a:r>
-                <a:rPr lang="en-US" sz="2000" dirty="0"/>
+                <a:rPr lang="en-US" sz="1600" dirty="0"/>
                 <a:t>Some data are not up to date. Census data is old.</a:t>
               </a:r>
             </a:p>
@@ -7943,7 +7943,7 @@
                 <a:buChar char="•"/>
               </a:pPr>
               <a:r>
-                <a:rPr lang="en-US" sz="2000" dirty="0"/>
+                <a:rPr lang="en-US" sz="1600" dirty="0"/>
                 <a:t>Evaluating variables from different years can have confounding effects.</a:t>
               </a:r>
             </a:p>
@@ -7953,7 +7953,7 @@
                 <a:buChar char="•"/>
               </a:pPr>
               <a:r>
-                <a:rPr lang="en-US" sz="2000" dirty="0"/>
+                <a:rPr lang="en-US" sz="1600" dirty="0"/>
                 <a:t>Having the number of grocery/supercenter/convenience/specialty stores at the tract level may help prediction.</a:t>
               </a:r>
             </a:p>
@@ -7963,7 +7963,7 @@
                 <a:buChar char="•"/>
               </a:pPr>
               <a:r>
-                <a:rPr lang="en-US" sz="2000" dirty="0"/>
+                <a:rPr lang="en-US" sz="1600" dirty="0"/>
                 <a:t>One week turnaround.</a:t>
               </a:r>
             </a:p>
@@ -7984,10 +7984,10 @@
         </p:nvGrpSpPr>
         <p:grpSpPr>
           <a:xfrm>
-            <a:off x="838200" y="4397204"/>
-            <a:ext cx="10515600" cy="1771496"/>
+            <a:off x="838200" y="4805040"/>
+            <a:ext cx="10515600" cy="1771495"/>
             <a:chOff x="838200" y="1857921"/>
-            <a:chExt cx="10515600" cy="1272510"/>
+            <a:chExt cx="10515600" cy="1272509"/>
           </a:xfrm>
         </p:grpSpPr>
         <p:sp>
@@ -8060,7 +8060,7 @@
           <p:spPr>
             <a:xfrm>
               <a:off x="838200" y="2179771"/>
-              <a:ext cx="10515600" cy="950660"/>
+              <a:ext cx="10515600" cy="950659"/>
             </a:xfrm>
             <a:prstGeom prst="rect">
               <a:avLst/>
@@ -8078,7 +8078,7 @@
                 <a:buChar char="•"/>
               </a:pPr>
               <a:r>
-                <a:rPr lang="en-US" sz="2000" dirty="0"/>
+                <a:rPr lang="en-US" sz="1600" dirty="0"/>
                 <a:t>Validate code.</a:t>
               </a:r>
             </a:p>
@@ -8088,7 +8088,7 @@
                 <a:buChar char="•"/>
               </a:pPr>
               <a:r>
-                <a:rPr lang="en-US" sz="2000" dirty="0"/>
+                <a:rPr lang="en-US" sz="1600" dirty="0"/>
                 <a:t>Tweak model parameters.</a:t>
               </a:r>
             </a:p>
@@ -8098,7 +8098,7 @@
                 <a:buChar char="•"/>
               </a:pPr>
               <a:r>
-                <a:rPr lang="en-US" sz="2000" dirty="0"/>
+                <a:rPr lang="en-US" sz="1600" dirty="0"/>
                 <a:t>Add more predictive model types.</a:t>
               </a:r>
             </a:p>
@@ -8108,8 +8108,143 @@
                 <a:buChar char="•"/>
               </a:pPr>
               <a:r>
-                <a:rPr lang="en-US" sz="2000" dirty="0"/>
+                <a:rPr lang="en-US" sz="1600" dirty="0"/>
+                <a:t>Estimate model uncertainty.</a:t>
+              </a:r>
+            </a:p>
+            <a:p>
+              <a:pPr marL="342900" indent="-342900">
+                <a:buFont typeface="Arial" panose="020B0604020202020204" pitchFamily="34" charset="0"/>
+                <a:buChar char="•"/>
+              </a:pPr>
+              <a:r>
+                <a:rPr lang="en-US" sz="1600" dirty="0"/>
                 <a:t>New Hanover deep dive.</a:t>
+              </a:r>
+            </a:p>
+          </p:txBody>
+        </p:sp>
+      </p:grpSp>
+      <p:grpSp>
+        <p:nvGrpSpPr>
+          <p:cNvPr id="9" name="Group 8">
+            <a:extLst>
+              <a:ext uri="{FF2B5EF4-FFF2-40B4-BE49-F238E27FC236}">
+                <a16:creationId xmlns:a16="http://schemas.microsoft.com/office/drawing/2014/main" id="{C248ECB7-FFBF-433B-8855-DA14BE2A9A3B}"/>
+              </a:ext>
+            </a:extLst>
+          </p:cNvPr>
+          <p:cNvGrpSpPr/>
+          <p:nvPr/>
+        </p:nvGrpSpPr>
+        <p:grpSpPr>
+          <a:xfrm>
+            <a:off x="838200" y="1414568"/>
+            <a:ext cx="10515600" cy="1081132"/>
+            <a:chOff x="838200" y="1854653"/>
+            <a:chExt cx="10515600" cy="776605"/>
+          </a:xfrm>
+        </p:grpSpPr>
+        <p:sp>
+          <p:nvSpPr>
+            <p:cNvPr id="13" name="Rectangle: Rounded Corners 12">
+              <a:extLst>
+                <a:ext uri="{FF2B5EF4-FFF2-40B4-BE49-F238E27FC236}">
+                  <a16:creationId xmlns:a16="http://schemas.microsoft.com/office/drawing/2014/main" id="{1B63F6FE-976F-4A0C-87BF-65AEF85E32CC}"/>
+                </a:ext>
+              </a:extLst>
+            </p:cNvPr>
+            <p:cNvSpPr/>
+            <p:nvPr/>
+          </p:nvSpPr>
+          <p:spPr>
+            <a:xfrm>
+              <a:off x="838200" y="1854653"/>
+              <a:ext cx="3235960" cy="321850"/>
+            </a:xfrm>
+            <a:prstGeom prst="roundRect">
+              <a:avLst/>
+            </a:prstGeom>
+            <a:solidFill>
+              <a:srgbClr val="65BBB5"/>
+            </a:solidFill>
+            <a:ln>
+              <a:noFill/>
+            </a:ln>
+          </p:spPr>
+          <p:style>
+            <a:lnRef idx="2">
+              <a:schemeClr val="accent1">
+                <a:shade val="50000"/>
+              </a:schemeClr>
+            </a:lnRef>
+            <a:fillRef idx="1">
+              <a:schemeClr val="accent1"/>
+            </a:fillRef>
+            <a:effectRef idx="0">
+              <a:schemeClr val="accent1"/>
+            </a:effectRef>
+            <a:fontRef idx="minor">
+              <a:schemeClr val="lt1"/>
+            </a:fontRef>
+          </p:style>
+          <p:txBody>
+            <a:bodyPr rtlCol="0" anchor="ctr"/>
+            <a:lstStyle/>
+            <a:p>
+              <a:pPr algn="ctr"/>
+              <a:r>
+                <a:rPr lang="en-US" dirty="0"/>
+                <a:t>Assumptions</a:t>
+              </a:r>
+            </a:p>
+          </p:txBody>
+        </p:sp>
+        <p:sp>
+          <p:nvSpPr>
+            <p:cNvPr id="14" name="TextBox 13">
+              <a:extLst>
+                <a:ext uri="{FF2B5EF4-FFF2-40B4-BE49-F238E27FC236}">
+                  <a16:creationId xmlns:a16="http://schemas.microsoft.com/office/drawing/2014/main" id="{CE3A8075-2914-4199-9C3E-30A50034FDEC}"/>
+                </a:ext>
+              </a:extLst>
+            </p:cNvPr>
+            <p:cNvSpPr txBox="1"/>
+            <p:nvPr/>
+          </p:nvSpPr>
+          <p:spPr>
+            <a:xfrm>
+              <a:off x="838200" y="2211199"/>
+              <a:ext cx="10515600" cy="420059"/>
+            </a:xfrm>
+            <a:prstGeom prst="rect">
+              <a:avLst/>
+            </a:prstGeom>
+            <a:noFill/>
+          </p:spPr>
+          <p:txBody>
+            <a:bodyPr wrap="square" rtlCol="0">
+              <a:spAutoFit/>
+            </a:bodyPr>
+            <a:lstStyle/>
+            <a:p>
+              <a:pPr marL="342900" indent="-342900">
+                <a:buFont typeface="Arial" panose="020B0604020202020204" pitchFamily="34" charset="0"/>
+                <a:buChar char="•"/>
+              </a:pPr>
+              <a:r>
+                <a:rPr lang="en-US" sz="1600" dirty="0"/>
+                <a:t>Data is presented as-is.</a:t>
+              </a:r>
+            </a:p>
+            <a:p>
+              <a:pPr marL="342900" indent="-342900">
+                <a:buFont typeface="Arial" panose="020B0604020202020204" pitchFamily="34" charset="0"/>
+                <a:buChar char="•"/>
+              </a:pPr>
+              <a:r>
+                <a:rPr lang="en-US" sz="1600" dirty="0"/>
+                <a:t>Changes to Census tracts over the years is not detrimental to model and analysis.</a:t>
               </a:r>
             </a:p>
           </p:txBody>
@@ -8256,31 +8391,42 @@
           </a:p>
         </p:txBody>
       </p:sp>
-      <p:sp>
-        <p:nvSpPr>
-          <p:cNvPr id="3" name="Content Placeholder 2">
+      <p:pic>
+        <p:nvPicPr>
+          <p:cNvPr id="5" name="Picture 4">
             <a:extLst>
               <a:ext uri="{FF2B5EF4-FFF2-40B4-BE49-F238E27FC236}">
-                <a16:creationId xmlns:a16="http://schemas.microsoft.com/office/drawing/2014/main" id="{3D51825C-1508-47A7-B46B-1051867231CE}"/>
+                <a16:creationId xmlns:a16="http://schemas.microsoft.com/office/drawing/2014/main" id="{EF8C5FE3-8DD0-41EB-B24F-D9AB1DE4A659}"/>
               </a:ext>
             </a:extLst>
           </p:cNvPr>
-          <p:cNvSpPr>
-            <a:spLocks noGrp="1"/>
-          </p:cNvSpPr>
-          <p:nvPr>
-            <p:ph idx="1"/>
-          </p:nvPr>
-        </p:nvSpPr>
-        <p:spPr/>
-        <p:txBody>
-          <a:bodyPr/>
-          <a:lstStyle/>
-          <a:p>
-            <a:endParaRPr lang="en-US"/>
-          </a:p>
-        </p:txBody>
-      </p:sp>
+          <p:cNvPicPr>
+            <a:picLocks noChangeAspect="1"/>
+          </p:cNvPicPr>
+          <p:nvPr/>
+        </p:nvPicPr>
+        <p:blipFill>
+          <a:blip r:embed="rId2">
+            <a:extLst>
+              <a:ext uri="{28A0092B-C50C-407E-A947-70E740481C1C}">
+                <a14:useLocalDpi xmlns:a14="http://schemas.microsoft.com/office/drawing/2010/main" val="0"/>
+              </a:ext>
+            </a:extLst>
+          </a:blip>
+          <a:stretch>
+            <a:fillRect/>
+          </a:stretch>
+        </p:blipFill>
+        <p:spPr>
+          <a:xfrm>
+            <a:off x="1104195" y="1466821"/>
+            <a:ext cx="4991805" cy="5026054"/>
+          </a:xfrm>
+          <a:prstGeom prst="rect">
+            <a:avLst/>
+          </a:prstGeom>
+        </p:spPr>
+      </p:pic>
     </p:spTree>
     <p:extLst>
       <p:ext uri="{BB962C8B-B14F-4D97-AF65-F5344CB8AC3E}">
@@ -10561,7 +10707,23 @@
                     <a:schemeClr val="tx1"/>
                   </a:solidFill>
                 </a:rPr>
-                <a:t>Food desert designation for 2010 are included, but this designation was improved upon by the USDA in 2017. This analysis will focus solely on the 2017 designation. </a:t>
+                <a:t>Food desert designation for 2010 are included, but this designation was improved upon by the USDA in 2017</a:t>
+              </a:r>
+              <a:r>
+                <a:rPr lang="en-US" baseline="30000" dirty="0">
+                  <a:solidFill>
+                    <a:srgbClr val="4B4B4B"/>
+                  </a:solidFill>
+                </a:rPr>
+                <a:t>2</a:t>
+              </a:r>
+              <a:r>
+                <a:rPr lang="en-US" sz="1800" dirty="0">
+                  <a:solidFill>
+                    <a:schemeClr val="tx1"/>
+                  </a:solidFill>
+                </a:rPr>
+                <a:t>. This analysis will focus solely on the 2017 designation. </a:t>
               </a:r>
             </a:p>
           </p:txBody>

</xml_diff>

<commit_message>
Added economic injustice graphs.
</commit_message>
<xml_diff>
--- a/doc/2020_11_25_cfc_ds_technical_screen_haywood.pptx
+++ b/doc/2020_11_25_cfc_ds_technical_screen_haywood.pptx
@@ -5,7 +5,7 @@
     <p:sldMasterId id="2147483648" r:id="rId1"/>
   </p:sldMasterIdLst>
   <p:notesMasterIdLst>
-    <p:notesMasterId r:id="rId23"/>
+    <p:notesMasterId r:id="rId25"/>
   </p:notesMasterIdLst>
   <p:sldIdLst>
     <p:sldId id="256" r:id="rId2"/>
@@ -17,18 +17,20 @@
     <p:sldId id="263" r:id="rId8"/>
     <p:sldId id="264" r:id="rId9"/>
     <p:sldId id="279" r:id="rId10"/>
-    <p:sldId id="266" r:id="rId11"/>
-    <p:sldId id="265" r:id="rId12"/>
-    <p:sldId id="280" r:id="rId13"/>
-    <p:sldId id="283" r:id="rId14"/>
-    <p:sldId id="267" r:id="rId15"/>
-    <p:sldId id="281" r:id="rId16"/>
-    <p:sldId id="268" r:id="rId17"/>
-    <p:sldId id="269" r:id="rId18"/>
-    <p:sldId id="277" r:id="rId19"/>
-    <p:sldId id="272" r:id="rId20"/>
-    <p:sldId id="273" r:id="rId21"/>
-    <p:sldId id="278" r:id="rId22"/>
+    <p:sldId id="284" r:id="rId11"/>
+    <p:sldId id="285" r:id="rId12"/>
+    <p:sldId id="266" r:id="rId13"/>
+    <p:sldId id="265" r:id="rId14"/>
+    <p:sldId id="280" r:id="rId15"/>
+    <p:sldId id="283" r:id="rId16"/>
+    <p:sldId id="267" r:id="rId17"/>
+    <p:sldId id="281" r:id="rId18"/>
+    <p:sldId id="268" r:id="rId19"/>
+    <p:sldId id="269" r:id="rId20"/>
+    <p:sldId id="277" r:id="rId21"/>
+    <p:sldId id="272" r:id="rId22"/>
+    <p:sldId id="273" r:id="rId23"/>
+    <p:sldId id="278" r:id="rId24"/>
   </p:sldIdLst>
   <p:sldSz cx="12192000" cy="6858000"/>
   <p:notesSz cx="6858000" cy="9144000"/>
@@ -156,20 +158,6 @@
     </p:extLst>
   </p:cmAuthor>
 </p:cmAuthorLst>
-</file>
-
-<file path=ppt/comments/comment1.xml><?xml version="1.0" encoding="utf-8"?>
-<p:cmLst xmlns:a="http://schemas.openxmlformats.org/drawingml/2006/main" xmlns:r="http://schemas.openxmlformats.org/officeDocument/2006/relationships" xmlns:p="http://schemas.openxmlformats.org/presentationml/2006/main">
-  <p:cm authorId="1" dt="2020-11-23T22:34:39.626" idx="1">
-    <p:pos x="10" y="10"/>
-    <p:text>Chevrons to keep track of where we are?</p:text>
-    <p:extLst>
-      <p:ext uri="{C676402C-5697-4E1C-873F-D02D1690AC5C}">
-        <p15:threadingInfo xmlns:p15="http://schemas.microsoft.com/office/powerpoint/2012/main" timeZoneBias="300"/>
-      </p:ext>
-    </p:extLst>
-  </p:cm>
-</p:cmLst>
 </file>
 
 <file path=ppt/notesMasters/notesMaster1.xml><?xml version="1.0" encoding="utf-8"?>
@@ -3901,6 +3889,530 @@
 </file>
 
 <file path=ppt/slides/slide10.xml><?xml version="1.0" encoding="utf-8"?>
+<p:sld xmlns:a="http://schemas.openxmlformats.org/drawingml/2006/main" xmlns:r="http://schemas.openxmlformats.org/officeDocument/2006/relationships" xmlns:p="http://schemas.openxmlformats.org/presentationml/2006/main">
+  <p:cSld>
+    <p:spTree>
+      <p:nvGrpSpPr>
+        <p:cNvPr id="1" name=""/>
+        <p:cNvGrpSpPr/>
+        <p:nvPr/>
+      </p:nvGrpSpPr>
+      <p:grpSpPr>
+        <a:xfrm>
+          <a:off x="0" y="0"/>
+          <a:ext cx="0" cy="0"/>
+          <a:chOff x="0" y="0"/>
+          <a:chExt cx="0" cy="0"/>
+        </a:xfrm>
+      </p:grpSpPr>
+      <p:sp>
+        <p:nvSpPr>
+          <p:cNvPr id="2" name="Title 1">
+            <a:extLst>
+              <a:ext uri="{FF2B5EF4-FFF2-40B4-BE49-F238E27FC236}">
+                <a16:creationId xmlns:a16="http://schemas.microsoft.com/office/drawing/2014/main" id="{D200652C-655C-46A3-9AA4-BD8BABC9320E}"/>
+              </a:ext>
+            </a:extLst>
+          </p:cNvPr>
+          <p:cNvSpPr>
+            <a:spLocks noGrp="1"/>
+          </p:cNvSpPr>
+          <p:nvPr>
+            <p:ph type="title"/>
+          </p:nvPr>
+        </p:nvSpPr>
+        <p:spPr/>
+        <p:txBody>
+          <a:bodyPr/>
+          <a:lstStyle/>
+          <a:p>
+            <a:r>
+              <a:rPr lang="en-US" dirty="0"/>
+              <a:t>Economic Injustice: Income</a:t>
+            </a:r>
+          </a:p>
+        </p:txBody>
+      </p:sp>
+      <p:sp>
+        <p:nvSpPr>
+          <p:cNvPr id="11" name="TextBox 10">
+            <a:extLst>
+              <a:ext uri="{FF2B5EF4-FFF2-40B4-BE49-F238E27FC236}">
+                <a16:creationId xmlns:a16="http://schemas.microsoft.com/office/drawing/2014/main" id="{93B9F2C1-B4AD-4F0E-A66D-C00C97100D86}"/>
+              </a:ext>
+            </a:extLst>
+          </p:cNvPr>
+          <p:cNvSpPr txBox="1"/>
+          <p:nvPr/>
+        </p:nvSpPr>
+        <p:spPr>
+          <a:xfrm>
+            <a:off x="838200" y="1427480"/>
+            <a:ext cx="3723640" cy="3785652"/>
+          </a:xfrm>
+          <a:prstGeom prst="rect">
+            <a:avLst/>
+          </a:prstGeom>
+          <a:noFill/>
+        </p:spPr>
+        <p:txBody>
+          <a:bodyPr wrap="square" rtlCol="0">
+            <a:spAutoFit/>
+          </a:bodyPr>
+          <a:lstStyle/>
+          <a:p>
+            <a:r>
+              <a:rPr lang="en-US" sz="1600" dirty="0">
+                <a:solidFill>
+                  <a:srgbClr val="4B4B4B"/>
+                </a:solidFill>
+              </a:rPr>
+              <a:t>As listed in [2], poverty is correlated with the percentage of households without access to a vehicle.</a:t>
+            </a:r>
+          </a:p>
+          <a:p>
+            <a:endParaRPr lang="en-US" sz="1600" dirty="0">
+              <a:solidFill>
+                <a:srgbClr val="4B4B4B"/>
+              </a:solidFill>
+            </a:endParaRPr>
+          </a:p>
+          <a:p>
+            <a:r>
+              <a:rPr lang="en-US" sz="1600" dirty="0">
+                <a:solidFill>
+                  <a:srgbClr val="4B4B4B"/>
+                </a:solidFill>
+              </a:rPr>
+              <a:t>North Carolina tract data demonstrates a correlation of r = 0.7 between graphed variables.</a:t>
+            </a:r>
+          </a:p>
+          <a:p>
+            <a:endParaRPr lang="en-US" sz="1600" dirty="0">
+              <a:solidFill>
+                <a:srgbClr val="4B4B4B"/>
+              </a:solidFill>
+            </a:endParaRPr>
+          </a:p>
+          <a:p>
+            <a:r>
+              <a:rPr lang="en-US" sz="1600" dirty="0">
+                <a:solidFill>
+                  <a:srgbClr val="4B4B4B"/>
+                </a:solidFill>
+              </a:rPr>
+              <a:t>Food deserts become more common when &gt;25% of a census tract lives in poverty and &gt;10% have no access to a vehicle.</a:t>
+            </a:r>
+          </a:p>
+          <a:p>
+            <a:endParaRPr lang="en-US" sz="1600" dirty="0">
+              <a:solidFill>
+                <a:srgbClr val="4B4B4B"/>
+              </a:solidFill>
+            </a:endParaRPr>
+          </a:p>
+          <a:p>
+            <a:r>
+              <a:rPr lang="en-US" sz="1600" dirty="0">
+                <a:solidFill>
+                  <a:srgbClr val="4B4B4B"/>
+                </a:solidFill>
+              </a:rPr>
+              <a:t>These two variables alone cannot perfectly define food deserts, so variation exists.</a:t>
+            </a:r>
+          </a:p>
+        </p:txBody>
+      </p:sp>
+      <p:pic>
+        <p:nvPicPr>
+          <p:cNvPr id="13" name="Picture 12">
+            <a:extLst>
+              <a:ext uri="{FF2B5EF4-FFF2-40B4-BE49-F238E27FC236}">
+                <a16:creationId xmlns:a16="http://schemas.microsoft.com/office/drawing/2014/main" id="{9CC5E8E0-E831-40FF-8AD5-0F264E3FECD4}"/>
+              </a:ext>
+            </a:extLst>
+          </p:cNvPr>
+          <p:cNvPicPr>
+            <a:picLocks noChangeAspect="1"/>
+          </p:cNvPicPr>
+          <p:nvPr/>
+        </p:nvPicPr>
+        <p:blipFill>
+          <a:blip r:embed="rId2">
+            <a:extLst>
+              <a:ext uri="{28A0092B-C50C-407E-A947-70E740481C1C}">
+                <a14:useLocalDpi xmlns:a14="http://schemas.microsoft.com/office/drawing/2010/main" val="0"/>
+              </a:ext>
+            </a:extLst>
+          </a:blip>
+          <a:stretch>
+            <a:fillRect/>
+          </a:stretch>
+        </p:blipFill>
+        <p:spPr>
+          <a:xfrm>
+            <a:off x="4760990" y="1426464"/>
+            <a:ext cx="6592810" cy="4572000"/>
+          </a:xfrm>
+          <a:prstGeom prst="rect">
+            <a:avLst/>
+          </a:prstGeom>
+        </p:spPr>
+      </p:pic>
+    </p:spTree>
+    <p:extLst>
+      <p:ext uri="{BB962C8B-B14F-4D97-AF65-F5344CB8AC3E}">
+        <p14:creationId xmlns:p14="http://schemas.microsoft.com/office/powerpoint/2010/main" val="2277108501"/>
+      </p:ext>
+    </p:extLst>
+  </p:cSld>
+  <p:clrMapOvr>
+    <a:masterClrMapping/>
+  </p:clrMapOvr>
+</p:sld>
+</file>
+
+<file path=ppt/slides/slide11.xml><?xml version="1.0" encoding="utf-8"?>
+<p:sld xmlns:a="http://schemas.openxmlformats.org/drawingml/2006/main" xmlns:r="http://schemas.openxmlformats.org/officeDocument/2006/relationships" xmlns:p="http://schemas.openxmlformats.org/presentationml/2006/main">
+  <p:cSld>
+    <p:spTree>
+      <p:nvGrpSpPr>
+        <p:cNvPr id="1" name=""/>
+        <p:cNvGrpSpPr/>
+        <p:nvPr/>
+      </p:nvGrpSpPr>
+      <p:grpSpPr>
+        <a:xfrm>
+          <a:off x="0" y="0"/>
+          <a:ext cx="0" cy="0"/>
+          <a:chOff x="0" y="0"/>
+          <a:chExt cx="0" cy="0"/>
+        </a:xfrm>
+      </p:grpSpPr>
+      <p:sp>
+        <p:nvSpPr>
+          <p:cNvPr id="2" name="Title 1">
+            <a:extLst>
+              <a:ext uri="{FF2B5EF4-FFF2-40B4-BE49-F238E27FC236}">
+                <a16:creationId xmlns:a16="http://schemas.microsoft.com/office/drawing/2014/main" id="{D200652C-655C-46A3-9AA4-BD8BABC9320E}"/>
+              </a:ext>
+            </a:extLst>
+          </p:cNvPr>
+          <p:cNvSpPr>
+            <a:spLocks noGrp="1"/>
+          </p:cNvSpPr>
+          <p:nvPr>
+            <p:ph type="title"/>
+          </p:nvPr>
+        </p:nvSpPr>
+        <p:spPr/>
+        <p:txBody>
+          <a:bodyPr/>
+          <a:lstStyle/>
+          <a:p>
+            <a:r>
+              <a:rPr lang="en-US" dirty="0"/>
+              <a:t>Economic Injustice: Race</a:t>
+            </a:r>
+          </a:p>
+        </p:txBody>
+      </p:sp>
+      <p:sp>
+        <p:nvSpPr>
+          <p:cNvPr id="5" name="TextBox 4">
+            <a:extLst>
+              <a:ext uri="{FF2B5EF4-FFF2-40B4-BE49-F238E27FC236}">
+                <a16:creationId xmlns:a16="http://schemas.microsoft.com/office/drawing/2014/main" id="{88FB2EFF-23F2-414F-BBA1-D1323E59C942}"/>
+              </a:ext>
+            </a:extLst>
+          </p:cNvPr>
+          <p:cNvSpPr txBox="1"/>
+          <p:nvPr/>
+        </p:nvSpPr>
+        <p:spPr>
+          <a:xfrm>
+            <a:off x="838200" y="1427480"/>
+            <a:ext cx="3723640" cy="4031873"/>
+          </a:xfrm>
+          <a:prstGeom prst="rect">
+            <a:avLst/>
+          </a:prstGeom>
+          <a:noFill/>
+        </p:spPr>
+        <p:txBody>
+          <a:bodyPr wrap="square" rtlCol="0">
+            <a:spAutoFit/>
+          </a:bodyPr>
+          <a:lstStyle/>
+          <a:p>
+            <a:r>
+              <a:rPr lang="en-US" sz="1600" dirty="0">
+                <a:solidFill>
+                  <a:srgbClr val="4B4B4B"/>
+                </a:solidFill>
+              </a:rPr>
+              <a:t>Research debates the effect of race on food desertification</a:t>
+            </a:r>
+            <a:r>
+              <a:rPr lang="en-US" sz="1600" baseline="30000" dirty="0">
+                <a:solidFill>
+                  <a:srgbClr val="4B4B4B"/>
+                </a:solidFill>
+              </a:rPr>
+              <a:t>1</a:t>
+            </a:r>
+            <a:r>
+              <a:rPr lang="en-US" sz="1600" dirty="0">
+                <a:solidFill>
+                  <a:srgbClr val="4B4B4B"/>
+                </a:solidFill>
+              </a:rPr>
+              <a:t>.</a:t>
+            </a:r>
+          </a:p>
+          <a:p>
+            <a:endParaRPr lang="en-US" sz="1600" dirty="0">
+              <a:solidFill>
+                <a:srgbClr val="4B4B4B"/>
+              </a:solidFill>
+            </a:endParaRPr>
+          </a:p>
+          <a:p>
+            <a:r>
+              <a:rPr lang="en-US" sz="1600" dirty="0">
+                <a:solidFill>
+                  <a:srgbClr val="4B4B4B"/>
+                </a:solidFill>
+              </a:rPr>
+              <a:t>North Carolina has a mix of food desert counties between whites and blacks. However, some of the blackest counties have the highest percentage of food desert tracts and vice-versa.</a:t>
+            </a:r>
+          </a:p>
+          <a:p>
+            <a:endParaRPr lang="en-US" sz="1600" dirty="0">
+              <a:solidFill>
+                <a:srgbClr val="4B4B4B"/>
+              </a:solidFill>
+            </a:endParaRPr>
+          </a:p>
+          <a:p>
+            <a:r>
+              <a:rPr lang="en-US" sz="1600" dirty="0">
+                <a:solidFill>
+                  <a:srgbClr val="4B4B4B"/>
+                </a:solidFill>
+              </a:rPr>
+              <a:t>Including race metrics into model can cause algorithmic bias. A demonstratable causative effect of race on food desertification is not sensible.</a:t>
+            </a:r>
+          </a:p>
+          <a:p>
+            <a:endParaRPr lang="en-US" sz="1600" dirty="0">
+              <a:solidFill>
+                <a:srgbClr val="4B4B4B"/>
+              </a:solidFill>
+            </a:endParaRPr>
+          </a:p>
+          <a:p>
+            <a:endParaRPr lang="en-US" sz="1600" dirty="0">
+              <a:solidFill>
+                <a:srgbClr val="4B4B4B"/>
+              </a:solidFill>
+            </a:endParaRPr>
+          </a:p>
+          <a:p>
+            <a:endParaRPr lang="en-US" sz="1600" dirty="0">
+              <a:solidFill>
+                <a:srgbClr val="4B4B4B"/>
+              </a:solidFill>
+            </a:endParaRPr>
+          </a:p>
+        </p:txBody>
+      </p:sp>
+      <p:grpSp>
+        <p:nvGrpSpPr>
+          <p:cNvPr id="8" name="Group 7">
+            <a:extLst>
+              <a:ext uri="{FF2B5EF4-FFF2-40B4-BE49-F238E27FC236}">
+                <a16:creationId xmlns:a16="http://schemas.microsoft.com/office/drawing/2014/main" id="{7E4AE7EA-180D-48C7-98E3-1A3600D4176A}"/>
+              </a:ext>
+            </a:extLst>
+          </p:cNvPr>
+          <p:cNvGrpSpPr/>
+          <p:nvPr/>
+        </p:nvGrpSpPr>
+        <p:grpSpPr>
+          <a:xfrm>
+            <a:off x="838200" y="5557516"/>
+            <a:ext cx="3723640" cy="935353"/>
+            <a:chOff x="833120" y="3673496"/>
+            <a:chExt cx="10515600" cy="338835"/>
+          </a:xfrm>
+        </p:grpSpPr>
+        <p:sp>
+          <p:nvSpPr>
+            <p:cNvPr id="10" name="Rectangle: Rounded Corners 9">
+              <a:extLst>
+                <a:ext uri="{FF2B5EF4-FFF2-40B4-BE49-F238E27FC236}">
+                  <a16:creationId xmlns:a16="http://schemas.microsoft.com/office/drawing/2014/main" id="{9D90C7A6-4256-4F65-BD14-57C5300E81B1}"/>
+                </a:ext>
+              </a:extLst>
+            </p:cNvPr>
+            <p:cNvSpPr/>
+            <p:nvPr/>
+          </p:nvSpPr>
+          <p:spPr>
+            <a:xfrm>
+              <a:off x="833120" y="3673496"/>
+              <a:ext cx="10515600" cy="303079"/>
+            </a:xfrm>
+            <a:prstGeom prst="roundRect">
+              <a:avLst/>
+            </a:prstGeom>
+            <a:solidFill>
+              <a:srgbClr val="FFFFFF"/>
+            </a:solidFill>
+            <a:ln w="19050">
+              <a:solidFill>
+                <a:srgbClr val="65BBB5"/>
+              </a:solidFill>
+            </a:ln>
+          </p:spPr>
+          <p:style>
+            <a:lnRef idx="2">
+              <a:schemeClr val="accent1">
+                <a:shade val="50000"/>
+              </a:schemeClr>
+            </a:lnRef>
+            <a:fillRef idx="1">
+              <a:schemeClr val="accent1"/>
+            </a:fillRef>
+            <a:effectRef idx="0">
+              <a:schemeClr val="accent1"/>
+            </a:effectRef>
+            <a:fontRef idx="minor">
+              <a:schemeClr val="lt1"/>
+            </a:fontRef>
+          </p:style>
+          <p:txBody>
+            <a:bodyPr rtlCol="0" anchor="ctr"/>
+            <a:lstStyle/>
+            <a:p>
+              <a:r>
+                <a:rPr lang="en-US" sz="1800" dirty="0">
+                  <a:solidFill>
+                    <a:srgbClr val="4B4B4B"/>
+                  </a:solidFill>
+                </a:rPr>
+                <a:t>Percentages are affected by the total number of tracts in a county.</a:t>
+              </a:r>
+            </a:p>
+          </p:txBody>
+        </p:sp>
+        <p:sp>
+          <p:nvSpPr>
+            <p:cNvPr id="11" name="Rectangle: Rounded Corners 10">
+              <a:extLst>
+                <a:ext uri="{FF2B5EF4-FFF2-40B4-BE49-F238E27FC236}">
+                  <a16:creationId xmlns:a16="http://schemas.microsoft.com/office/drawing/2014/main" id="{D06920E4-C85E-4AE4-B38C-DE3AD5874075}"/>
+                </a:ext>
+              </a:extLst>
+            </p:cNvPr>
+            <p:cNvSpPr/>
+            <p:nvPr/>
+          </p:nvSpPr>
+          <p:spPr>
+            <a:xfrm>
+              <a:off x="5311315" y="3940820"/>
+              <a:ext cx="5395770" cy="71511"/>
+            </a:xfrm>
+            <a:prstGeom prst="roundRect">
+              <a:avLst/>
+            </a:prstGeom>
+            <a:solidFill>
+              <a:srgbClr val="65BBB5"/>
+            </a:solidFill>
+            <a:ln>
+              <a:noFill/>
+            </a:ln>
+          </p:spPr>
+          <p:style>
+            <a:lnRef idx="2">
+              <a:schemeClr val="accent1">
+                <a:shade val="50000"/>
+              </a:schemeClr>
+            </a:lnRef>
+            <a:fillRef idx="1">
+              <a:schemeClr val="accent1"/>
+            </a:fillRef>
+            <a:effectRef idx="0">
+              <a:schemeClr val="accent1"/>
+            </a:effectRef>
+            <a:fontRef idx="minor">
+              <a:schemeClr val="lt1"/>
+            </a:fontRef>
+          </p:style>
+          <p:txBody>
+            <a:bodyPr rtlCol="0" anchor="ctr"/>
+            <a:lstStyle/>
+            <a:p>
+              <a:pPr algn="ctr"/>
+              <a:r>
+                <a:rPr lang="en-US" b="1" dirty="0"/>
+                <a:t>Note</a:t>
+              </a:r>
+            </a:p>
+          </p:txBody>
+        </p:sp>
+      </p:grpSp>
+      <p:pic>
+        <p:nvPicPr>
+          <p:cNvPr id="12" name="Picture 11">
+            <a:extLst>
+              <a:ext uri="{FF2B5EF4-FFF2-40B4-BE49-F238E27FC236}">
+                <a16:creationId xmlns:a16="http://schemas.microsoft.com/office/drawing/2014/main" id="{6F6947AF-913A-4902-AB0B-E1FA3971B50A}"/>
+              </a:ext>
+            </a:extLst>
+          </p:cNvPr>
+          <p:cNvPicPr>
+            <a:picLocks noChangeAspect="1"/>
+          </p:cNvPicPr>
+          <p:nvPr/>
+        </p:nvPicPr>
+        <p:blipFill>
+          <a:blip r:embed="rId2">
+            <a:extLst>
+              <a:ext uri="{28A0092B-C50C-407E-A947-70E740481C1C}">
+                <a14:useLocalDpi xmlns:a14="http://schemas.microsoft.com/office/drawing/2010/main" val="0"/>
+              </a:ext>
+            </a:extLst>
+          </a:blip>
+          <a:stretch>
+            <a:fillRect/>
+          </a:stretch>
+        </p:blipFill>
+        <p:spPr>
+          <a:xfrm>
+            <a:off x="4760990" y="1426464"/>
+            <a:ext cx="6592810" cy="4572000"/>
+          </a:xfrm>
+          <a:prstGeom prst="rect">
+            <a:avLst/>
+          </a:prstGeom>
+        </p:spPr>
+      </p:pic>
+    </p:spTree>
+    <p:extLst>
+      <p:ext uri="{BB962C8B-B14F-4D97-AF65-F5344CB8AC3E}">
+        <p14:creationId xmlns:p14="http://schemas.microsoft.com/office/powerpoint/2010/main" val="3295407943"/>
+      </p:ext>
+    </p:extLst>
+  </p:cSld>
+  <p:clrMapOvr>
+    <a:masterClrMapping/>
+  </p:clrMapOvr>
+</p:sld>
+</file>
+
+<file path=ppt/slides/slide12.xml><?xml version="1.0" encoding="utf-8"?>
 <p:sld xmlns:a="http://schemas.openxmlformats.org/drawingml/2006/main" xmlns:r="http://schemas.openxmlformats.org/officeDocument/2006/relationships" xmlns:p="http://schemas.openxmlformats.org/presentationml/2006/main">
   <p:cSld>
     <p:spTree>
@@ -4863,7 +5375,7 @@
 </p:sld>
 </file>
 
-<file path=ppt/slides/slide11.xml><?xml version="1.0" encoding="utf-8"?>
+<file path=ppt/slides/slide13.xml><?xml version="1.0" encoding="utf-8"?>
 <p:sld xmlns:a="http://schemas.openxmlformats.org/drawingml/2006/main" xmlns:r="http://schemas.openxmlformats.org/officeDocument/2006/relationships" xmlns:p="http://schemas.openxmlformats.org/presentationml/2006/main">
   <p:cSld>
     <p:spTree>
@@ -5102,24 +5614,44 @@
           <a:lstStyle/>
           <a:p>
             <a:r>
-              <a:rPr lang="en-US" sz="1600" dirty="0"/>
+              <a:rPr lang="en-US" sz="1600" dirty="0">
+                <a:solidFill>
+                  <a:srgbClr val="4B4B4B"/>
+                </a:solidFill>
+              </a:rPr>
               <a:t>Multivariate analysis finds differentiators for food deserts.</a:t>
             </a:r>
           </a:p>
           <a:p>
-            <a:endParaRPr lang="en-US" sz="1600" dirty="0"/>
-          </a:p>
-          <a:p>
-            <a:r>
-              <a:rPr lang="en-US" sz="1600" dirty="0"/>
+            <a:endParaRPr lang="en-US" sz="1600" dirty="0">
+              <a:solidFill>
+                <a:srgbClr val="4B4B4B"/>
+              </a:solidFill>
+            </a:endParaRPr>
+          </a:p>
+          <a:p>
+            <a:r>
+              <a:rPr lang="en-US" sz="1600" dirty="0">
+                <a:solidFill>
+                  <a:srgbClr val="4B4B4B"/>
+                </a:solidFill>
+              </a:rPr>
               <a:t>Four variables shine as </a:t>
             </a:r>
             <a:r>
-              <a:rPr lang="en-US" sz="1600" b="1" dirty="0"/>
+              <a:rPr lang="en-US" sz="1600" b="1" dirty="0">
+                <a:solidFill>
+                  <a:srgbClr val="4B4B4B"/>
+                </a:solidFill>
+              </a:rPr>
               <a:t>differentiators</a:t>
             </a:r>
             <a:r>
-              <a:rPr lang="en-US" sz="1600" dirty="0"/>
+              <a:rPr lang="en-US" sz="1600" dirty="0">
+                <a:solidFill>
+                  <a:srgbClr val="4B4B4B"/>
+                </a:solidFill>
+              </a:rPr>
               <a:t> of food deserts:</a:t>
             </a:r>
           </a:p>
@@ -5129,7 +5661,11 @@
               <a:buChar char="•"/>
             </a:pPr>
             <a:r>
-              <a:rPr lang="en-US" sz="1600" b="1" dirty="0"/>
+              <a:rPr lang="en-US" sz="1600" b="1" dirty="0">
+                <a:solidFill>
+                  <a:srgbClr val="4B4B4B"/>
+                </a:solidFill>
+              </a:rPr>
               <a:t>Poverty rate</a:t>
             </a:r>
           </a:p>
@@ -5139,7 +5675,11 @@
               <a:buChar char="•"/>
             </a:pPr>
             <a:r>
-              <a:rPr lang="en-US" sz="1600" b="1" dirty="0"/>
+              <a:rPr lang="en-US" sz="1600" b="1" dirty="0">
+                <a:solidFill>
+                  <a:srgbClr val="4B4B4B"/>
+                </a:solidFill>
+              </a:rPr>
               <a:t>Median Family Income</a:t>
             </a:r>
           </a:p>
@@ -5149,15 +5689,27 @@
               <a:buChar char="•"/>
             </a:pPr>
             <a:r>
-              <a:rPr lang="en-US" sz="1600" b="1" dirty="0"/>
+              <a:rPr lang="en-US" sz="1600" b="1" dirty="0">
+                <a:solidFill>
+                  <a:srgbClr val="4B4B4B"/>
+                </a:solidFill>
+              </a:rPr>
               <a:t>Log Population per </a:t>
             </a:r>
             <a:r>
-              <a:rPr lang="en-US" sz="1600" b="1" dirty="0" err="1"/>
+              <a:rPr lang="en-US" sz="1600" b="1" dirty="0" err="1">
+                <a:solidFill>
+                  <a:srgbClr val="4B4B4B"/>
+                </a:solidFill>
+              </a:rPr>
               <a:t>Sqmi</a:t>
             </a:r>
             <a:r>
-              <a:rPr lang="en-US" sz="1600" b="1" dirty="0"/>
+              <a:rPr lang="en-US" sz="1600" b="1" dirty="0">
+                <a:solidFill>
+                  <a:srgbClr val="4B4B4B"/>
+                </a:solidFill>
+              </a:rPr>
               <a:t>. 2018 (generated)</a:t>
             </a:r>
           </a:p>
@@ -5167,7 +5719,11 @@
               <a:buChar char="•"/>
             </a:pPr>
             <a:r>
-              <a:rPr lang="en-US" sz="1600" b="1" dirty="0"/>
+              <a:rPr lang="en-US" sz="1600" b="1" dirty="0">
+                <a:solidFill>
+                  <a:srgbClr val="4B4B4B"/>
+                </a:solidFill>
+              </a:rPr>
               <a:t>% Households No Vehicle</a:t>
             </a:r>
           </a:p>
@@ -5176,20 +5732,36 @@
               <a:buFont typeface="Arial" panose="020B0604020202020204" pitchFamily="34" charset="0"/>
               <a:buChar char="•"/>
             </a:pPr>
-            <a:endParaRPr lang="en-US" sz="1600" dirty="0"/>
-          </a:p>
-          <a:p>
-            <a:r>
-              <a:rPr lang="en-US" sz="1600" dirty="0"/>
+            <a:endParaRPr lang="en-US" sz="1600" dirty="0">
+              <a:solidFill>
+                <a:srgbClr val="4B4B4B"/>
+              </a:solidFill>
+            </a:endParaRPr>
+          </a:p>
+          <a:p>
+            <a:r>
+              <a:rPr lang="en-US" sz="1600" dirty="0">
+                <a:solidFill>
+                  <a:srgbClr val="4B4B4B"/>
+                </a:solidFill>
+              </a:rPr>
               <a:t>These variables end up carrying through into the final model.</a:t>
             </a:r>
           </a:p>
           <a:p>
-            <a:endParaRPr lang="en-US" sz="1600" dirty="0"/>
-          </a:p>
-          <a:p>
-            <a:r>
-              <a:rPr lang="en-US" sz="1600" dirty="0"/>
+            <a:endParaRPr lang="en-US" sz="1600" dirty="0">
+              <a:solidFill>
+                <a:srgbClr val="4B4B4B"/>
+              </a:solidFill>
+            </a:endParaRPr>
+          </a:p>
+          <a:p>
+            <a:r>
+              <a:rPr lang="en-US" sz="1600" dirty="0">
+                <a:solidFill>
+                  <a:srgbClr val="4B4B4B"/>
+                </a:solidFill>
+              </a:rPr>
               <a:t>Six variables were generated by combining variables from the given set. This helps find hidden relationships in the data.</a:t>
             </a:r>
           </a:p>
@@ -5208,7 +5780,7 @@
 </p:sld>
 </file>
 
-<file path=ppt/slides/slide12.xml><?xml version="1.0" encoding="utf-8"?>
+<file path=ppt/slides/slide14.xml><?xml version="1.0" encoding="utf-8"?>
 <p:sld xmlns:a="http://schemas.openxmlformats.org/drawingml/2006/main" xmlns:r="http://schemas.openxmlformats.org/officeDocument/2006/relationships" xmlns:p="http://schemas.openxmlformats.org/presentationml/2006/main">
   <p:cSld>
     <p:spTree>
@@ -5849,7 +6421,7 @@
 </p:sld>
 </file>
 
-<file path=ppt/slides/slide13.xml><?xml version="1.0" encoding="utf-8"?>
+<file path=ppt/slides/slide15.xml><?xml version="1.0" encoding="utf-8"?>
 <p:sld xmlns:a="http://schemas.openxmlformats.org/drawingml/2006/main" xmlns:r="http://schemas.openxmlformats.org/officeDocument/2006/relationships" xmlns:p="http://schemas.openxmlformats.org/presentationml/2006/main">
   <p:cSld>
     <p:spTree>
@@ -6547,10 +7119,10 @@
         </p:nvGrpSpPr>
         <p:grpSpPr>
           <a:xfrm>
-            <a:off x="2458720" y="5778629"/>
-            <a:ext cx="1818640" cy="714246"/>
-            <a:chOff x="833120" y="3719051"/>
-            <a:chExt cx="10515600" cy="194870"/>
+            <a:off x="838200" y="5797139"/>
+            <a:ext cx="1940560" cy="695736"/>
+            <a:chOff x="480642" y="3712844"/>
+            <a:chExt cx="11220556" cy="189820"/>
           </a:xfrm>
         </p:grpSpPr>
         <p:sp>
@@ -6568,7 +7140,7 @@
           <p:spPr>
             <a:xfrm>
               <a:off x="833120" y="3719051"/>
-              <a:ext cx="10515600" cy="194870"/>
+              <a:ext cx="10515600" cy="183613"/>
             </a:xfrm>
             <a:prstGeom prst="roundRect">
               <a:avLst/>
@@ -6633,8 +7205,8 @@
           </p:nvSpPr>
           <p:spPr>
             <a:xfrm>
-              <a:off x="833120" y="3719051"/>
-              <a:ext cx="10515600" cy="93365"/>
+              <a:off x="480642" y="3712844"/>
+              <a:ext cx="11220556" cy="92704"/>
             </a:xfrm>
             <a:prstGeom prst="roundRect">
               <a:avLst/>
@@ -6689,7 +7261,7 @@
 </p:sld>
 </file>
 
-<file path=ppt/slides/slide14.xml><?xml version="1.0" encoding="utf-8"?>
+<file path=ppt/slides/slide16.xml><?xml version="1.0" encoding="utf-8"?>
 <p:sld xmlns:a="http://schemas.openxmlformats.org/drawingml/2006/main" xmlns:r="http://schemas.openxmlformats.org/officeDocument/2006/relationships" xmlns:p="http://schemas.openxmlformats.org/presentationml/2006/main">
   <p:cSld>
     <p:spTree>
@@ -6764,8 +7336,8 @@
         </p:blipFill>
         <p:spPr>
           <a:xfrm>
-            <a:off x="5244920" y="1427480"/>
-            <a:ext cx="6108880" cy="4236403"/>
+            <a:off x="5191760" y="1427480"/>
+            <a:ext cx="6592810" cy="4572000"/>
           </a:xfrm>
         </p:spPr>
       </p:pic>
@@ -6784,7 +7356,7 @@
         <p:spPr>
           <a:xfrm>
             <a:off x="838200" y="1427480"/>
-            <a:ext cx="3723640" cy="4524315"/>
+            <a:ext cx="3723640" cy="3785652"/>
           </a:xfrm>
           <a:prstGeom prst="rect">
             <a:avLst/>
@@ -6798,51 +7370,78 @@
           <a:lstStyle/>
           <a:p>
             <a:r>
-              <a:rPr lang="en-US" sz="1600" dirty="0"/>
-              <a:t>ROC Curves are the primary method for evaluating binary prediction variables.</a:t>
-            </a:r>
-          </a:p>
-          <a:p>
-            <a:endParaRPr lang="en-US" sz="1600" dirty="0"/>
-          </a:p>
-          <a:p>
-            <a:r>
-              <a:rPr lang="en-US" sz="1600" b="1" dirty="0"/>
+              <a:rPr lang="en-US" sz="1600" b="1" dirty="0">
+                <a:solidFill>
+                  <a:srgbClr val="4B4B4B"/>
+                </a:solidFill>
+              </a:rPr>
               <a:t>X-axis: False Positive Rate: </a:t>
             </a:r>
             <a:r>
-              <a:rPr lang="en-US" sz="1600" dirty="0"/>
+              <a:rPr lang="en-US" sz="1600" dirty="0">
+                <a:solidFill>
+                  <a:srgbClr val="4B4B4B"/>
+                </a:solidFill>
+              </a:rPr>
               <a:t>The percent of tracts incorrectly predicted as a food desert (“false alarm”).</a:t>
             </a:r>
           </a:p>
           <a:p>
-            <a:endParaRPr lang="en-US" sz="1600" dirty="0"/>
-          </a:p>
-          <a:p>
-            <a:r>
-              <a:rPr lang="en-US" sz="1600" b="1" dirty="0"/>
+            <a:endParaRPr lang="en-US" sz="1600" dirty="0">
+              <a:solidFill>
+                <a:srgbClr val="4B4B4B"/>
+              </a:solidFill>
+            </a:endParaRPr>
+          </a:p>
+          <a:p>
+            <a:r>
+              <a:rPr lang="en-US" sz="1600" b="1" dirty="0">
+                <a:solidFill>
+                  <a:srgbClr val="4B4B4B"/>
+                </a:solidFill>
+              </a:rPr>
               <a:t>Y-axis: True Positive Rate: </a:t>
             </a:r>
             <a:r>
-              <a:rPr lang="en-US" sz="1600" dirty="0"/>
+              <a:rPr lang="en-US" sz="1600" dirty="0">
+                <a:solidFill>
+                  <a:srgbClr val="4B4B4B"/>
+                </a:solidFill>
+              </a:rPr>
               <a:t>The percent of tracts correctly predicted as a food desert.</a:t>
             </a:r>
           </a:p>
           <a:p>
-            <a:endParaRPr lang="en-US" sz="1600" dirty="0"/>
-          </a:p>
-          <a:p>
-            <a:r>
-              <a:rPr lang="en-US" sz="1600" dirty="0"/>
+            <a:endParaRPr lang="en-US" sz="1600" dirty="0">
+              <a:solidFill>
+                <a:srgbClr val="4B4B4B"/>
+              </a:solidFill>
+            </a:endParaRPr>
+          </a:p>
+          <a:p>
+            <a:r>
+              <a:rPr lang="en-US" sz="1600" dirty="0">
+                <a:solidFill>
+                  <a:srgbClr val="4B4B4B"/>
+                </a:solidFill>
+              </a:rPr>
               <a:t>The area under the curve (AUC) for the Random Forest (k = 50) is 0.91, signaling strong performance on the test set.</a:t>
             </a:r>
           </a:p>
           <a:p>
-            <a:endParaRPr lang="en-US" sz="1600" dirty="0"/>
-          </a:p>
-          <a:p>
-            <a:r>
-              <a:rPr lang="en-US" sz="1600" dirty="0"/>
+            <a:endParaRPr lang="en-US" sz="1600" dirty="0">
+              <a:solidFill>
+                <a:srgbClr val="4B4B4B"/>
+              </a:solidFill>
+            </a:endParaRPr>
+          </a:p>
+          <a:p>
+            <a:r>
+              <a:rPr lang="en-US" sz="1600" dirty="0">
+                <a:solidFill>
+                  <a:srgbClr val="4B4B4B"/>
+                </a:solidFill>
+              </a:rPr>
               <a:t>Random Forest (k = 50) recalls &gt;50% of the food deserts within the first 10% of the data. This indicates it is doing very well at giving food deserts high scores.</a:t>
             </a:r>
           </a:p>
@@ -6862,7 +7461,7 @@
         </p:nvGrpSpPr>
         <p:grpSpPr>
           <a:xfrm>
-            <a:off x="7630160" y="5746832"/>
+            <a:off x="838200" y="5683276"/>
             <a:ext cx="3723640" cy="809599"/>
             <a:chOff x="833120" y="3719051"/>
             <a:chExt cx="10515600" cy="293280"/>
@@ -6920,7 +7519,7 @@
               <a:r>
                 <a:rPr lang="en-US" sz="1800" dirty="0">
                   <a:solidFill>
-                    <a:schemeClr val="tx1"/>
+                    <a:srgbClr val="4B4B4B"/>
                   </a:solidFill>
                 </a:rPr>
                 <a:t>Real-world performance is not guaranteed.</a:t>
@@ -6997,7 +7596,7 @@
 </p:sld>
 </file>
 
-<file path=ppt/slides/slide15.xml><?xml version="1.0" encoding="utf-8"?>
+<file path=ppt/slides/slide17.xml><?xml version="1.0" encoding="utf-8"?>
 <p:sld xmlns:a="http://schemas.openxmlformats.org/drawingml/2006/main" xmlns:r="http://schemas.openxmlformats.org/officeDocument/2006/relationships" xmlns:p="http://schemas.openxmlformats.org/presentationml/2006/main">
   <p:cSld>
     <p:spTree>
@@ -7057,7 +7656,7 @@
           <p:nvPr>
             <p:extLst>
               <p:ext uri="{D42A27DB-BD31-4B8C-83A1-F6EECF244321}">
-                <p14:modId xmlns:p14="http://schemas.microsoft.com/office/powerpoint/2010/main" val="913244010"/>
+                <p14:modId xmlns:p14="http://schemas.microsoft.com/office/powerpoint/2010/main" val="1635224974"/>
               </p:ext>
             </p:extLst>
           </p:nvPr>
@@ -7279,7 +7878,11 @@
                     <a:lstStyle/>
                     <a:p>
                       <a:r>
-                        <a:rPr lang="en-US" sz="1800" dirty="0"/>
+                        <a:rPr lang="en-US" sz="1800" dirty="0">
+                          <a:solidFill>
+                            <a:srgbClr val="4B4B4B"/>
+                          </a:solidFill>
+                        </a:rPr>
                         <a:t>Variable effects on food desert designation are interpretable. Coefficients give the direction and magnitude.</a:t>
                       </a:r>
                     </a:p>
@@ -7321,7 +7924,11 @@
                     <a:lstStyle/>
                     <a:p>
                       <a:r>
-                        <a:rPr lang="en-US" sz="1800" b="0" dirty="0"/>
+                        <a:rPr lang="en-US" sz="1800" b="0" dirty="0">
+                          <a:solidFill>
+                            <a:srgbClr val="4B4B4B"/>
+                          </a:solidFill>
+                        </a:rPr>
                         <a:t>Somewhat interpretable. A single decision tree is interpretable. </a:t>
                       </a:r>
                     </a:p>
@@ -7370,7 +7977,11 @@
                     <a:lstStyle/>
                     <a:p>
                       <a:r>
-                        <a:rPr lang="en-US" sz="1800" dirty="0"/>
+                        <a:rPr lang="en-US" sz="1800" dirty="0">
+                          <a:solidFill>
+                            <a:srgbClr val="4B4B4B"/>
+                          </a:solidFill>
+                        </a:rPr>
                         <a:t>Only finds linear relationships, so non-linear information will not be used without more tweaking.</a:t>
                       </a:r>
                     </a:p>
@@ -7421,7 +8032,11 @@
                     <a:lstStyle/>
                     <a:p>
                       <a:r>
-                        <a:rPr lang="en-US" sz="1800" dirty="0"/>
+                        <a:rPr lang="en-US" sz="1800" dirty="0">
+                          <a:solidFill>
+                            <a:srgbClr val="4B4B4B"/>
+                          </a:solidFill>
+                        </a:rPr>
                         <a:t>USDA food desert designations are rule based and a decision tree will find those rules.</a:t>
                       </a:r>
                     </a:p>
@@ -7479,7 +8094,11 @@
                     <a:lstStyle/>
                     <a:p>
                       <a:r>
-                        <a:rPr lang="en-US" sz="1800" dirty="0"/>
+                        <a:rPr lang="en-US" sz="1800" dirty="0">
+                          <a:solidFill>
+                            <a:srgbClr val="4B4B4B"/>
+                          </a:solidFill>
+                        </a:rPr>
                         <a:t>Performance could improve.</a:t>
                       </a:r>
                     </a:p>
@@ -7530,7 +8149,11 @@
                     <a:lstStyle/>
                     <a:p>
                       <a:r>
-                        <a:rPr lang="en-US" sz="1800" dirty="0"/>
+                        <a:rPr lang="en-US" sz="1800" dirty="0">
+                          <a:solidFill>
+                            <a:srgbClr val="4B4B4B"/>
+                          </a:solidFill>
+                        </a:rPr>
                         <a:t>Performance is already excellent.</a:t>
                       </a:r>
                     </a:p>
@@ -7598,7 +8221,7 @@
 </p:sld>
 </file>
 
-<file path=ppt/slides/slide16.xml><?xml version="1.0" encoding="utf-8"?>
+<file path=ppt/slides/slide18.xml><?xml version="1.0" encoding="utf-8"?>
 <p:sld xmlns:a="http://schemas.openxmlformats.org/drawingml/2006/main" xmlns:r="http://schemas.openxmlformats.org/officeDocument/2006/relationships" xmlns:p="http://schemas.openxmlformats.org/presentationml/2006/main">
   <p:cSld>
     <p:spTree>
@@ -7693,7 +8316,7 @@
         <p:spPr>
           <a:xfrm>
             <a:off x="838200" y="1427480"/>
-            <a:ext cx="3622040" cy="5016758"/>
+            <a:ext cx="3622040" cy="4031873"/>
           </a:xfrm>
           <a:prstGeom prst="rect">
             <a:avLst/>
@@ -7707,53 +8330,94 @@
           <a:lstStyle/>
           <a:p>
             <a:r>
-              <a:rPr lang="en-US" sz="1600" dirty="0"/>
+              <a:rPr lang="en-US" sz="1600" dirty="0">
+                <a:solidFill>
+                  <a:srgbClr val="4B4B4B"/>
+                </a:solidFill>
+              </a:rPr>
               <a:t>The same four variables visualized in boxplots during multivariate analysis are selected with high importance.</a:t>
             </a:r>
           </a:p>
           <a:p>
-            <a:endParaRPr lang="en-US" sz="1600" dirty="0"/>
-          </a:p>
-          <a:p>
-            <a:r>
-              <a:rPr lang="en-US" sz="1600" dirty="0"/>
-              <a:t>Vehicle access is listed in the USDA documentation as being a factor.</a:t>
-            </a:r>
-          </a:p>
-          <a:p>
-            <a:endParaRPr lang="en-US" sz="1600" dirty="0"/>
-          </a:p>
-          <a:p>
-            <a:r>
-              <a:rPr lang="en-US" sz="1600" dirty="0"/>
-              <a:t>Log population per square mile (log_pop_per_sqmi_est_2018) is a generated variable for population density.</a:t>
-            </a:r>
-          </a:p>
-          <a:p>
-            <a:endParaRPr lang="en-US" sz="1600" dirty="0"/>
-          </a:p>
-          <a:p>
-            <a:r>
-              <a:rPr lang="en-US" sz="1600" dirty="0"/>
-              <a:t>Mean change in population (</a:t>
-            </a:r>
-            <a:r>
-              <a:rPr lang="en-US" sz="1600" dirty="0" err="1"/>
-              <a:t>mean_change_pop</a:t>
-            </a:r>
-            <a:r>
-              <a:rPr lang="en-US" sz="1600" dirty="0"/>
-              <a:t>) is a generated variable. It is the average change in population for the census tract between 2010 and 2016.</a:t>
-            </a:r>
-          </a:p>
-          <a:p>
-            <a:endParaRPr lang="en-US" sz="1600" dirty="0"/>
-          </a:p>
-          <a:p>
-            <a:r>
-              <a:rPr lang="en-US" sz="1600" dirty="0"/>
-              <a:t>Grocery stores per 1,000 people (groc14_per_1k_capita) is generated. </a:t>
-            </a:r>
+            <a:endParaRPr lang="en-US" sz="1600" dirty="0">
+              <a:solidFill>
+                <a:srgbClr val="4B4B4B"/>
+              </a:solidFill>
+            </a:endParaRPr>
+          </a:p>
+          <a:p>
+            <a:r>
+              <a:rPr lang="en-US" sz="1600" dirty="0">
+                <a:solidFill>
+                  <a:srgbClr val="4B4B4B"/>
+                </a:solidFill>
+              </a:rPr>
+              <a:t>Vehicle access and poverty are both listed by the USDA</a:t>
+            </a:r>
+            <a:r>
+              <a:rPr lang="en-US" sz="1600" baseline="30000" dirty="0">
+                <a:solidFill>
+                  <a:srgbClr val="4B4B4B"/>
+                </a:solidFill>
+              </a:rPr>
+              <a:t>2</a:t>
+            </a:r>
+            <a:r>
+              <a:rPr lang="en-US" sz="1600" dirty="0">
+                <a:solidFill>
+                  <a:srgbClr val="4B4B4B"/>
+                </a:solidFill>
+              </a:rPr>
+              <a:t> as being a factor to food desert designation.</a:t>
+            </a:r>
+          </a:p>
+          <a:p>
+            <a:endParaRPr lang="en-US" sz="1600" dirty="0">
+              <a:solidFill>
+                <a:srgbClr val="4B4B4B"/>
+              </a:solidFill>
+            </a:endParaRPr>
+          </a:p>
+          <a:p>
+            <a:r>
+              <a:rPr lang="en-US" sz="1600" dirty="0">
+                <a:solidFill>
+                  <a:srgbClr val="4B4B4B"/>
+                </a:solidFill>
+              </a:rPr>
+              <a:t>Importance value is relative to other variables. The importance magnitude is not comparable across models.</a:t>
+            </a:r>
+          </a:p>
+          <a:p>
+            <a:endParaRPr lang="en-US" sz="1600" dirty="0">
+              <a:solidFill>
+                <a:srgbClr val="4B4B4B"/>
+              </a:solidFill>
+            </a:endParaRPr>
+          </a:p>
+          <a:p>
+            <a:r>
+              <a:rPr lang="en-US" sz="1600" dirty="0">
+                <a:solidFill>
+                  <a:srgbClr val="4B4B4B"/>
+                </a:solidFill>
+              </a:rPr>
+              <a:t>Correlated variables have similar importance.</a:t>
+            </a:r>
+          </a:p>
+          <a:p>
+            <a:endParaRPr lang="en-US" sz="1600" dirty="0">
+              <a:solidFill>
+                <a:srgbClr val="4B4B4B"/>
+              </a:solidFill>
+            </a:endParaRPr>
+          </a:p>
+          <a:p>
+            <a:endParaRPr lang="en-US" sz="1600" dirty="0">
+              <a:solidFill>
+                <a:srgbClr val="4B4B4B"/>
+              </a:solidFill>
+            </a:endParaRPr>
           </a:p>
         </p:txBody>
       </p:sp>
@@ -7770,7 +8434,7 @@
 </p:sld>
 </file>
 
-<file path=ppt/slides/slide17.xml><?xml version="1.0" encoding="utf-8"?>
+<file path=ppt/slides/slide19.xml><?xml version="1.0" encoding="utf-8"?>
 <p:sld xmlns:a="http://schemas.openxmlformats.org/drawingml/2006/main" xmlns:r="http://schemas.openxmlformats.org/officeDocument/2006/relationships" xmlns:p="http://schemas.openxmlformats.org/presentationml/2006/main">
   <p:cSld>
     <p:spTree>
@@ -7923,7 +8587,11 @@
                 <a:buChar char="•"/>
               </a:pPr>
               <a:r>
-                <a:rPr lang="en-US" sz="1600" dirty="0"/>
+                <a:rPr lang="en-US" sz="1600" dirty="0">
+                  <a:solidFill>
+                    <a:srgbClr val="4B4B4B"/>
+                  </a:solidFill>
+                </a:rPr>
                 <a:t>Geographic level of data is not even. Tract-level data would be best for interpretation.</a:t>
               </a:r>
             </a:p>
@@ -7933,7 +8601,11 @@
                 <a:buChar char="•"/>
               </a:pPr>
               <a:r>
-                <a:rPr lang="en-US" sz="1600" dirty="0"/>
+                <a:rPr lang="en-US" sz="1600" dirty="0">
+                  <a:solidFill>
+                    <a:srgbClr val="4B4B4B"/>
+                  </a:solidFill>
+                </a:rPr>
                 <a:t>Some data are not up to date. Census data is old.</a:t>
               </a:r>
             </a:p>
@@ -7943,7 +8615,11 @@
                 <a:buChar char="•"/>
               </a:pPr>
               <a:r>
-                <a:rPr lang="en-US" sz="1600" dirty="0"/>
+                <a:rPr lang="en-US" sz="1600" dirty="0">
+                  <a:solidFill>
+                    <a:srgbClr val="4B4B4B"/>
+                  </a:solidFill>
+                </a:rPr>
                 <a:t>Evaluating variables from different years can have confounding effects.</a:t>
               </a:r>
             </a:p>
@@ -7953,7 +8629,11 @@
                 <a:buChar char="•"/>
               </a:pPr>
               <a:r>
-                <a:rPr lang="en-US" sz="1600" dirty="0"/>
+                <a:rPr lang="en-US" sz="1600" dirty="0">
+                  <a:solidFill>
+                    <a:srgbClr val="4B4B4B"/>
+                  </a:solidFill>
+                </a:rPr>
                 <a:t>Having the number of grocery/supercenter/convenience/specialty stores at the tract level may help prediction.</a:t>
               </a:r>
             </a:p>
@@ -7963,7 +8643,11 @@
                 <a:buChar char="•"/>
               </a:pPr>
               <a:r>
-                <a:rPr lang="en-US" sz="1600" dirty="0"/>
+                <a:rPr lang="en-US" sz="1600" dirty="0">
+                  <a:solidFill>
+                    <a:srgbClr val="4B4B4B"/>
+                  </a:solidFill>
+                </a:rPr>
                 <a:t>One week turnaround.</a:t>
               </a:r>
             </a:p>
@@ -8078,7 +8762,11 @@
                 <a:buChar char="•"/>
               </a:pPr>
               <a:r>
-                <a:rPr lang="en-US" sz="1600" dirty="0"/>
+                <a:rPr lang="en-US" sz="1600" dirty="0">
+                  <a:solidFill>
+                    <a:srgbClr val="4B4B4B"/>
+                  </a:solidFill>
+                </a:rPr>
                 <a:t>Validate code.</a:t>
               </a:r>
             </a:p>
@@ -8088,7 +8776,11 @@
                 <a:buChar char="•"/>
               </a:pPr>
               <a:r>
-                <a:rPr lang="en-US" sz="1600" dirty="0"/>
+                <a:rPr lang="en-US" sz="1600" dirty="0">
+                  <a:solidFill>
+                    <a:srgbClr val="4B4B4B"/>
+                  </a:solidFill>
+                </a:rPr>
                 <a:t>Tweak model parameters.</a:t>
               </a:r>
             </a:p>
@@ -8098,7 +8790,11 @@
                 <a:buChar char="•"/>
               </a:pPr>
               <a:r>
-                <a:rPr lang="en-US" sz="1600" dirty="0"/>
+                <a:rPr lang="en-US" sz="1600" dirty="0">
+                  <a:solidFill>
+                    <a:srgbClr val="4B4B4B"/>
+                  </a:solidFill>
+                </a:rPr>
                 <a:t>Add more predictive model types.</a:t>
               </a:r>
             </a:p>
@@ -8108,7 +8804,11 @@
                 <a:buChar char="•"/>
               </a:pPr>
               <a:r>
-                <a:rPr lang="en-US" sz="1600" dirty="0"/>
+                <a:rPr lang="en-US" sz="1600" dirty="0">
+                  <a:solidFill>
+                    <a:srgbClr val="4B4B4B"/>
+                  </a:solidFill>
+                </a:rPr>
                 <a:t>Estimate model uncertainty.</a:t>
               </a:r>
             </a:p>
@@ -8118,7 +8818,11 @@
                 <a:buChar char="•"/>
               </a:pPr>
               <a:r>
-                <a:rPr lang="en-US" sz="1600" dirty="0"/>
+                <a:rPr lang="en-US" sz="1600" dirty="0">
+                  <a:solidFill>
+                    <a:srgbClr val="4B4B4B"/>
+                  </a:solidFill>
+                </a:rPr>
                 <a:t>New Hanover deep dive.</a:t>
               </a:r>
             </a:p>
@@ -8233,7 +8937,11 @@
                 <a:buChar char="•"/>
               </a:pPr>
               <a:r>
-                <a:rPr lang="en-US" sz="1600" dirty="0"/>
+                <a:rPr lang="en-US" sz="1600" dirty="0">
+                  <a:solidFill>
+                    <a:srgbClr val="4B4B4B"/>
+                  </a:solidFill>
+                </a:rPr>
                 <a:t>Data is presented as-is.</a:t>
               </a:r>
             </a:p>
@@ -8243,7 +8951,11 @@
                 <a:buChar char="•"/>
               </a:pPr>
               <a:r>
-                <a:rPr lang="en-US" sz="1600" dirty="0"/>
+                <a:rPr lang="en-US" sz="1600" dirty="0">
+                  <a:solidFill>
+                    <a:srgbClr val="4B4B4B"/>
+                  </a:solidFill>
+                </a:rPr>
                 <a:t>Changes to Census tracts over the years is not detrimental to model and analysis.</a:t>
               </a:r>
             </a:p>
@@ -8254,183 +8966,6 @@
     <p:extLst>
       <p:ext uri="{BB962C8B-B14F-4D97-AF65-F5344CB8AC3E}">
         <p14:creationId xmlns:p14="http://schemas.microsoft.com/office/powerpoint/2010/main" val="576804776"/>
-      </p:ext>
-    </p:extLst>
-  </p:cSld>
-  <p:clrMapOvr>
-    <a:masterClrMapping/>
-  </p:clrMapOvr>
-</p:sld>
-</file>
-
-<file path=ppt/slides/slide18.xml><?xml version="1.0" encoding="utf-8"?>
-<p:sld xmlns:a="http://schemas.openxmlformats.org/drawingml/2006/main" xmlns:r="http://schemas.openxmlformats.org/officeDocument/2006/relationships" xmlns:p="http://schemas.openxmlformats.org/presentationml/2006/main">
-  <p:cSld>
-    <p:spTree>
-      <p:nvGrpSpPr>
-        <p:cNvPr id="1" name=""/>
-        <p:cNvGrpSpPr/>
-        <p:nvPr/>
-      </p:nvGrpSpPr>
-      <p:grpSpPr>
-        <a:xfrm>
-          <a:off x="0" y="0"/>
-          <a:ext cx="0" cy="0"/>
-          <a:chOff x="0" y="0"/>
-          <a:chExt cx="0" cy="0"/>
-        </a:xfrm>
-      </p:grpSpPr>
-      <p:sp>
-        <p:nvSpPr>
-          <p:cNvPr id="2" name="Title 1">
-            <a:extLst>
-              <a:ext uri="{FF2B5EF4-FFF2-40B4-BE49-F238E27FC236}">
-                <a16:creationId xmlns:a16="http://schemas.microsoft.com/office/drawing/2014/main" id="{52E1E3FB-656F-41DB-98B4-EDB0C947E8EB}"/>
-              </a:ext>
-            </a:extLst>
-          </p:cNvPr>
-          <p:cNvSpPr>
-            <a:spLocks noGrp="1"/>
-          </p:cNvSpPr>
-          <p:nvPr>
-            <p:ph type="title"/>
-          </p:nvPr>
-        </p:nvSpPr>
-        <p:spPr/>
-        <p:txBody>
-          <a:bodyPr/>
-          <a:lstStyle/>
-          <a:p>
-            <a:r>
-              <a:rPr lang="en-US" dirty="0"/>
-              <a:t>Appendices</a:t>
-            </a:r>
-          </a:p>
-        </p:txBody>
-      </p:sp>
-      <p:sp>
-        <p:nvSpPr>
-          <p:cNvPr id="3" name="Text Placeholder 2">
-            <a:extLst>
-              <a:ext uri="{FF2B5EF4-FFF2-40B4-BE49-F238E27FC236}">
-                <a16:creationId xmlns:a16="http://schemas.microsoft.com/office/drawing/2014/main" id="{2A37731C-7163-4485-A679-E4E395D05FF6}"/>
-              </a:ext>
-            </a:extLst>
-          </p:cNvPr>
-          <p:cNvSpPr>
-            <a:spLocks noGrp="1"/>
-          </p:cNvSpPr>
-          <p:nvPr>
-            <p:ph type="body" idx="1"/>
-          </p:nvPr>
-        </p:nvSpPr>
-        <p:spPr/>
-        <p:txBody>
-          <a:bodyPr/>
-          <a:lstStyle/>
-          <a:p>
-            <a:endParaRPr lang="en-US"/>
-          </a:p>
-        </p:txBody>
-      </p:sp>
-    </p:spTree>
-    <p:extLst>
-      <p:ext uri="{BB962C8B-B14F-4D97-AF65-F5344CB8AC3E}">
-        <p14:creationId xmlns:p14="http://schemas.microsoft.com/office/powerpoint/2010/main" val="2436024495"/>
-      </p:ext>
-    </p:extLst>
-  </p:cSld>
-  <p:clrMapOvr>
-    <a:masterClrMapping/>
-  </p:clrMapOvr>
-</p:sld>
-</file>
-
-<file path=ppt/slides/slide19.xml><?xml version="1.0" encoding="utf-8"?>
-<p:sld xmlns:a="http://schemas.openxmlformats.org/drawingml/2006/main" xmlns:r="http://schemas.openxmlformats.org/officeDocument/2006/relationships" xmlns:p="http://schemas.openxmlformats.org/presentationml/2006/main">
-  <p:cSld>
-    <p:spTree>
-      <p:nvGrpSpPr>
-        <p:cNvPr id="1" name=""/>
-        <p:cNvGrpSpPr/>
-        <p:nvPr/>
-      </p:nvGrpSpPr>
-      <p:grpSpPr>
-        <a:xfrm>
-          <a:off x="0" y="0"/>
-          <a:ext cx="0" cy="0"/>
-          <a:chOff x="0" y="0"/>
-          <a:chExt cx="0" cy="0"/>
-        </a:xfrm>
-      </p:grpSpPr>
-      <p:sp>
-        <p:nvSpPr>
-          <p:cNvPr id="2" name="Title 1">
-            <a:extLst>
-              <a:ext uri="{FF2B5EF4-FFF2-40B4-BE49-F238E27FC236}">
-                <a16:creationId xmlns:a16="http://schemas.microsoft.com/office/drawing/2014/main" id="{A4F3F722-A381-4651-A27C-63404A096F51}"/>
-              </a:ext>
-            </a:extLst>
-          </p:cNvPr>
-          <p:cNvSpPr>
-            <a:spLocks noGrp="1"/>
-          </p:cNvSpPr>
-          <p:nvPr>
-            <p:ph type="title"/>
-          </p:nvPr>
-        </p:nvSpPr>
-        <p:spPr/>
-        <p:txBody>
-          <a:bodyPr/>
-          <a:lstStyle/>
-          <a:p>
-            <a:r>
-              <a:rPr lang="en-US" dirty="0"/>
-              <a:t>Appendix 1: Model Specifications</a:t>
-            </a:r>
-          </a:p>
-        </p:txBody>
-      </p:sp>
-      <p:pic>
-        <p:nvPicPr>
-          <p:cNvPr id="5" name="Picture 4">
-            <a:extLst>
-              <a:ext uri="{FF2B5EF4-FFF2-40B4-BE49-F238E27FC236}">
-                <a16:creationId xmlns:a16="http://schemas.microsoft.com/office/drawing/2014/main" id="{EF8C5FE3-8DD0-41EB-B24F-D9AB1DE4A659}"/>
-              </a:ext>
-            </a:extLst>
-          </p:cNvPr>
-          <p:cNvPicPr>
-            <a:picLocks noChangeAspect="1"/>
-          </p:cNvPicPr>
-          <p:nvPr/>
-        </p:nvPicPr>
-        <p:blipFill>
-          <a:blip r:embed="rId2">
-            <a:extLst>
-              <a:ext uri="{28A0092B-C50C-407E-A947-70E740481C1C}">
-                <a14:useLocalDpi xmlns:a14="http://schemas.microsoft.com/office/drawing/2010/main" val="0"/>
-              </a:ext>
-            </a:extLst>
-          </a:blip>
-          <a:stretch>
-            <a:fillRect/>
-          </a:stretch>
-        </p:blipFill>
-        <p:spPr>
-          <a:xfrm>
-            <a:off x="1104195" y="1466821"/>
-            <a:ext cx="4991805" cy="5026054"/>
-          </a:xfrm>
-          <a:prstGeom prst="rect">
-            <a:avLst/>
-          </a:prstGeom>
-        </p:spPr>
-      </p:pic>
-    </p:spTree>
-    <p:extLst>
-      <p:ext uri="{BB962C8B-B14F-4D97-AF65-F5344CB8AC3E}">
-        <p14:creationId xmlns:p14="http://schemas.microsoft.com/office/powerpoint/2010/main" val="312243836"/>
       </p:ext>
     </p:extLst>
   </p:cSld>
@@ -8664,6 +9199,218 @@
           <p:cNvPr id="2" name="Title 1">
             <a:extLst>
               <a:ext uri="{FF2B5EF4-FFF2-40B4-BE49-F238E27FC236}">
+                <a16:creationId xmlns:a16="http://schemas.microsoft.com/office/drawing/2014/main" id="{52E1E3FB-656F-41DB-98B4-EDB0C947E8EB}"/>
+              </a:ext>
+            </a:extLst>
+          </p:cNvPr>
+          <p:cNvSpPr>
+            <a:spLocks noGrp="1"/>
+          </p:cNvSpPr>
+          <p:nvPr>
+            <p:ph type="title"/>
+          </p:nvPr>
+        </p:nvSpPr>
+        <p:spPr/>
+        <p:txBody>
+          <a:bodyPr/>
+          <a:lstStyle/>
+          <a:p>
+            <a:r>
+              <a:rPr lang="en-US" dirty="0"/>
+              <a:t>Appendices</a:t>
+            </a:r>
+          </a:p>
+        </p:txBody>
+      </p:sp>
+      <p:sp>
+        <p:nvSpPr>
+          <p:cNvPr id="3" name="Text Placeholder 2">
+            <a:extLst>
+              <a:ext uri="{FF2B5EF4-FFF2-40B4-BE49-F238E27FC236}">
+                <a16:creationId xmlns:a16="http://schemas.microsoft.com/office/drawing/2014/main" id="{2A37731C-7163-4485-A679-E4E395D05FF6}"/>
+              </a:ext>
+            </a:extLst>
+          </p:cNvPr>
+          <p:cNvSpPr>
+            <a:spLocks noGrp="1"/>
+          </p:cNvSpPr>
+          <p:nvPr>
+            <p:ph type="body" idx="1"/>
+          </p:nvPr>
+        </p:nvSpPr>
+        <p:spPr/>
+        <p:txBody>
+          <a:bodyPr/>
+          <a:lstStyle/>
+          <a:p>
+            <a:endParaRPr lang="en-US"/>
+          </a:p>
+        </p:txBody>
+      </p:sp>
+    </p:spTree>
+    <p:extLst>
+      <p:ext uri="{BB962C8B-B14F-4D97-AF65-F5344CB8AC3E}">
+        <p14:creationId xmlns:p14="http://schemas.microsoft.com/office/powerpoint/2010/main" val="2436024495"/>
+      </p:ext>
+    </p:extLst>
+  </p:cSld>
+  <p:clrMapOvr>
+    <a:masterClrMapping/>
+  </p:clrMapOvr>
+</p:sld>
+</file>
+
+<file path=ppt/slides/slide21.xml><?xml version="1.0" encoding="utf-8"?>
+<p:sld xmlns:a="http://schemas.openxmlformats.org/drawingml/2006/main" xmlns:r="http://schemas.openxmlformats.org/officeDocument/2006/relationships" xmlns:p="http://schemas.openxmlformats.org/presentationml/2006/main">
+  <p:cSld>
+    <p:spTree>
+      <p:nvGrpSpPr>
+        <p:cNvPr id="1" name=""/>
+        <p:cNvGrpSpPr/>
+        <p:nvPr/>
+      </p:nvGrpSpPr>
+      <p:grpSpPr>
+        <a:xfrm>
+          <a:off x="0" y="0"/>
+          <a:ext cx="0" cy="0"/>
+          <a:chOff x="0" y="0"/>
+          <a:chExt cx="0" cy="0"/>
+        </a:xfrm>
+      </p:grpSpPr>
+      <p:sp>
+        <p:nvSpPr>
+          <p:cNvPr id="2" name="Title 1">
+            <a:extLst>
+              <a:ext uri="{FF2B5EF4-FFF2-40B4-BE49-F238E27FC236}">
+                <a16:creationId xmlns:a16="http://schemas.microsoft.com/office/drawing/2014/main" id="{A4F3F722-A381-4651-A27C-63404A096F51}"/>
+              </a:ext>
+            </a:extLst>
+          </p:cNvPr>
+          <p:cNvSpPr>
+            <a:spLocks noGrp="1"/>
+          </p:cNvSpPr>
+          <p:nvPr>
+            <p:ph type="title"/>
+          </p:nvPr>
+        </p:nvSpPr>
+        <p:spPr/>
+        <p:txBody>
+          <a:bodyPr/>
+          <a:lstStyle/>
+          <a:p>
+            <a:r>
+              <a:rPr lang="en-US" dirty="0"/>
+              <a:t>Appendix 1: Logistical Model Specifications</a:t>
+            </a:r>
+          </a:p>
+        </p:txBody>
+      </p:sp>
+      <p:pic>
+        <p:nvPicPr>
+          <p:cNvPr id="5" name="Picture 4">
+            <a:extLst>
+              <a:ext uri="{FF2B5EF4-FFF2-40B4-BE49-F238E27FC236}">
+                <a16:creationId xmlns:a16="http://schemas.microsoft.com/office/drawing/2014/main" id="{EF8C5FE3-8DD0-41EB-B24F-D9AB1DE4A659}"/>
+              </a:ext>
+            </a:extLst>
+          </p:cNvPr>
+          <p:cNvPicPr>
+            <a:picLocks noChangeAspect="1"/>
+          </p:cNvPicPr>
+          <p:nvPr/>
+        </p:nvPicPr>
+        <p:blipFill>
+          <a:blip r:embed="rId2">
+            <a:extLst>
+              <a:ext uri="{28A0092B-C50C-407E-A947-70E740481C1C}">
+                <a14:useLocalDpi xmlns:a14="http://schemas.microsoft.com/office/drawing/2010/main" val="0"/>
+              </a:ext>
+            </a:extLst>
+          </a:blip>
+          <a:stretch>
+            <a:fillRect/>
+          </a:stretch>
+        </p:blipFill>
+        <p:spPr>
+          <a:xfrm>
+            <a:off x="3600097" y="1466821"/>
+            <a:ext cx="4991805" cy="5026054"/>
+          </a:xfrm>
+          <a:prstGeom prst="rect">
+            <a:avLst/>
+          </a:prstGeom>
+        </p:spPr>
+      </p:pic>
+    </p:spTree>
+    <p:extLst>
+      <p:ext uri="{BB962C8B-B14F-4D97-AF65-F5344CB8AC3E}">
+        <p14:creationId xmlns:p14="http://schemas.microsoft.com/office/powerpoint/2010/main" val="312243836"/>
+      </p:ext>
+    </p:extLst>
+  </p:cSld>
+  <p:clrMapOvr>
+    <a:masterClrMapping/>
+  </p:clrMapOvr>
+</p:sld>
+</file>
+
+<file path=ppt/slides/slide22.xml><?xml version="1.0" encoding="utf-8"?>
+<p:sld xmlns:a="http://schemas.openxmlformats.org/drawingml/2006/main" xmlns:r="http://schemas.openxmlformats.org/officeDocument/2006/relationships" xmlns:p="http://schemas.openxmlformats.org/presentationml/2006/main">
+  <p:cSld>
+    <p:spTree>
+      <p:nvGrpSpPr>
+        <p:cNvPr id="1" name=""/>
+        <p:cNvGrpSpPr/>
+        <p:nvPr/>
+      </p:nvGrpSpPr>
+      <p:grpSpPr>
+        <a:xfrm>
+          <a:off x="0" y="0"/>
+          <a:ext cx="0" cy="0"/>
+          <a:chOff x="0" y="0"/>
+          <a:chExt cx="0" cy="0"/>
+        </a:xfrm>
+      </p:grpSpPr>
+      <p:pic>
+        <p:nvPicPr>
+          <p:cNvPr id="15" name="Content Placeholder 14">
+            <a:extLst>
+              <a:ext uri="{FF2B5EF4-FFF2-40B4-BE49-F238E27FC236}">
+                <a16:creationId xmlns:a16="http://schemas.microsoft.com/office/drawing/2014/main" id="{B2153041-0CDC-4565-B1DF-3A6E0C9F1DA9}"/>
+              </a:ext>
+            </a:extLst>
+          </p:cNvPr>
+          <p:cNvPicPr>
+            <a:picLocks noGrp="1" noChangeAspect="1"/>
+          </p:cNvPicPr>
+          <p:nvPr>
+            <p:ph idx="1"/>
+          </p:nvPr>
+        </p:nvPicPr>
+        <p:blipFill>
+          <a:blip r:embed="rId2">
+            <a:extLst>
+              <a:ext uri="{28A0092B-C50C-407E-A947-70E740481C1C}">
+                <a14:useLocalDpi xmlns:a14="http://schemas.microsoft.com/office/drawing/2010/main" val="0"/>
+              </a:ext>
+            </a:extLst>
+          </a:blip>
+          <a:stretch>
+            <a:fillRect/>
+          </a:stretch>
+        </p:blipFill>
+        <p:spPr>
+          <a:xfrm>
+            <a:off x="1243692" y="64008"/>
+            <a:ext cx="9704616" cy="6729984"/>
+          </a:xfrm>
+        </p:spPr>
+      </p:pic>
+      <p:sp>
+        <p:nvSpPr>
+          <p:cNvPr id="2" name="Title 1">
+            <a:extLst>
+              <a:ext uri="{FF2B5EF4-FFF2-40B4-BE49-F238E27FC236}">
                 <a16:creationId xmlns:a16="http://schemas.microsoft.com/office/drawing/2014/main" id="{325021B5-315E-4087-8978-C8D80CEC1D92}"/>
               </a:ext>
             </a:extLst>
@@ -8682,33 +9429,73 @@
           <a:p>
             <a:r>
               <a:rPr lang="en-US" dirty="0"/>
-              <a:t>Appendix 2: &lt;MAP&gt;</a:t>
+              <a:t>Appendix 2: Prediction Overview</a:t>
+            </a:r>
+            <a:r>
+              <a:rPr lang="en-US" baseline="30000" dirty="0"/>
+              <a:t>3</a:t>
             </a:r>
           </a:p>
         </p:txBody>
       </p:sp>
       <p:sp>
         <p:nvSpPr>
-          <p:cNvPr id="3" name="Content Placeholder 2">
+          <p:cNvPr id="11" name="Rectangle: Rounded Corners 10">
             <a:extLst>
               <a:ext uri="{FF2B5EF4-FFF2-40B4-BE49-F238E27FC236}">
-                <a16:creationId xmlns:a16="http://schemas.microsoft.com/office/drawing/2014/main" id="{F9F3F751-E927-42EC-B833-FD3ED7BFD5C6}"/>
+                <a16:creationId xmlns:a16="http://schemas.microsoft.com/office/drawing/2014/main" id="{7561C5EC-5C9D-43EB-B9CD-DCD9C8A715F0}"/>
               </a:ext>
             </a:extLst>
           </p:cNvPr>
-          <p:cNvSpPr>
-            <a:spLocks noGrp="1"/>
-          </p:cNvSpPr>
-          <p:nvPr>
-            <p:ph idx="1"/>
-          </p:nvPr>
+          <p:cNvSpPr/>
+          <p:nvPr/>
         </p:nvSpPr>
-        <p:spPr/>
+        <p:spPr>
+          <a:xfrm>
+            <a:off x="989300" y="5517515"/>
+            <a:ext cx="10213400" cy="975360"/>
+          </a:xfrm>
+          <a:prstGeom prst="roundRect">
+            <a:avLst/>
+          </a:prstGeom>
+          <a:solidFill>
+            <a:schemeClr val="bg1"/>
+          </a:solidFill>
+          <a:ln w="19050">
+            <a:solidFill>
+              <a:srgbClr val="65BBB5"/>
+            </a:solidFill>
+            <a:prstDash val="dash"/>
+          </a:ln>
+        </p:spPr>
+        <p:style>
+          <a:lnRef idx="2">
+            <a:schemeClr val="accent1">
+              <a:shade val="50000"/>
+            </a:schemeClr>
+          </a:lnRef>
+          <a:fillRef idx="1">
+            <a:schemeClr val="accent1"/>
+          </a:fillRef>
+          <a:effectRef idx="0">
+            <a:schemeClr val="accent1"/>
+          </a:effectRef>
+          <a:fontRef idx="minor">
+            <a:schemeClr val="lt1"/>
+          </a:fontRef>
+        </p:style>
         <p:txBody>
-          <a:bodyPr/>
+          <a:bodyPr rtlCol="0" anchor="ctr"/>
           <a:lstStyle/>
           <a:p>
-            <a:endParaRPr lang="en-US"/>
+            <a:r>
+              <a:rPr lang="en-US" sz="1600" dirty="0">
+                <a:solidFill>
+                  <a:srgbClr val="4B4B4B"/>
+                </a:solidFill>
+              </a:rPr>
+              <a:t>72 / 367 (19.6%) training Census tracts are incorrectly predicted with the final random forest model. Given the class imbalance (16.8%), the model could increase its performance with a looser threshold on the number of votes or probability needed to call a prediction.</a:t>
+            </a:r>
           </a:p>
         </p:txBody>
       </p:sp>
@@ -8725,7 +9512,7 @@
 </p:sld>
 </file>
 
-<file path=ppt/slides/slide21.xml><?xml version="1.0" encoding="utf-8"?>
+<file path=ppt/slides/slide23.xml><?xml version="1.0" encoding="utf-8"?>
 <p:sld xmlns:a="http://schemas.openxmlformats.org/drawingml/2006/main" xmlns:r="http://schemas.openxmlformats.org/officeDocument/2006/relationships" xmlns:p="http://schemas.openxmlformats.org/presentationml/2006/main">
   <p:cSld>
     <p:spTree>
@@ -8963,96 +9750,1169 @@
           </a:p>
         </p:txBody>
       </p:sp>
-      <p:sp>
-        <p:nvSpPr>
-          <p:cNvPr id="3" name="Content Placeholder 2">
+      <p:grpSp>
+        <p:nvGrpSpPr>
+          <p:cNvPr id="33" name="Group 32">
             <a:extLst>
               <a:ext uri="{FF2B5EF4-FFF2-40B4-BE49-F238E27FC236}">
-                <a16:creationId xmlns:a16="http://schemas.microsoft.com/office/drawing/2014/main" id="{E50DC301-2ADF-465C-92E0-0B3979D943E5}"/>
+                <a16:creationId xmlns:a16="http://schemas.microsoft.com/office/drawing/2014/main" id="{59105049-BFE4-4745-AB3C-4C54290E7E57}"/>
               </a:ext>
             </a:extLst>
           </p:cNvPr>
-          <p:cNvSpPr>
-            <a:spLocks noGrp="1"/>
-          </p:cNvSpPr>
-          <p:nvPr>
-            <p:ph idx="1"/>
-          </p:nvPr>
-        </p:nvSpPr>
-        <p:spPr/>
-        <p:txBody>
-          <a:bodyPr>
-            <a:normAutofit lnSpcReduction="10000"/>
-          </a:bodyPr>
-          <a:lstStyle/>
-          <a:p>
-            <a:r>
-              <a:rPr lang="en-US" dirty="0"/>
-              <a:t>Assignment Overview</a:t>
-            </a:r>
-          </a:p>
-          <a:p>
-            <a:r>
-              <a:rPr lang="en-US" dirty="0"/>
-              <a:t>What is a Food Desert?</a:t>
-            </a:r>
-          </a:p>
-          <a:p>
-            <a:r>
-              <a:rPr lang="en-US" dirty="0"/>
-              <a:t>Food Desert Implications</a:t>
-            </a:r>
-          </a:p>
-          <a:p>
-            <a:r>
-              <a:rPr lang="en-US" dirty="0"/>
-              <a:t>Data</a:t>
-            </a:r>
-          </a:p>
-          <a:p>
-            <a:r>
-              <a:rPr lang="en-US" dirty="0"/>
-              <a:t>Data Exploration &amp; Statistics</a:t>
-            </a:r>
-          </a:p>
-          <a:p>
-            <a:r>
-              <a:rPr lang="en-US" dirty="0"/>
-              <a:t>Multivariate Analysis</a:t>
-            </a:r>
-          </a:p>
-          <a:p>
-            <a:r>
-              <a:rPr lang="en-US" dirty="0"/>
-              <a:t>Modelling Approach</a:t>
-            </a:r>
-          </a:p>
-          <a:p>
-            <a:r>
-              <a:rPr lang="en-US" dirty="0"/>
-              <a:t>Model Comparison</a:t>
-            </a:r>
-          </a:p>
-          <a:p>
-            <a:r>
-              <a:rPr lang="en-US" dirty="0"/>
-              <a:t>Variable Importance</a:t>
-            </a:r>
-          </a:p>
-          <a:p>
-            <a:r>
-              <a:rPr lang="en-US" dirty="0"/>
-              <a:t>Limitations &amp; Next Steps</a:t>
-            </a:r>
-          </a:p>
-          <a:p>
-            <a:endParaRPr lang="en-US" dirty="0"/>
-          </a:p>
-          <a:p>
-            <a:endParaRPr lang="en-US" dirty="0"/>
-          </a:p>
-        </p:txBody>
-      </p:sp>
+          <p:cNvGrpSpPr/>
+          <p:nvPr/>
+        </p:nvGrpSpPr>
+        <p:grpSpPr>
+          <a:xfrm>
+            <a:off x="1208710" y="1344168"/>
+            <a:ext cx="9774581" cy="4449815"/>
+            <a:chOff x="832459" y="1344168"/>
+            <a:chExt cx="9774581" cy="4449815"/>
+          </a:xfrm>
+        </p:grpSpPr>
+        <p:grpSp>
+          <p:nvGrpSpPr>
+            <p:cNvPr id="9" name="Group 8">
+              <a:extLst>
+                <a:ext uri="{FF2B5EF4-FFF2-40B4-BE49-F238E27FC236}">
+                  <a16:creationId xmlns:a16="http://schemas.microsoft.com/office/drawing/2014/main" id="{C5CDB3E7-C6C6-410C-AC75-10C50D57A078}"/>
+                </a:ext>
+              </a:extLst>
+            </p:cNvPr>
+            <p:cNvGrpSpPr/>
+            <p:nvPr/>
+          </p:nvGrpSpPr>
+          <p:grpSpPr>
+            <a:xfrm>
+              <a:off x="838200" y="1344168"/>
+              <a:ext cx="5257800" cy="700775"/>
+              <a:chOff x="1137920" y="2001520"/>
+              <a:chExt cx="6436133" cy="802375"/>
+            </a:xfrm>
+          </p:grpSpPr>
+          <p:sp>
+            <p:nvSpPr>
+              <p:cNvPr id="6" name="Rectangle 5">
+                <a:extLst>
+                  <a:ext uri="{FF2B5EF4-FFF2-40B4-BE49-F238E27FC236}">
+                    <a16:creationId xmlns:a16="http://schemas.microsoft.com/office/drawing/2014/main" id="{7AAD0DDE-3A02-4AA2-A65F-2743E12EA07C}"/>
+                  </a:ext>
+                </a:extLst>
+              </p:cNvPr>
+              <p:cNvSpPr/>
+              <p:nvPr/>
+            </p:nvSpPr>
+            <p:spPr>
+              <a:xfrm>
+                <a:off x="1137920" y="2001520"/>
+                <a:ext cx="5770880" cy="802374"/>
+              </a:xfrm>
+              <a:prstGeom prst="rect">
+                <a:avLst/>
+              </a:prstGeom>
+              <a:solidFill>
+                <a:srgbClr val="65BBB5"/>
+              </a:solidFill>
+              <a:ln>
+                <a:noFill/>
+              </a:ln>
+            </p:spPr>
+            <p:style>
+              <a:lnRef idx="2">
+                <a:schemeClr val="accent1">
+                  <a:shade val="50000"/>
+                </a:schemeClr>
+              </a:lnRef>
+              <a:fillRef idx="1">
+                <a:schemeClr val="accent1"/>
+              </a:fillRef>
+              <a:effectRef idx="0">
+                <a:schemeClr val="accent1"/>
+              </a:effectRef>
+              <a:fontRef idx="minor">
+                <a:schemeClr val="lt1"/>
+              </a:fontRef>
+            </p:style>
+            <p:txBody>
+              <a:bodyPr rtlCol="0" anchor="ctr"/>
+              <a:lstStyle/>
+              <a:p>
+                <a:pPr algn="ctr"/>
+                <a:r>
+                  <a:rPr lang="en-US" dirty="0"/>
+                  <a:t>Assignment Overview</a:t>
+                </a:r>
+              </a:p>
+            </p:txBody>
+          </p:sp>
+          <p:sp useBgFill="1">
+            <p:nvSpPr>
+              <p:cNvPr id="7" name="Isosceles Triangle 6">
+                <a:extLst>
+                  <a:ext uri="{FF2B5EF4-FFF2-40B4-BE49-F238E27FC236}">
+                    <a16:creationId xmlns:a16="http://schemas.microsoft.com/office/drawing/2014/main" id="{9E2533B3-BEC7-44B1-868A-1D434AF7EA21}"/>
+                  </a:ext>
+                </a:extLst>
+              </p:cNvPr>
+              <p:cNvSpPr/>
+              <p:nvPr/>
+            </p:nvSpPr>
+            <p:spPr>
+              <a:xfrm rot="5400000">
+                <a:off x="1167163" y="1972277"/>
+                <a:ext cx="802374" cy="860860"/>
+              </a:xfrm>
+              <a:prstGeom prst="triangle">
+                <a:avLst/>
+              </a:prstGeom>
+              <a:ln>
+                <a:noFill/>
+              </a:ln>
+            </p:spPr>
+            <p:style>
+              <a:lnRef idx="2">
+                <a:schemeClr val="accent1">
+                  <a:shade val="50000"/>
+                </a:schemeClr>
+              </a:lnRef>
+              <a:fillRef idx="1">
+                <a:schemeClr val="accent1"/>
+              </a:fillRef>
+              <a:effectRef idx="0">
+                <a:schemeClr val="accent1"/>
+              </a:effectRef>
+              <a:fontRef idx="minor">
+                <a:schemeClr val="lt1"/>
+              </a:fontRef>
+            </p:style>
+            <p:txBody>
+              <a:bodyPr rtlCol="0" anchor="ctr"/>
+              <a:lstStyle/>
+              <a:p>
+                <a:pPr algn="ctr"/>
+                <a:endParaRPr lang="en-US"/>
+              </a:p>
+            </p:txBody>
+          </p:sp>
+          <p:sp>
+            <p:nvSpPr>
+              <p:cNvPr id="8" name="Isosceles Triangle 7">
+                <a:extLst>
+                  <a:ext uri="{FF2B5EF4-FFF2-40B4-BE49-F238E27FC236}">
+                    <a16:creationId xmlns:a16="http://schemas.microsoft.com/office/drawing/2014/main" id="{71DD97A8-1B0E-4822-A17A-F1CBA8419144}"/>
+                  </a:ext>
+                </a:extLst>
+              </p:cNvPr>
+              <p:cNvSpPr/>
+              <p:nvPr/>
+            </p:nvSpPr>
+            <p:spPr>
+              <a:xfrm rot="5400000">
+                <a:off x="6840239" y="2070081"/>
+                <a:ext cx="802374" cy="665254"/>
+              </a:xfrm>
+              <a:prstGeom prst="triangle">
+                <a:avLst/>
+              </a:prstGeom>
+              <a:solidFill>
+                <a:srgbClr val="65BBB5"/>
+              </a:solidFill>
+              <a:ln>
+                <a:noFill/>
+              </a:ln>
+            </p:spPr>
+            <p:style>
+              <a:lnRef idx="2">
+                <a:schemeClr val="accent1">
+                  <a:shade val="50000"/>
+                </a:schemeClr>
+              </a:lnRef>
+              <a:fillRef idx="1">
+                <a:schemeClr val="accent1"/>
+              </a:fillRef>
+              <a:effectRef idx="0">
+                <a:schemeClr val="accent1"/>
+              </a:effectRef>
+              <a:fontRef idx="minor">
+                <a:schemeClr val="lt1"/>
+              </a:fontRef>
+            </p:style>
+            <p:txBody>
+              <a:bodyPr rtlCol="0" anchor="ctr"/>
+              <a:lstStyle/>
+              <a:p>
+                <a:pPr algn="ctr"/>
+                <a:endParaRPr lang="en-US"/>
+              </a:p>
+            </p:txBody>
+          </p:sp>
+        </p:grpSp>
+        <p:grpSp>
+          <p:nvGrpSpPr>
+            <p:cNvPr id="10" name="Group 9">
+              <a:extLst>
+                <a:ext uri="{FF2B5EF4-FFF2-40B4-BE49-F238E27FC236}">
+                  <a16:creationId xmlns:a16="http://schemas.microsoft.com/office/drawing/2014/main" id="{B5289647-9263-49C4-A8AC-5F05D7846010}"/>
+                </a:ext>
+              </a:extLst>
+            </p:cNvPr>
+            <p:cNvGrpSpPr/>
+            <p:nvPr/>
+          </p:nvGrpSpPr>
+          <p:grpSpPr>
+            <a:xfrm>
+              <a:off x="838201" y="2258568"/>
+              <a:ext cx="5257800" cy="700778"/>
+              <a:chOff x="1137920" y="2001516"/>
+              <a:chExt cx="6436134" cy="802378"/>
+            </a:xfrm>
+          </p:grpSpPr>
+          <p:sp>
+            <p:nvSpPr>
+              <p:cNvPr id="11" name="Rectangle 10">
+                <a:extLst>
+                  <a:ext uri="{FF2B5EF4-FFF2-40B4-BE49-F238E27FC236}">
+                    <a16:creationId xmlns:a16="http://schemas.microsoft.com/office/drawing/2014/main" id="{D5C47C57-0327-4050-8875-775DE900E5F8}"/>
+                  </a:ext>
+                </a:extLst>
+              </p:cNvPr>
+              <p:cNvSpPr/>
+              <p:nvPr/>
+            </p:nvSpPr>
+            <p:spPr>
+              <a:xfrm>
+                <a:off x="1137920" y="2001520"/>
+                <a:ext cx="5770880" cy="802374"/>
+              </a:xfrm>
+              <a:prstGeom prst="rect">
+                <a:avLst/>
+              </a:prstGeom>
+              <a:solidFill>
+                <a:srgbClr val="65BBB5"/>
+              </a:solidFill>
+              <a:ln>
+                <a:noFill/>
+              </a:ln>
+            </p:spPr>
+            <p:style>
+              <a:lnRef idx="2">
+                <a:schemeClr val="accent1">
+                  <a:shade val="50000"/>
+                </a:schemeClr>
+              </a:lnRef>
+              <a:fillRef idx="1">
+                <a:schemeClr val="accent1"/>
+              </a:fillRef>
+              <a:effectRef idx="0">
+                <a:schemeClr val="accent1"/>
+              </a:effectRef>
+              <a:fontRef idx="minor">
+                <a:schemeClr val="lt1"/>
+              </a:fontRef>
+            </p:style>
+            <p:txBody>
+              <a:bodyPr rtlCol="0" anchor="ctr"/>
+              <a:lstStyle/>
+              <a:p>
+                <a:pPr algn="ctr"/>
+                <a:r>
+                  <a:rPr lang="en-US" dirty="0"/>
+                  <a:t>Data Exploration</a:t>
+                </a:r>
+              </a:p>
+            </p:txBody>
+          </p:sp>
+          <p:sp useBgFill="1">
+            <p:nvSpPr>
+              <p:cNvPr id="12" name="Isosceles Triangle 11">
+                <a:extLst>
+                  <a:ext uri="{FF2B5EF4-FFF2-40B4-BE49-F238E27FC236}">
+                    <a16:creationId xmlns:a16="http://schemas.microsoft.com/office/drawing/2014/main" id="{E13BE988-DA40-4FFC-8168-BABE13CA2B1B}"/>
+                  </a:ext>
+                </a:extLst>
+              </p:cNvPr>
+              <p:cNvSpPr/>
+              <p:nvPr/>
+            </p:nvSpPr>
+            <p:spPr>
+              <a:xfrm rot="5400000">
+                <a:off x="1167163" y="1972277"/>
+                <a:ext cx="802374" cy="860860"/>
+              </a:xfrm>
+              <a:prstGeom prst="triangle">
+                <a:avLst/>
+              </a:prstGeom>
+              <a:ln>
+                <a:noFill/>
+              </a:ln>
+            </p:spPr>
+            <p:style>
+              <a:lnRef idx="2">
+                <a:schemeClr val="accent1">
+                  <a:shade val="50000"/>
+                </a:schemeClr>
+              </a:lnRef>
+              <a:fillRef idx="1">
+                <a:schemeClr val="accent1"/>
+              </a:fillRef>
+              <a:effectRef idx="0">
+                <a:schemeClr val="accent1"/>
+              </a:effectRef>
+              <a:fontRef idx="minor">
+                <a:schemeClr val="lt1"/>
+              </a:fontRef>
+            </p:style>
+            <p:txBody>
+              <a:bodyPr rtlCol="0" anchor="ctr"/>
+              <a:lstStyle/>
+              <a:p>
+                <a:pPr algn="ctr"/>
+                <a:endParaRPr lang="en-US"/>
+              </a:p>
+            </p:txBody>
+          </p:sp>
+          <p:sp>
+            <p:nvSpPr>
+              <p:cNvPr id="13" name="Isosceles Triangle 12">
+                <a:extLst>
+                  <a:ext uri="{FF2B5EF4-FFF2-40B4-BE49-F238E27FC236}">
+                    <a16:creationId xmlns:a16="http://schemas.microsoft.com/office/drawing/2014/main" id="{825329AC-7A4C-4111-B7B6-7770A5B8573A}"/>
+                  </a:ext>
+                </a:extLst>
+              </p:cNvPr>
+              <p:cNvSpPr/>
+              <p:nvPr/>
+            </p:nvSpPr>
+            <p:spPr>
+              <a:xfrm rot="5400000">
+                <a:off x="6840239" y="2070077"/>
+                <a:ext cx="802375" cy="665254"/>
+              </a:xfrm>
+              <a:prstGeom prst="triangle">
+                <a:avLst/>
+              </a:prstGeom>
+              <a:solidFill>
+                <a:srgbClr val="65BBB5"/>
+              </a:solidFill>
+              <a:ln>
+                <a:noFill/>
+              </a:ln>
+            </p:spPr>
+            <p:style>
+              <a:lnRef idx="2">
+                <a:schemeClr val="accent1">
+                  <a:shade val="50000"/>
+                </a:schemeClr>
+              </a:lnRef>
+              <a:fillRef idx="1">
+                <a:schemeClr val="accent1"/>
+              </a:fillRef>
+              <a:effectRef idx="0">
+                <a:schemeClr val="accent1"/>
+              </a:effectRef>
+              <a:fontRef idx="minor">
+                <a:schemeClr val="lt1"/>
+              </a:fontRef>
+            </p:style>
+            <p:txBody>
+              <a:bodyPr rtlCol="0" anchor="ctr"/>
+              <a:lstStyle/>
+              <a:p>
+                <a:pPr algn="ctr"/>
+                <a:endParaRPr lang="en-US"/>
+              </a:p>
+            </p:txBody>
+          </p:sp>
+        </p:grpSp>
+        <p:grpSp>
+          <p:nvGrpSpPr>
+            <p:cNvPr id="14" name="Group 13">
+              <a:extLst>
+                <a:ext uri="{FF2B5EF4-FFF2-40B4-BE49-F238E27FC236}">
+                  <a16:creationId xmlns:a16="http://schemas.microsoft.com/office/drawing/2014/main" id="{A823B752-3395-4236-BBB1-25E58B9B0BC7}"/>
+                </a:ext>
+              </a:extLst>
+            </p:cNvPr>
+            <p:cNvGrpSpPr/>
+            <p:nvPr/>
+          </p:nvGrpSpPr>
+          <p:grpSpPr>
+            <a:xfrm>
+              <a:off x="838200" y="3172968"/>
+              <a:ext cx="5257800" cy="700775"/>
+              <a:chOff x="1137920" y="2001520"/>
+              <a:chExt cx="6436133" cy="802375"/>
+            </a:xfrm>
+          </p:grpSpPr>
+          <p:sp>
+            <p:nvSpPr>
+              <p:cNvPr id="15" name="Rectangle 14">
+                <a:extLst>
+                  <a:ext uri="{FF2B5EF4-FFF2-40B4-BE49-F238E27FC236}">
+                    <a16:creationId xmlns:a16="http://schemas.microsoft.com/office/drawing/2014/main" id="{B73C0E5E-6A8F-47EA-894E-511EF19EE882}"/>
+                  </a:ext>
+                </a:extLst>
+              </p:cNvPr>
+              <p:cNvSpPr/>
+              <p:nvPr/>
+            </p:nvSpPr>
+            <p:spPr>
+              <a:xfrm>
+                <a:off x="1137920" y="2001520"/>
+                <a:ext cx="5770880" cy="802374"/>
+              </a:xfrm>
+              <a:prstGeom prst="rect">
+                <a:avLst/>
+              </a:prstGeom>
+              <a:solidFill>
+                <a:srgbClr val="65BBB5"/>
+              </a:solidFill>
+              <a:ln>
+                <a:noFill/>
+              </a:ln>
+            </p:spPr>
+            <p:style>
+              <a:lnRef idx="2">
+                <a:schemeClr val="accent1">
+                  <a:shade val="50000"/>
+                </a:schemeClr>
+              </a:lnRef>
+              <a:fillRef idx="1">
+                <a:schemeClr val="accent1"/>
+              </a:fillRef>
+              <a:effectRef idx="0">
+                <a:schemeClr val="accent1"/>
+              </a:effectRef>
+              <a:fontRef idx="minor">
+                <a:schemeClr val="lt1"/>
+              </a:fontRef>
+            </p:style>
+            <p:txBody>
+              <a:bodyPr rtlCol="0" anchor="ctr"/>
+              <a:lstStyle/>
+              <a:p>
+                <a:pPr algn="ctr"/>
+                <a:r>
+                  <a:rPr lang="en-US" dirty="0"/>
+                  <a:t>Model Building</a:t>
+                </a:r>
+              </a:p>
+            </p:txBody>
+          </p:sp>
+          <p:sp useBgFill="1">
+            <p:nvSpPr>
+              <p:cNvPr id="16" name="Isosceles Triangle 15">
+                <a:extLst>
+                  <a:ext uri="{FF2B5EF4-FFF2-40B4-BE49-F238E27FC236}">
+                    <a16:creationId xmlns:a16="http://schemas.microsoft.com/office/drawing/2014/main" id="{1CBAC1DF-70C7-46C3-BB21-7DA7C6EDE9CB}"/>
+                  </a:ext>
+                </a:extLst>
+              </p:cNvPr>
+              <p:cNvSpPr/>
+              <p:nvPr/>
+            </p:nvSpPr>
+            <p:spPr>
+              <a:xfrm rot="5400000">
+                <a:off x="1167163" y="1972277"/>
+                <a:ext cx="802374" cy="860860"/>
+              </a:xfrm>
+              <a:prstGeom prst="triangle">
+                <a:avLst/>
+              </a:prstGeom>
+              <a:ln>
+                <a:noFill/>
+              </a:ln>
+            </p:spPr>
+            <p:style>
+              <a:lnRef idx="2">
+                <a:schemeClr val="accent1">
+                  <a:shade val="50000"/>
+                </a:schemeClr>
+              </a:lnRef>
+              <a:fillRef idx="1">
+                <a:schemeClr val="accent1"/>
+              </a:fillRef>
+              <a:effectRef idx="0">
+                <a:schemeClr val="accent1"/>
+              </a:effectRef>
+              <a:fontRef idx="minor">
+                <a:schemeClr val="lt1"/>
+              </a:fontRef>
+            </p:style>
+            <p:txBody>
+              <a:bodyPr rtlCol="0" anchor="ctr"/>
+              <a:lstStyle/>
+              <a:p>
+                <a:pPr algn="ctr"/>
+                <a:endParaRPr lang="en-US"/>
+              </a:p>
+            </p:txBody>
+          </p:sp>
+          <p:sp>
+            <p:nvSpPr>
+              <p:cNvPr id="17" name="Isosceles Triangle 16">
+                <a:extLst>
+                  <a:ext uri="{FF2B5EF4-FFF2-40B4-BE49-F238E27FC236}">
+                    <a16:creationId xmlns:a16="http://schemas.microsoft.com/office/drawing/2014/main" id="{E5C3AE00-B1CD-4FBB-A2BC-C1F58F667E18}"/>
+                  </a:ext>
+                </a:extLst>
+              </p:cNvPr>
+              <p:cNvSpPr/>
+              <p:nvPr/>
+            </p:nvSpPr>
+            <p:spPr>
+              <a:xfrm rot="5400000">
+                <a:off x="6840239" y="2070081"/>
+                <a:ext cx="802374" cy="665254"/>
+              </a:xfrm>
+              <a:prstGeom prst="triangle">
+                <a:avLst/>
+              </a:prstGeom>
+              <a:solidFill>
+                <a:srgbClr val="65BBB5"/>
+              </a:solidFill>
+              <a:ln>
+                <a:noFill/>
+              </a:ln>
+            </p:spPr>
+            <p:style>
+              <a:lnRef idx="2">
+                <a:schemeClr val="accent1">
+                  <a:shade val="50000"/>
+                </a:schemeClr>
+              </a:lnRef>
+              <a:fillRef idx="1">
+                <a:schemeClr val="accent1"/>
+              </a:fillRef>
+              <a:effectRef idx="0">
+                <a:schemeClr val="accent1"/>
+              </a:effectRef>
+              <a:fontRef idx="minor">
+                <a:schemeClr val="lt1"/>
+              </a:fontRef>
+            </p:style>
+            <p:txBody>
+              <a:bodyPr rtlCol="0" anchor="ctr"/>
+              <a:lstStyle/>
+              <a:p>
+                <a:pPr algn="ctr"/>
+                <a:endParaRPr lang="en-US"/>
+              </a:p>
+            </p:txBody>
+          </p:sp>
+        </p:grpSp>
+        <p:grpSp>
+          <p:nvGrpSpPr>
+            <p:cNvPr id="20" name="Group 19">
+              <a:extLst>
+                <a:ext uri="{FF2B5EF4-FFF2-40B4-BE49-F238E27FC236}">
+                  <a16:creationId xmlns:a16="http://schemas.microsoft.com/office/drawing/2014/main" id="{289994EC-B5E5-451A-A7B0-8E7D0F782638}"/>
+                </a:ext>
+              </a:extLst>
+            </p:cNvPr>
+            <p:cNvGrpSpPr/>
+            <p:nvPr/>
+          </p:nvGrpSpPr>
+          <p:grpSpPr>
+            <a:xfrm>
+              <a:off x="832459" y="4087368"/>
+              <a:ext cx="5263541" cy="700775"/>
+              <a:chOff x="1137920" y="2001520"/>
+              <a:chExt cx="6436133" cy="802375"/>
+            </a:xfrm>
+          </p:grpSpPr>
+          <p:sp>
+            <p:nvSpPr>
+              <p:cNvPr id="21" name="Rectangle 20">
+                <a:extLst>
+                  <a:ext uri="{FF2B5EF4-FFF2-40B4-BE49-F238E27FC236}">
+                    <a16:creationId xmlns:a16="http://schemas.microsoft.com/office/drawing/2014/main" id="{5D752EC3-D9D2-4678-A91D-44EE8635931C}"/>
+                  </a:ext>
+                </a:extLst>
+              </p:cNvPr>
+              <p:cNvSpPr/>
+              <p:nvPr/>
+            </p:nvSpPr>
+            <p:spPr>
+              <a:xfrm>
+                <a:off x="1137920" y="2001520"/>
+                <a:ext cx="5770880" cy="802374"/>
+              </a:xfrm>
+              <a:prstGeom prst="rect">
+                <a:avLst/>
+              </a:prstGeom>
+              <a:solidFill>
+                <a:srgbClr val="65BBB5"/>
+              </a:solidFill>
+              <a:ln>
+                <a:noFill/>
+              </a:ln>
+            </p:spPr>
+            <p:style>
+              <a:lnRef idx="2">
+                <a:schemeClr val="accent1">
+                  <a:shade val="50000"/>
+                </a:schemeClr>
+              </a:lnRef>
+              <a:fillRef idx="1">
+                <a:schemeClr val="accent1"/>
+              </a:fillRef>
+              <a:effectRef idx="0">
+                <a:schemeClr val="accent1"/>
+              </a:effectRef>
+              <a:fontRef idx="minor">
+                <a:schemeClr val="lt1"/>
+              </a:fontRef>
+            </p:style>
+            <p:txBody>
+              <a:bodyPr rtlCol="0" anchor="ctr"/>
+              <a:lstStyle/>
+              <a:p>
+                <a:pPr algn="ctr"/>
+                <a:r>
+                  <a:rPr lang="en-US" dirty="0"/>
+                  <a:t>Model Evaluation</a:t>
+                </a:r>
+              </a:p>
+            </p:txBody>
+          </p:sp>
+          <p:sp useBgFill="1">
+            <p:nvSpPr>
+              <p:cNvPr id="22" name="Isosceles Triangle 21">
+                <a:extLst>
+                  <a:ext uri="{FF2B5EF4-FFF2-40B4-BE49-F238E27FC236}">
+                    <a16:creationId xmlns:a16="http://schemas.microsoft.com/office/drawing/2014/main" id="{32040B53-6B85-4C20-B836-EA96258BC1F2}"/>
+                  </a:ext>
+                </a:extLst>
+              </p:cNvPr>
+              <p:cNvSpPr/>
+              <p:nvPr/>
+            </p:nvSpPr>
+            <p:spPr>
+              <a:xfrm rot="5400000">
+                <a:off x="1167163" y="1972277"/>
+                <a:ext cx="802374" cy="860860"/>
+              </a:xfrm>
+              <a:prstGeom prst="triangle">
+                <a:avLst/>
+              </a:prstGeom>
+              <a:ln>
+                <a:noFill/>
+              </a:ln>
+            </p:spPr>
+            <p:style>
+              <a:lnRef idx="2">
+                <a:schemeClr val="accent1">
+                  <a:shade val="50000"/>
+                </a:schemeClr>
+              </a:lnRef>
+              <a:fillRef idx="1">
+                <a:schemeClr val="accent1"/>
+              </a:fillRef>
+              <a:effectRef idx="0">
+                <a:schemeClr val="accent1"/>
+              </a:effectRef>
+              <a:fontRef idx="minor">
+                <a:schemeClr val="lt1"/>
+              </a:fontRef>
+            </p:style>
+            <p:txBody>
+              <a:bodyPr rtlCol="0" anchor="ctr"/>
+              <a:lstStyle/>
+              <a:p>
+                <a:pPr algn="ctr"/>
+                <a:endParaRPr lang="en-US"/>
+              </a:p>
+            </p:txBody>
+          </p:sp>
+          <p:sp>
+            <p:nvSpPr>
+              <p:cNvPr id="23" name="Isosceles Triangle 22">
+                <a:extLst>
+                  <a:ext uri="{FF2B5EF4-FFF2-40B4-BE49-F238E27FC236}">
+                    <a16:creationId xmlns:a16="http://schemas.microsoft.com/office/drawing/2014/main" id="{10C93972-D8F4-4629-A9CE-E0C60297667D}"/>
+                  </a:ext>
+                </a:extLst>
+              </p:cNvPr>
+              <p:cNvSpPr/>
+              <p:nvPr/>
+            </p:nvSpPr>
+            <p:spPr>
+              <a:xfrm rot="5400000">
+                <a:off x="6840239" y="2070081"/>
+                <a:ext cx="802374" cy="665254"/>
+              </a:xfrm>
+              <a:prstGeom prst="triangle">
+                <a:avLst/>
+              </a:prstGeom>
+              <a:solidFill>
+                <a:srgbClr val="65BBB5"/>
+              </a:solidFill>
+              <a:ln>
+                <a:noFill/>
+              </a:ln>
+            </p:spPr>
+            <p:style>
+              <a:lnRef idx="2">
+                <a:schemeClr val="accent1">
+                  <a:shade val="50000"/>
+                </a:schemeClr>
+              </a:lnRef>
+              <a:fillRef idx="1">
+                <a:schemeClr val="accent1"/>
+              </a:fillRef>
+              <a:effectRef idx="0">
+                <a:schemeClr val="accent1"/>
+              </a:effectRef>
+              <a:fontRef idx="minor">
+                <a:schemeClr val="lt1"/>
+              </a:fontRef>
+            </p:style>
+            <p:txBody>
+              <a:bodyPr rtlCol="0" anchor="ctr"/>
+              <a:lstStyle/>
+              <a:p>
+                <a:pPr algn="ctr"/>
+                <a:endParaRPr lang="en-US"/>
+              </a:p>
+            </p:txBody>
+          </p:sp>
+        </p:grpSp>
+        <p:grpSp>
+          <p:nvGrpSpPr>
+            <p:cNvPr id="24" name="Group 23">
+              <a:extLst>
+                <a:ext uri="{FF2B5EF4-FFF2-40B4-BE49-F238E27FC236}">
+                  <a16:creationId xmlns:a16="http://schemas.microsoft.com/office/drawing/2014/main" id="{ADEAE8C1-F768-49A2-85F2-B221B9667ACC}"/>
+                </a:ext>
+              </a:extLst>
+            </p:cNvPr>
+            <p:cNvGrpSpPr/>
+            <p:nvPr/>
+          </p:nvGrpSpPr>
+          <p:grpSpPr>
+            <a:xfrm>
+              <a:off x="832460" y="5093208"/>
+              <a:ext cx="5263540" cy="700775"/>
+              <a:chOff x="1137920" y="2001520"/>
+              <a:chExt cx="6436133" cy="802375"/>
+            </a:xfrm>
+          </p:grpSpPr>
+          <p:sp>
+            <p:nvSpPr>
+              <p:cNvPr id="25" name="Rectangle 24">
+                <a:extLst>
+                  <a:ext uri="{FF2B5EF4-FFF2-40B4-BE49-F238E27FC236}">
+                    <a16:creationId xmlns:a16="http://schemas.microsoft.com/office/drawing/2014/main" id="{83FDD6BE-440B-4EF5-9310-08672FB35E5D}"/>
+                  </a:ext>
+                </a:extLst>
+              </p:cNvPr>
+              <p:cNvSpPr/>
+              <p:nvPr/>
+            </p:nvSpPr>
+            <p:spPr>
+              <a:xfrm>
+                <a:off x="1137920" y="2001520"/>
+                <a:ext cx="5770880" cy="802374"/>
+              </a:xfrm>
+              <a:prstGeom prst="rect">
+                <a:avLst/>
+              </a:prstGeom>
+              <a:solidFill>
+                <a:srgbClr val="65BBB5"/>
+              </a:solidFill>
+              <a:ln>
+                <a:noFill/>
+              </a:ln>
+            </p:spPr>
+            <p:style>
+              <a:lnRef idx="2">
+                <a:schemeClr val="accent1">
+                  <a:shade val="50000"/>
+                </a:schemeClr>
+              </a:lnRef>
+              <a:fillRef idx="1">
+                <a:schemeClr val="accent1"/>
+              </a:fillRef>
+              <a:effectRef idx="0">
+                <a:schemeClr val="accent1"/>
+              </a:effectRef>
+              <a:fontRef idx="minor">
+                <a:schemeClr val="lt1"/>
+              </a:fontRef>
+            </p:style>
+            <p:txBody>
+              <a:bodyPr rtlCol="0" anchor="ctr"/>
+              <a:lstStyle/>
+              <a:p>
+                <a:pPr algn="ctr"/>
+                <a:r>
+                  <a:rPr lang="en-US" sz="1600" dirty="0"/>
+                  <a:t>Assumptions, Limitations, &amp; Next Steps</a:t>
+                </a:r>
+              </a:p>
+            </p:txBody>
+          </p:sp>
+          <p:sp useBgFill="1">
+            <p:nvSpPr>
+              <p:cNvPr id="26" name="Isosceles Triangle 25">
+                <a:extLst>
+                  <a:ext uri="{FF2B5EF4-FFF2-40B4-BE49-F238E27FC236}">
+                    <a16:creationId xmlns:a16="http://schemas.microsoft.com/office/drawing/2014/main" id="{D95E6004-F196-4913-9929-320AB5BC2D46}"/>
+                  </a:ext>
+                </a:extLst>
+              </p:cNvPr>
+              <p:cNvSpPr/>
+              <p:nvPr/>
+            </p:nvSpPr>
+            <p:spPr>
+              <a:xfrm rot="5400000">
+                <a:off x="1167163" y="1972277"/>
+                <a:ext cx="802374" cy="860860"/>
+              </a:xfrm>
+              <a:prstGeom prst="triangle">
+                <a:avLst/>
+              </a:prstGeom>
+              <a:ln>
+                <a:noFill/>
+              </a:ln>
+            </p:spPr>
+            <p:style>
+              <a:lnRef idx="2">
+                <a:schemeClr val="accent1">
+                  <a:shade val="50000"/>
+                </a:schemeClr>
+              </a:lnRef>
+              <a:fillRef idx="1">
+                <a:schemeClr val="accent1"/>
+              </a:fillRef>
+              <a:effectRef idx="0">
+                <a:schemeClr val="accent1"/>
+              </a:effectRef>
+              <a:fontRef idx="minor">
+                <a:schemeClr val="lt1"/>
+              </a:fontRef>
+            </p:style>
+            <p:txBody>
+              <a:bodyPr rtlCol="0" anchor="ctr"/>
+              <a:lstStyle/>
+              <a:p>
+                <a:pPr algn="ctr"/>
+                <a:endParaRPr lang="en-US"/>
+              </a:p>
+            </p:txBody>
+          </p:sp>
+          <p:sp>
+            <p:nvSpPr>
+              <p:cNvPr id="27" name="Isosceles Triangle 26">
+                <a:extLst>
+                  <a:ext uri="{FF2B5EF4-FFF2-40B4-BE49-F238E27FC236}">
+                    <a16:creationId xmlns:a16="http://schemas.microsoft.com/office/drawing/2014/main" id="{09AD81AE-14AF-45C5-AEB5-806041956A65}"/>
+                  </a:ext>
+                </a:extLst>
+              </p:cNvPr>
+              <p:cNvSpPr/>
+              <p:nvPr/>
+            </p:nvSpPr>
+            <p:spPr>
+              <a:xfrm rot="5400000">
+                <a:off x="6840239" y="2070081"/>
+                <a:ext cx="802374" cy="665254"/>
+              </a:xfrm>
+              <a:prstGeom prst="triangle">
+                <a:avLst/>
+              </a:prstGeom>
+              <a:solidFill>
+                <a:srgbClr val="65BBB5"/>
+              </a:solidFill>
+              <a:ln>
+                <a:noFill/>
+              </a:ln>
+            </p:spPr>
+            <p:style>
+              <a:lnRef idx="2">
+                <a:schemeClr val="accent1">
+                  <a:shade val="50000"/>
+                </a:schemeClr>
+              </a:lnRef>
+              <a:fillRef idx="1">
+                <a:schemeClr val="accent1"/>
+              </a:fillRef>
+              <a:effectRef idx="0">
+                <a:schemeClr val="accent1"/>
+              </a:effectRef>
+              <a:fontRef idx="minor">
+                <a:schemeClr val="lt1"/>
+              </a:fontRef>
+            </p:style>
+            <p:txBody>
+              <a:bodyPr rtlCol="0" anchor="ctr"/>
+              <a:lstStyle/>
+              <a:p>
+                <a:pPr algn="ctr"/>
+                <a:endParaRPr lang="en-US"/>
+              </a:p>
+            </p:txBody>
+          </p:sp>
+        </p:grpSp>
+        <p:sp>
+          <p:nvSpPr>
+            <p:cNvPr id="28" name="TextBox 27">
+              <a:extLst>
+                <a:ext uri="{FF2B5EF4-FFF2-40B4-BE49-F238E27FC236}">
+                  <a16:creationId xmlns:a16="http://schemas.microsoft.com/office/drawing/2014/main" id="{FC65A9A2-6022-4145-AED2-54E0257D38E9}"/>
+                </a:ext>
+              </a:extLst>
+            </p:cNvPr>
+            <p:cNvSpPr txBox="1"/>
+            <p:nvPr/>
+          </p:nvSpPr>
+          <p:spPr>
+            <a:xfrm>
+              <a:off x="6096000" y="1504558"/>
+              <a:ext cx="4511040" cy="369332"/>
+            </a:xfrm>
+            <a:prstGeom prst="rect">
+              <a:avLst/>
+            </a:prstGeom>
+            <a:noFill/>
+          </p:spPr>
+          <p:txBody>
+            <a:bodyPr wrap="square" rtlCol="0">
+              <a:spAutoFit/>
+            </a:bodyPr>
+            <a:lstStyle/>
+            <a:p>
+              <a:pPr marL="285750" indent="-285750">
+                <a:buFont typeface="Arial" panose="020B0604020202020204" pitchFamily="34" charset="0"/>
+                <a:buChar char="•"/>
+              </a:pPr>
+              <a:r>
+                <a:rPr lang="en-US" dirty="0">
+                  <a:solidFill>
+                    <a:srgbClr val="4B4B4B"/>
+                  </a:solidFill>
+                </a:rPr>
+                <a:t>What is a food desert?</a:t>
+              </a:r>
+            </a:p>
+          </p:txBody>
+        </p:sp>
+        <p:sp>
+          <p:nvSpPr>
+            <p:cNvPr id="29" name="TextBox 28">
+              <a:extLst>
+                <a:ext uri="{FF2B5EF4-FFF2-40B4-BE49-F238E27FC236}">
+                  <a16:creationId xmlns:a16="http://schemas.microsoft.com/office/drawing/2014/main" id="{97845F56-2D4E-4EF4-B36F-FBF9134EF180}"/>
+                </a:ext>
+              </a:extLst>
+            </p:cNvPr>
+            <p:cNvSpPr txBox="1"/>
+            <p:nvPr/>
+          </p:nvSpPr>
+          <p:spPr>
+            <a:xfrm>
+              <a:off x="6096000" y="2285790"/>
+              <a:ext cx="4511040" cy="646331"/>
+            </a:xfrm>
+            <a:prstGeom prst="rect">
+              <a:avLst/>
+            </a:prstGeom>
+            <a:noFill/>
+          </p:spPr>
+          <p:txBody>
+            <a:bodyPr wrap="square" rtlCol="0">
+              <a:spAutoFit/>
+            </a:bodyPr>
+            <a:lstStyle/>
+            <a:p>
+              <a:pPr marL="285750" indent="-285750">
+                <a:buFont typeface="Arial" panose="020B0604020202020204" pitchFamily="34" charset="0"/>
+                <a:buChar char="•"/>
+              </a:pPr>
+              <a:r>
+                <a:rPr lang="en-US" dirty="0">
+                  <a:solidFill>
+                    <a:srgbClr val="4B4B4B"/>
+                  </a:solidFill>
+                </a:rPr>
+                <a:t>Provided data overview.</a:t>
+              </a:r>
+            </a:p>
+            <a:p>
+              <a:pPr marL="285750" indent="-285750">
+                <a:buFont typeface="Arial" panose="020B0604020202020204" pitchFamily="34" charset="0"/>
+                <a:buChar char="•"/>
+              </a:pPr>
+              <a:r>
+                <a:rPr lang="en-US" dirty="0">
+                  <a:solidFill>
+                    <a:srgbClr val="4B4B4B"/>
+                  </a:solidFill>
+                </a:rPr>
+                <a:t>Summary statistics and graphs.</a:t>
+              </a:r>
+            </a:p>
+          </p:txBody>
+        </p:sp>
+        <p:sp>
+          <p:nvSpPr>
+            <p:cNvPr id="30" name="TextBox 29">
+              <a:extLst>
+                <a:ext uri="{FF2B5EF4-FFF2-40B4-BE49-F238E27FC236}">
+                  <a16:creationId xmlns:a16="http://schemas.microsoft.com/office/drawing/2014/main" id="{95811F6E-5930-48DB-A781-679C76A86564}"/>
+                </a:ext>
+              </a:extLst>
+            </p:cNvPr>
+            <p:cNvSpPr txBox="1"/>
+            <p:nvPr/>
+          </p:nvSpPr>
+          <p:spPr>
+            <a:xfrm>
+              <a:off x="6096000" y="3227411"/>
+              <a:ext cx="4511040" cy="646331"/>
+            </a:xfrm>
+            <a:prstGeom prst="rect">
+              <a:avLst/>
+            </a:prstGeom>
+            <a:noFill/>
+          </p:spPr>
+          <p:txBody>
+            <a:bodyPr wrap="square" rtlCol="0">
+              <a:spAutoFit/>
+            </a:bodyPr>
+            <a:lstStyle/>
+            <a:p>
+              <a:pPr marL="285750" indent="-285750">
+                <a:buFont typeface="Arial" panose="020B0604020202020204" pitchFamily="34" charset="0"/>
+                <a:buChar char="•"/>
+              </a:pPr>
+              <a:r>
+                <a:rPr lang="en-US" dirty="0">
+                  <a:solidFill>
+                    <a:srgbClr val="4B4B4B"/>
+                  </a:solidFill>
+                </a:rPr>
+                <a:t>Multivariate analysis.</a:t>
+              </a:r>
+            </a:p>
+            <a:p>
+              <a:pPr marL="285750" indent="-285750">
+                <a:buFont typeface="Arial" panose="020B0604020202020204" pitchFamily="34" charset="0"/>
+                <a:buChar char="•"/>
+              </a:pPr>
+              <a:r>
+                <a:rPr lang="en-US" dirty="0">
+                  <a:solidFill>
+                    <a:srgbClr val="4B4B4B"/>
+                  </a:solidFill>
+                </a:rPr>
+                <a:t>Modelling workflow.</a:t>
+              </a:r>
+            </a:p>
+          </p:txBody>
+        </p:sp>
+        <p:sp>
+          <p:nvSpPr>
+            <p:cNvPr id="31" name="TextBox 30">
+              <a:extLst>
+                <a:ext uri="{FF2B5EF4-FFF2-40B4-BE49-F238E27FC236}">
+                  <a16:creationId xmlns:a16="http://schemas.microsoft.com/office/drawing/2014/main" id="{D75DD9F3-7937-40B0-AAB8-61052D79D6EF}"/>
+                </a:ext>
+              </a:extLst>
+            </p:cNvPr>
+            <p:cNvSpPr txBox="1"/>
+            <p:nvPr/>
+          </p:nvSpPr>
+          <p:spPr>
+            <a:xfrm>
+              <a:off x="6096000" y="4111808"/>
+              <a:ext cx="4511040" cy="646331"/>
+            </a:xfrm>
+            <a:prstGeom prst="rect">
+              <a:avLst/>
+            </a:prstGeom>
+            <a:noFill/>
+          </p:spPr>
+          <p:txBody>
+            <a:bodyPr wrap="square" rtlCol="0">
+              <a:spAutoFit/>
+            </a:bodyPr>
+            <a:lstStyle/>
+            <a:p>
+              <a:pPr marL="285750" indent="-285750">
+                <a:buFont typeface="Arial" panose="020B0604020202020204" pitchFamily="34" charset="0"/>
+                <a:buChar char="•"/>
+              </a:pPr>
+              <a:r>
+                <a:rPr lang="en-US" dirty="0">
+                  <a:solidFill>
+                    <a:srgbClr val="4B4B4B"/>
+                  </a:solidFill>
+                </a:rPr>
+                <a:t>ROC curves.</a:t>
+              </a:r>
+            </a:p>
+            <a:p>
+              <a:pPr marL="285750" indent="-285750">
+                <a:buFont typeface="Arial" panose="020B0604020202020204" pitchFamily="34" charset="0"/>
+                <a:buChar char="•"/>
+              </a:pPr>
+              <a:r>
+                <a:rPr lang="en-US" dirty="0">
+                  <a:solidFill>
+                    <a:srgbClr val="4B4B4B"/>
+                  </a:solidFill>
+                </a:rPr>
+                <a:t>Tradeoffs.</a:t>
+              </a:r>
+            </a:p>
+          </p:txBody>
+        </p:sp>
+        <p:sp>
+          <p:nvSpPr>
+            <p:cNvPr id="32" name="TextBox 31">
+              <a:extLst>
+                <a:ext uri="{FF2B5EF4-FFF2-40B4-BE49-F238E27FC236}">
+                  <a16:creationId xmlns:a16="http://schemas.microsoft.com/office/drawing/2014/main" id="{A74D41C6-5E9C-424C-B700-9ACE68A5A6F4}"/>
+                </a:ext>
+              </a:extLst>
+            </p:cNvPr>
+            <p:cNvSpPr txBox="1"/>
+            <p:nvPr/>
+          </p:nvSpPr>
+          <p:spPr>
+            <a:xfrm>
+              <a:off x="6096000" y="5258929"/>
+              <a:ext cx="4511040" cy="369332"/>
+            </a:xfrm>
+            <a:prstGeom prst="rect">
+              <a:avLst/>
+            </a:prstGeom>
+            <a:noFill/>
+          </p:spPr>
+          <p:txBody>
+            <a:bodyPr wrap="square" rtlCol="0">
+              <a:spAutoFit/>
+            </a:bodyPr>
+            <a:lstStyle/>
+            <a:p>
+              <a:pPr marL="285750" indent="-285750">
+                <a:buFont typeface="Arial" panose="020B0604020202020204" pitchFamily="34" charset="0"/>
+                <a:buChar char="•"/>
+              </a:pPr>
+              <a:r>
+                <a:rPr lang="en-US" dirty="0">
+                  <a:solidFill>
+                    <a:srgbClr val="4B4B4B"/>
+                  </a:solidFill>
+                </a:rPr>
+                <a:t>Special considerations.</a:t>
+              </a:r>
+            </a:p>
+          </p:txBody>
+        </p:sp>
+      </p:grpSp>
     </p:spTree>
     <p:extLst>
       <p:ext uri="{BB962C8B-B14F-4D97-AF65-F5344CB8AC3E}">
@@ -9954,7 +11814,7 @@
           <p:nvPr>
             <p:extLst>
               <p:ext uri="{D42A27DB-BD31-4B8C-83A1-F6EECF244321}">
-                <p14:modId xmlns:p14="http://schemas.microsoft.com/office/powerpoint/2010/main" val="3943920649"/>
+                <p14:modId xmlns:p14="http://schemas.microsoft.com/office/powerpoint/2010/main" val="2107015828"/>
               </p:ext>
             </p:extLst>
           </p:nvPr>
@@ -10176,7 +12036,11 @@
                     <a:lstStyle/>
                     <a:p>
                       <a:r>
-                        <a:rPr lang="en-US" dirty="0"/>
+                        <a:rPr lang="en-US" dirty="0">
+                          <a:solidFill>
+                            <a:srgbClr val="4B4B4B"/>
+                          </a:solidFill>
+                        </a:rPr>
                         <a:t>pop</a:t>
                       </a:r>
                     </a:p>
@@ -10218,11 +12082,19 @@
                     <a:lstStyle/>
                     <a:p>
                       <a:r>
-                        <a:rPr lang="en-US" b="0" dirty="0" err="1"/>
+                        <a:rPr lang="en-US" b="0" dirty="0" err="1">
+                          <a:solidFill>
+                            <a:srgbClr val="4B4B4B"/>
+                          </a:solidFill>
+                        </a:rPr>
                         <a:t>food.desert</a:t>
                       </a:r>
                       <a:r>
-                        <a:rPr lang="en-US" b="0" dirty="0"/>
+                        <a:rPr lang="en-US" b="0" dirty="0">
+                          <a:solidFill>
+                            <a:srgbClr val="4B4B4B"/>
+                          </a:solidFill>
+                        </a:rPr>
                         <a:t> </a:t>
                       </a:r>
                     </a:p>
@@ -10271,7 +12143,11 @@
                     <a:lstStyle/>
                     <a:p>
                       <a:r>
-                        <a:rPr lang="en-US" dirty="0"/>
+                        <a:rPr lang="en-US" dirty="0">
+                          <a:solidFill>
+                            <a:srgbClr val="4B4B4B"/>
+                          </a:solidFill>
+                        </a:rPr>
                         <a:t>stores</a:t>
                       </a:r>
                     </a:p>
@@ -10322,10 +12198,18 @@
                     <a:lstStyle/>
                     <a:p>
                       <a:r>
-                        <a:rPr lang="en-US" dirty="0" err="1"/>
+                        <a:rPr lang="en-US" dirty="0" err="1">
+                          <a:solidFill>
+                            <a:srgbClr val="4B4B4B"/>
+                          </a:solidFill>
+                        </a:rPr>
                         <a:t>ruca.usda</a:t>
                       </a:r>
-                      <a:endParaRPr lang="en-US" dirty="0"/>
+                      <a:endParaRPr lang="en-US" dirty="0">
+                        <a:solidFill>
+                          <a:srgbClr val="4B4B4B"/>
+                        </a:solidFill>
+                      </a:endParaRPr>
                     </a:p>
                   </a:txBody>
                   <a:tcPr>
@@ -10380,7 +12264,11 @@
                     <a:bodyPr/>
                     <a:lstStyle/>
                     <a:p>
-                      <a:endParaRPr lang="en-US" dirty="0"/>
+                      <a:endParaRPr lang="en-US" dirty="0">
+                        <a:solidFill>
+                          <a:srgbClr val="4B4B4B"/>
+                        </a:solidFill>
+                      </a:endParaRPr>
                     </a:p>
                   </a:txBody>
                   <a:tcPr>
@@ -10427,7 +12315,11 @@
                     <a:lstStyle/>
                     <a:p>
                       <a:r>
-                        <a:rPr lang="en-US" dirty="0"/>
+                        <a:rPr lang="en-US" dirty="0">
+                          <a:solidFill>
+                            <a:srgbClr val="4B4B4B"/>
+                          </a:solidFill>
+                        </a:rPr>
                         <a:t>vehicles</a:t>
                       </a:r>
                     </a:p>
@@ -10704,7 +12596,7 @@
               <a:r>
                 <a:rPr lang="en-US" sz="1800" dirty="0">
                   <a:solidFill>
-                    <a:schemeClr val="tx1"/>
+                    <a:srgbClr val="4B4B4B"/>
                   </a:solidFill>
                 </a:rPr>
                 <a:t>Food desert designation for 2010 are included, but this designation was improved upon by the USDA in 2017</a:t>
@@ -10720,7 +12612,7 @@
               <a:r>
                 <a:rPr lang="en-US" sz="1800" dirty="0">
                   <a:solidFill>
-                    <a:schemeClr val="tx1"/>
+                    <a:srgbClr val="4B4B4B"/>
                   </a:solidFill>
                 </a:rPr>
                 <a:t>. This analysis will focus solely on the 2017 designation. </a:t>
@@ -11574,6 +13466,62 @@
               <a:rPr lang="en-US" dirty="0"/>
               <a:t>USDA Food Desert Designations 2017</a:t>
             </a:r>
+            <a:r>
+              <a:rPr lang="en-US" baseline="30000" dirty="0"/>
+              <a:t>3</a:t>
+            </a:r>
+          </a:p>
+        </p:txBody>
+      </p:sp>
+      <p:sp>
+        <p:nvSpPr>
+          <p:cNvPr id="3" name="Footer Placeholder 2">
+            <a:extLst>
+              <a:ext uri="{FF2B5EF4-FFF2-40B4-BE49-F238E27FC236}">
+                <a16:creationId xmlns:a16="http://schemas.microsoft.com/office/drawing/2014/main" id="{CAD35A73-B31F-4C51-8C90-1E02E4FEE0B5}"/>
+              </a:ext>
+            </a:extLst>
+          </p:cNvPr>
+          <p:cNvSpPr>
+            <a:spLocks noGrp="1"/>
+          </p:cNvSpPr>
+          <p:nvPr>
+            <p:ph type="ftr" sz="quarter" idx="11"/>
+          </p:nvPr>
+        </p:nvSpPr>
+        <p:spPr/>
+        <p:txBody>
+          <a:bodyPr/>
+          <a:lstStyle/>
+          <a:p>
+            <a:pPr algn="l"/>
+            <a:r>
+              <a:rPr lang="en-US" dirty="0"/>
+              <a:t>3. US Census tract shapefiles obtained with their online tool at: </a:t>
+            </a:r>
+            <a:r>
+              <a:rPr lang="en-US" dirty="0">
+                <a:solidFill>
+                  <a:srgbClr val="4B4B4B"/>
+                </a:solidFill>
+                <a:hlinkClick r:id="rId3">
+                  <a:extLst>
+                    <a:ext uri="{A12FA001-AC4F-418D-AE19-62706E023703}">
+                      <ahyp:hlinkClr xmlns:ahyp="http://schemas.microsoft.com/office/drawing/2018/hyperlinkcolor" val="tx"/>
+                    </a:ext>
+                  </a:extLst>
+                </a:hlinkClick>
+              </a:rPr>
+              <a:t>https://www.census.gov/geographies/mapping-files/time-series/geo/carto-boundary-file.2017.html</a:t>
+            </a:r>
+            <a:r>
+              <a:rPr lang="en-US" dirty="0">
+                <a:solidFill>
+                  <a:srgbClr val="4B4B4B"/>
+                </a:solidFill>
+              </a:rPr>
+              <a:t> </a:t>
+            </a:r>
           </a:p>
         </p:txBody>
       </p:sp>

</xml_diff>